<commit_message>
Draft slides for next NCI meeting
</commit_message>
<xml_diff>
--- a/presentations/NCI_talks/2024_10_23.pptx
+++ b/presentations/NCI_talks/2024_10_23.pptx
@@ -5,18 +5,20 @@
     <p:sldMasterId id="2147483648" r:id="rId1"/>
   </p:sldMasterIdLst>
   <p:notesMasterIdLst>
-    <p:notesMasterId r:id="rId11"/>
+    <p:notesMasterId r:id="rId13"/>
   </p:notesMasterIdLst>
   <p:sldIdLst>
     <p:sldId id="256" r:id="rId2"/>
     <p:sldId id="541" r:id="rId3"/>
-    <p:sldId id="577" r:id="rId4"/>
-    <p:sldId id="578" r:id="rId5"/>
-    <p:sldId id="579" r:id="rId6"/>
-    <p:sldId id="580" r:id="rId7"/>
-    <p:sldId id="550" r:id="rId8"/>
-    <p:sldId id="529" r:id="rId9"/>
-    <p:sldId id="576" r:id="rId10"/>
+    <p:sldId id="582" r:id="rId4"/>
+    <p:sldId id="577" r:id="rId5"/>
+    <p:sldId id="578" r:id="rId6"/>
+    <p:sldId id="579" r:id="rId7"/>
+    <p:sldId id="580" r:id="rId8"/>
+    <p:sldId id="581" r:id="rId9"/>
+    <p:sldId id="550" r:id="rId10"/>
+    <p:sldId id="529" r:id="rId11"/>
+    <p:sldId id="576" r:id="rId12"/>
   </p:sldIdLst>
   <p:sldSz cx="12192000" cy="6858000"/>
   <p:notesSz cx="6858000" cy="9144000"/>
@@ -216,7 +218,7 @@
           <a:p>
             <a:fld id="{E933A773-0DCE-3544-BB67-D5FA58DF903C}" type="datetimeFigureOut">
               <a:rPr lang="en-US" smtClean="0"/>
-              <a:t>9/23/24</a:t>
+              <a:t>9/24/24</a:t>
             </a:fld>
             <a:endParaRPr lang="en-US"/>
           </a:p>
@@ -567,6 +569,180 @@
 </p:notes>
 </file>
 
+<file path=ppt/notesSlides/notesSlide10.xml><?xml version="1.0" encoding="utf-8"?>
+<p:notes xmlns:a="http://schemas.openxmlformats.org/drawingml/2006/main" xmlns:r="http://schemas.openxmlformats.org/officeDocument/2006/relationships" xmlns:p="http://schemas.openxmlformats.org/presentationml/2006/main">
+  <p:cSld>
+    <p:spTree>
+      <p:nvGrpSpPr>
+        <p:cNvPr id="1" name=""/>
+        <p:cNvGrpSpPr/>
+        <p:nvPr/>
+      </p:nvGrpSpPr>
+      <p:grpSpPr>
+        <a:xfrm>
+          <a:off x="0" y="0"/>
+          <a:ext cx="0" cy="0"/>
+          <a:chOff x="0" y="0"/>
+          <a:chExt cx="0" cy="0"/>
+        </a:xfrm>
+      </p:grpSpPr>
+      <p:sp>
+        <p:nvSpPr>
+          <p:cNvPr id="2" name="Slide Image Placeholder 1"/>
+          <p:cNvSpPr>
+            <a:spLocks noGrp="1" noRot="1" noChangeAspect="1"/>
+          </p:cNvSpPr>
+          <p:nvPr>
+            <p:ph type="sldImg"/>
+          </p:nvPr>
+        </p:nvSpPr>
+        <p:spPr/>
+      </p:sp>
+      <p:sp>
+        <p:nvSpPr>
+          <p:cNvPr id="3" name="Notes Placeholder 2"/>
+          <p:cNvSpPr>
+            <a:spLocks noGrp="1"/>
+          </p:cNvSpPr>
+          <p:nvPr>
+            <p:ph type="body" idx="1"/>
+          </p:nvPr>
+        </p:nvSpPr>
+        <p:spPr/>
+        <p:txBody>
+          <a:bodyPr/>
+          <a:lstStyle/>
+          <a:p>
+            <a:endParaRPr lang="en-US" dirty="0"/>
+          </a:p>
+        </p:txBody>
+      </p:sp>
+      <p:sp>
+        <p:nvSpPr>
+          <p:cNvPr id="4" name="Slide Number Placeholder 3"/>
+          <p:cNvSpPr>
+            <a:spLocks noGrp="1"/>
+          </p:cNvSpPr>
+          <p:nvPr>
+            <p:ph type="sldNum" sz="quarter" idx="5"/>
+          </p:nvPr>
+        </p:nvSpPr>
+        <p:spPr/>
+        <p:txBody>
+          <a:bodyPr/>
+          <a:lstStyle/>
+          <a:p>
+            <a:fld id="{061BAA8C-FDC6-D345-B4E0-3B02449209FB}" type="slidenum">
+              <a:rPr lang="en-US" smtClean="0"/>
+              <a:t>10</a:t>
+            </a:fld>
+            <a:endParaRPr lang="en-US"/>
+          </a:p>
+        </p:txBody>
+      </p:sp>
+    </p:spTree>
+    <p:extLst>
+      <p:ext uri="{BB962C8B-B14F-4D97-AF65-F5344CB8AC3E}">
+        <p14:creationId xmlns:p14="http://schemas.microsoft.com/office/powerpoint/2010/main" val="3703388347"/>
+      </p:ext>
+    </p:extLst>
+  </p:cSld>
+  <p:clrMapOvr>
+    <a:masterClrMapping/>
+  </p:clrMapOvr>
+</p:notes>
+</file>
+
+<file path=ppt/notesSlides/notesSlide11.xml><?xml version="1.0" encoding="utf-8"?>
+<p:notes xmlns:a="http://schemas.openxmlformats.org/drawingml/2006/main" xmlns:r="http://schemas.openxmlformats.org/officeDocument/2006/relationships" xmlns:p="http://schemas.openxmlformats.org/presentationml/2006/main">
+  <p:cSld>
+    <p:spTree>
+      <p:nvGrpSpPr>
+        <p:cNvPr id="1" name=""/>
+        <p:cNvGrpSpPr/>
+        <p:nvPr/>
+      </p:nvGrpSpPr>
+      <p:grpSpPr>
+        <a:xfrm>
+          <a:off x="0" y="0"/>
+          <a:ext cx="0" cy="0"/>
+          <a:chOff x="0" y="0"/>
+          <a:chExt cx="0" cy="0"/>
+        </a:xfrm>
+      </p:grpSpPr>
+      <p:sp>
+        <p:nvSpPr>
+          <p:cNvPr id="2" name="Slide Image Placeholder 1"/>
+          <p:cNvSpPr>
+            <a:spLocks noGrp="1" noRot="1" noChangeAspect="1"/>
+          </p:cNvSpPr>
+          <p:nvPr>
+            <p:ph type="sldImg"/>
+          </p:nvPr>
+        </p:nvSpPr>
+        <p:spPr/>
+      </p:sp>
+      <p:sp>
+        <p:nvSpPr>
+          <p:cNvPr id="3" name="Notes Placeholder 2"/>
+          <p:cNvSpPr>
+            <a:spLocks noGrp="1"/>
+          </p:cNvSpPr>
+          <p:nvPr>
+            <p:ph type="body" idx="1"/>
+          </p:nvPr>
+        </p:nvSpPr>
+        <p:spPr/>
+        <p:txBody>
+          <a:bodyPr/>
+          <a:lstStyle/>
+          <a:p>
+            <a:endParaRPr lang="en-US" b="0" i="0" u="none" strike="noStrike" dirty="0">
+              <a:solidFill>
+                <a:srgbClr val="212121"/>
+              </a:solidFill>
+              <a:effectLst/>
+              <a:latin typeface="Cambria" panose="02040503050406030204" pitchFamily="18" charset="0"/>
+            </a:endParaRPr>
+          </a:p>
+        </p:txBody>
+      </p:sp>
+      <p:sp>
+        <p:nvSpPr>
+          <p:cNvPr id="4" name="Slide Number Placeholder 3"/>
+          <p:cNvSpPr>
+            <a:spLocks noGrp="1"/>
+          </p:cNvSpPr>
+          <p:nvPr>
+            <p:ph type="sldNum" sz="quarter" idx="5"/>
+          </p:nvPr>
+        </p:nvSpPr>
+        <p:spPr/>
+        <p:txBody>
+          <a:bodyPr/>
+          <a:lstStyle/>
+          <a:p>
+            <a:fld id="{061BAA8C-FDC6-D345-B4E0-3B02449209FB}" type="slidenum">
+              <a:rPr lang="en-US" smtClean="0"/>
+              <a:t>11</a:t>
+            </a:fld>
+            <a:endParaRPr lang="en-US"/>
+          </a:p>
+        </p:txBody>
+      </p:sp>
+    </p:spTree>
+    <p:extLst>
+      <p:ext uri="{BB962C8B-B14F-4D97-AF65-F5344CB8AC3E}">
+        <p14:creationId xmlns:p14="http://schemas.microsoft.com/office/powerpoint/2010/main" val="605091724"/>
+      </p:ext>
+    </p:extLst>
+  </p:cSld>
+  <p:clrMapOvr>
+    <a:masterClrMapping/>
+  </p:clrMapOvr>
+</p:notes>
+</file>
+
 <file path=ppt/notesSlides/notesSlide2.xml><?xml version="1.0" encoding="utf-8"?>
 <p:notes xmlns:a="http://schemas.openxmlformats.org/drawingml/2006/main" xmlns:r="http://schemas.openxmlformats.org/officeDocument/2006/relationships" xmlns:p="http://schemas.openxmlformats.org/presentationml/2006/main">
   <p:cSld>
@@ -637,6 +813,27 @@
                 <a:effectLst/>
                 <a:latin typeface="Menlo" panose="020B0609030804020204" pitchFamily="49" charset="0"/>
               </a:rPr>
+              <a:t>LOGIT TRANSFORMED FREQS</a:t>
+            </a:r>
+          </a:p>
+          <a:p>
+            <a:endParaRPr lang="en-US" b="0" dirty="0">
+              <a:solidFill>
+                <a:srgbClr val="CCCCCC"/>
+              </a:solidFill>
+              <a:effectLst/>
+              <a:latin typeface="Menlo" panose="020B0609030804020204" pitchFamily="49" charset="0"/>
+            </a:endParaRPr>
+          </a:p>
+          <a:p>
+            <a:r>
+              <a:rPr lang="en-US" b="0" dirty="0">
+                <a:solidFill>
+                  <a:srgbClr val="CCCCCC"/>
+                </a:solidFill>
+                <a:effectLst/>
+                <a:latin typeface="Menlo" panose="020B0609030804020204" pitchFamily="49" charset="0"/>
+              </a:rPr>
               <a:t>Including all PD1/PDL1 sorts here but that’s fine I believe (baseline, no ICI yet)</a:t>
             </a:r>
           </a:p>
@@ -1906,6 +2103,120 @@
 </file>
 
 <file path=ppt/notesSlides/notesSlide3.xml><?xml version="1.0" encoding="utf-8"?>
+<p:notes xmlns:a="http://schemas.openxmlformats.org/drawingml/2006/main" xmlns:r="http://schemas.openxmlformats.org/officeDocument/2006/relationships" xmlns:p="http://schemas.openxmlformats.org/presentationml/2006/main">
+  <p:cSld>
+    <p:spTree>
+      <p:nvGrpSpPr>
+        <p:cNvPr id="1" name="">
+          <a:extLst>
+            <a:ext uri="{FF2B5EF4-FFF2-40B4-BE49-F238E27FC236}">
+              <a16:creationId xmlns:a16="http://schemas.microsoft.com/office/drawing/2014/main" id="{F666F7B6-62B0-F70C-C9DC-931F76FB56D7}"/>
+            </a:ext>
+          </a:extLst>
+        </p:cNvPr>
+        <p:cNvGrpSpPr/>
+        <p:nvPr/>
+      </p:nvGrpSpPr>
+      <p:grpSpPr>
+        <a:xfrm>
+          <a:off x="0" y="0"/>
+          <a:ext cx="0" cy="0"/>
+          <a:chOff x="0" y="0"/>
+          <a:chExt cx="0" cy="0"/>
+        </a:xfrm>
+      </p:grpSpPr>
+      <p:sp>
+        <p:nvSpPr>
+          <p:cNvPr id="2" name="Slide Image Placeholder 1">
+            <a:extLst>
+              <a:ext uri="{FF2B5EF4-FFF2-40B4-BE49-F238E27FC236}">
+                <a16:creationId xmlns:a16="http://schemas.microsoft.com/office/drawing/2014/main" id="{ED26656C-32F6-F130-2F3F-B89C353B3FE8}"/>
+              </a:ext>
+            </a:extLst>
+          </p:cNvPr>
+          <p:cNvSpPr>
+            <a:spLocks noGrp="1" noRot="1" noChangeAspect="1"/>
+          </p:cNvSpPr>
+          <p:nvPr>
+            <p:ph type="sldImg"/>
+          </p:nvPr>
+        </p:nvSpPr>
+        <p:spPr/>
+      </p:sp>
+      <p:sp>
+        <p:nvSpPr>
+          <p:cNvPr id="3" name="Notes Placeholder 2">
+            <a:extLst>
+              <a:ext uri="{FF2B5EF4-FFF2-40B4-BE49-F238E27FC236}">
+                <a16:creationId xmlns:a16="http://schemas.microsoft.com/office/drawing/2014/main" id="{0B246E78-4AD2-3FA7-7237-37FA0131980A}"/>
+              </a:ext>
+            </a:extLst>
+          </p:cNvPr>
+          <p:cNvSpPr>
+            <a:spLocks noGrp="1"/>
+          </p:cNvSpPr>
+          <p:nvPr>
+            <p:ph type="body" idx="1"/>
+          </p:nvPr>
+        </p:nvSpPr>
+        <p:spPr/>
+        <p:txBody>
+          <a:bodyPr/>
+          <a:lstStyle/>
+          <a:p>
+            <a:endParaRPr lang="en-US" b="0" i="0" u="none" strike="noStrike" dirty="0">
+              <a:solidFill>
+                <a:srgbClr val="212121"/>
+              </a:solidFill>
+              <a:effectLst/>
+              <a:latin typeface="Cambria" panose="02040503050406030204" pitchFamily="18" charset="0"/>
+            </a:endParaRPr>
+          </a:p>
+        </p:txBody>
+      </p:sp>
+      <p:sp>
+        <p:nvSpPr>
+          <p:cNvPr id="4" name="Slide Number Placeholder 3">
+            <a:extLst>
+              <a:ext uri="{FF2B5EF4-FFF2-40B4-BE49-F238E27FC236}">
+                <a16:creationId xmlns:a16="http://schemas.microsoft.com/office/drawing/2014/main" id="{540C448E-8787-FEF9-C64F-A6532A1516C8}"/>
+              </a:ext>
+            </a:extLst>
+          </p:cNvPr>
+          <p:cNvSpPr>
+            <a:spLocks noGrp="1"/>
+          </p:cNvSpPr>
+          <p:nvPr>
+            <p:ph type="sldNum" sz="quarter" idx="5"/>
+          </p:nvPr>
+        </p:nvSpPr>
+        <p:spPr/>
+        <p:txBody>
+          <a:bodyPr/>
+          <a:lstStyle/>
+          <a:p>
+            <a:fld id="{061BAA8C-FDC6-D345-B4E0-3B02449209FB}" type="slidenum">
+              <a:rPr lang="en-US" smtClean="0"/>
+              <a:t>3</a:t>
+            </a:fld>
+            <a:endParaRPr lang="en-US"/>
+          </a:p>
+        </p:txBody>
+      </p:sp>
+    </p:spTree>
+    <p:extLst>
+      <p:ext uri="{BB962C8B-B14F-4D97-AF65-F5344CB8AC3E}">
+        <p14:creationId xmlns:p14="http://schemas.microsoft.com/office/powerpoint/2010/main" val="3613947205"/>
+      </p:ext>
+    </p:extLst>
+  </p:cSld>
+  <p:clrMapOvr>
+    <a:masterClrMapping/>
+  </p:clrMapOvr>
+</p:notes>
+</file>
+
+<file path=ppt/notesSlides/notesSlide4.xml><?xml version="1.0" encoding="utf-8"?>
 <p:notes xmlns:a="http://schemas.openxmlformats.org/drawingml/2006/main" xmlns:r="http://schemas.openxmlformats.org/officeDocument/2006/relationships" xmlns:p="http://schemas.openxmlformats.org/presentationml/2006/main">
   <p:cSld>
     <p:spTree>
@@ -1967,13 +2278,33 @@
           <a:bodyPr/>
           <a:lstStyle/>
           <a:p>
-            <a:endParaRPr lang="en-US" b="0" dirty="0">
-              <a:solidFill>
-                <a:srgbClr val="CCCCCC"/>
-              </a:solidFill>
-              <a:effectLst/>
-              <a:latin typeface="Menlo" panose="020B0609030804020204" pitchFamily="49" charset="0"/>
-            </a:endParaRPr>
+            <a:pPr marL="0" marR="0" lvl="0" indent="0" algn="l" defTabSz="914400" rtl="0" eaLnBrk="1" fontAlgn="auto" latinLnBrk="0" hangingPunct="1">
+              <a:lnSpc>
+                <a:spcPct val="100000"/>
+              </a:lnSpc>
+              <a:spcBef>
+                <a:spcPts val="0"/>
+              </a:spcBef>
+              <a:spcAft>
+                <a:spcPts val="0"/>
+              </a:spcAft>
+              <a:buClrTx/>
+              <a:buSzTx/>
+              <a:buFontTx/>
+              <a:buNone/>
+              <a:tabLst/>
+              <a:defRPr/>
+            </a:pPr>
+            <a:r>
+              <a:rPr lang="en-US" b="0" dirty="0">
+                <a:solidFill>
+                  <a:srgbClr val="CCCCCC"/>
+                </a:solidFill>
+                <a:effectLst/>
+                <a:latin typeface="Menlo" panose="020B0609030804020204" pitchFamily="49" charset="0"/>
+              </a:rPr>
+              <a:t>LOGIT TRANSFORMED FREQS</a:t>
+            </a:r>
           </a:p>
         </p:txBody>
       </p:sp>
@@ -2000,7 +2331,7 @@
           <a:p>
             <a:fld id="{061BAA8C-FDC6-D345-B4E0-3B02449209FB}" type="slidenum">
               <a:rPr lang="en-US" smtClean="0"/>
-              <a:t>3</a:t>
+              <a:t>4</a:t>
             </a:fld>
             <a:endParaRPr lang="en-US"/>
           </a:p>
@@ -2019,7 +2350,7 @@
 </p:notes>
 </file>
 
-<file path=ppt/notesSlides/notesSlide4.xml><?xml version="1.0" encoding="utf-8"?>
+<file path=ppt/notesSlides/notesSlide5.xml><?xml version="1.0" encoding="utf-8"?>
 <p:notes xmlns:a="http://schemas.openxmlformats.org/drawingml/2006/main" xmlns:r="http://schemas.openxmlformats.org/officeDocument/2006/relationships" xmlns:p="http://schemas.openxmlformats.org/presentationml/2006/main">
   <p:cSld>
     <p:spTree>
@@ -2114,7 +2445,7 @@
           <a:p>
             <a:fld id="{061BAA8C-FDC6-D345-B4E0-3B02449209FB}" type="slidenum">
               <a:rPr lang="en-US" smtClean="0"/>
-              <a:t>4</a:t>
+              <a:t>5</a:t>
             </a:fld>
             <a:endParaRPr lang="en-US"/>
           </a:p>
@@ -2133,7 +2464,7 @@
 </p:notes>
 </file>
 
-<file path=ppt/notesSlides/notesSlide5.xml><?xml version="1.0" encoding="utf-8"?>
+<file path=ppt/notesSlides/notesSlide6.xml><?xml version="1.0" encoding="utf-8"?>
 <p:notes xmlns:a="http://schemas.openxmlformats.org/drawingml/2006/main" xmlns:r="http://schemas.openxmlformats.org/officeDocument/2006/relationships" xmlns:p="http://schemas.openxmlformats.org/presentationml/2006/main">
   <p:cSld>
     <p:spTree>
@@ -2231,7 +2562,7 @@
           <a:p>
             <a:fld id="{061BAA8C-FDC6-D345-B4E0-3B02449209FB}" type="slidenum">
               <a:rPr lang="en-US" smtClean="0"/>
-              <a:t>5</a:t>
+              <a:t>6</a:t>
             </a:fld>
             <a:endParaRPr lang="en-US"/>
           </a:p>
@@ -2250,7 +2581,7 @@
 </p:notes>
 </file>
 
-<file path=ppt/notesSlides/notesSlide6.xml><?xml version="1.0" encoding="utf-8"?>
+<file path=ppt/notesSlides/notesSlide7.xml><?xml version="1.0" encoding="utf-8"?>
 <p:notes xmlns:a="http://schemas.openxmlformats.org/drawingml/2006/main" xmlns:r="http://schemas.openxmlformats.org/officeDocument/2006/relationships" xmlns:p="http://schemas.openxmlformats.org/presentationml/2006/main">
   <p:cSld>
     <p:spTree>
@@ -2345,7 +2676,7 @@
           <a:p>
             <a:fld id="{061BAA8C-FDC6-D345-B4E0-3B02449209FB}" type="slidenum">
               <a:rPr lang="en-US" smtClean="0"/>
-              <a:t>6</a:t>
+              <a:t>7</a:t>
             </a:fld>
             <a:endParaRPr lang="en-US"/>
           </a:p>
@@ -2364,7 +2695,121 @@
 </p:notes>
 </file>
 
-<file path=ppt/notesSlides/notesSlide7.xml><?xml version="1.0" encoding="utf-8"?>
+<file path=ppt/notesSlides/notesSlide8.xml><?xml version="1.0" encoding="utf-8"?>
+<p:notes xmlns:a="http://schemas.openxmlformats.org/drawingml/2006/main" xmlns:r="http://schemas.openxmlformats.org/officeDocument/2006/relationships" xmlns:p="http://schemas.openxmlformats.org/presentationml/2006/main">
+  <p:cSld>
+    <p:spTree>
+      <p:nvGrpSpPr>
+        <p:cNvPr id="1" name="">
+          <a:extLst>
+            <a:ext uri="{FF2B5EF4-FFF2-40B4-BE49-F238E27FC236}">
+              <a16:creationId xmlns:a16="http://schemas.microsoft.com/office/drawing/2014/main" id="{1A615A9B-FCEE-6F7D-9622-145DAC34BE0D}"/>
+            </a:ext>
+          </a:extLst>
+        </p:cNvPr>
+        <p:cNvGrpSpPr/>
+        <p:nvPr/>
+      </p:nvGrpSpPr>
+      <p:grpSpPr>
+        <a:xfrm>
+          <a:off x="0" y="0"/>
+          <a:ext cx="0" cy="0"/>
+          <a:chOff x="0" y="0"/>
+          <a:chExt cx="0" cy="0"/>
+        </a:xfrm>
+      </p:grpSpPr>
+      <p:sp>
+        <p:nvSpPr>
+          <p:cNvPr id="2" name="Slide Image Placeholder 1">
+            <a:extLst>
+              <a:ext uri="{FF2B5EF4-FFF2-40B4-BE49-F238E27FC236}">
+                <a16:creationId xmlns:a16="http://schemas.microsoft.com/office/drawing/2014/main" id="{F88C4DD4-92A1-2BD9-9D66-AE40E8E54748}"/>
+              </a:ext>
+            </a:extLst>
+          </p:cNvPr>
+          <p:cNvSpPr>
+            <a:spLocks noGrp="1" noRot="1" noChangeAspect="1"/>
+          </p:cNvSpPr>
+          <p:nvPr>
+            <p:ph type="sldImg"/>
+          </p:nvPr>
+        </p:nvSpPr>
+        <p:spPr/>
+      </p:sp>
+      <p:sp>
+        <p:nvSpPr>
+          <p:cNvPr id="3" name="Notes Placeholder 2">
+            <a:extLst>
+              <a:ext uri="{FF2B5EF4-FFF2-40B4-BE49-F238E27FC236}">
+                <a16:creationId xmlns:a16="http://schemas.microsoft.com/office/drawing/2014/main" id="{8F6F45D9-2262-CE49-7AAF-99DB701077C6}"/>
+              </a:ext>
+            </a:extLst>
+          </p:cNvPr>
+          <p:cNvSpPr>
+            <a:spLocks noGrp="1"/>
+          </p:cNvSpPr>
+          <p:nvPr>
+            <p:ph type="body" idx="1"/>
+          </p:nvPr>
+        </p:nvSpPr>
+        <p:spPr/>
+        <p:txBody>
+          <a:bodyPr/>
+          <a:lstStyle/>
+          <a:p>
+            <a:endParaRPr lang="en-US" b="0" dirty="0">
+              <a:solidFill>
+                <a:srgbClr val="CCCCCC"/>
+              </a:solidFill>
+              <a:effectLst/>
+              <a:latin typeface="Menlo" panose="020B0609030804020204" pitchFamily="49" charset="0"/>
+            </a:endParaRPr>
+          </a:p>
+        </p:txBody>
+      </p:sp>
+      <p:sp>
+        <p:nvSpPr>
+          <p:cNvPr id="4" name="Slide Number Placeholder 3">
+            <a:extLst>
+              <a:ext uri="{FF2B5EF4-FFF2-40B4-BE49-F238E27FC236}">
+                <a16:creationId xmlns:a16="http://schemas.microsoft.com/office/drawing/2014/main" id="{28F708A8-1A74-B964-5810-DE42CC8DD556}"/>
+              </a:ext>
+            </a:extLst>
+          </p:cNvPr>
+          <p:cNvSpPr>
+            <a:spLocks noGrp="1"/>
+          </p:cNvSpPr>
+          <p:nvPr>
+            <p:ph type="sldNum" sz="quarter" idx="5"/>
+          </p:nvPr>
+        </p:nvSpPr>
+        <p:spPr/>
+        <p:txBody>
+          <a:bodyPr/>
+          <a:lstStyle/>
+          <a:p>
+            <a:fld id="{061BAA8C-FDC6-D345-B4E0-3B02449209FB}" type="slidenum">
+              <a:rPr lang="en-US" smtClean="0"/>
+              <a:t>8</a:t>
+            </a:fld>
+            <a:endParaRPr lang="en-US"/>
+          </a:p>
+        </p:txBody>
+      </p:sp>
+    </p:spTree>
+    <p:extLst>
+      <p:ext uri="{BB962C8B-B14F-4D97-AF65-F5344CB8AC3E}">
+        <p14:creationId xmlns:p14="http://schemas.microsoft.com/office/powerpoint/2010/main" val="1387096064"/>
+      </p:ext>
+    </p:extLst>
+  </p:cSld>
+  <p:clrMapOvr>
+    <a:masterClrMapping/>
+  </p:clrMapOvr>
+</p:notes>
+</file>
+
+<file path=ppt/notesSlides/notesSlide9.xml><?xml version="1.0" encoding="utf-8"?>
 <p:notes xmlns:a="http://schemas.openxmlformats.org/drawingml/2006/main" xmlns:r="http://schemas.openxmlformats.org/officeDocument/2006/relationships" xmlns:p="http://schemas.openxmlformats.org/presentationml/2006/main">
   <p:cSld>
     <p:spTree>
@@ -2459,7 +2904,7 @@
           <a:p>
             <a:fld id="{061BAA8C-FDC6-D345-B4E0-3B02449209FB}" type="slidenum">
               <a:rPr lang="en-US" smtClean="0"/>
-              <a:t>7</a:t>
+              <a:t>9</a:t>
             </a:fld>
             <a:endParaRPr lang="en-US"/>
           </a:p>
@@ -2469,180 +2914,6 @@
     <p:extLst>
       <p:ext uri="{BB962C8B-B14F-4D97-AF65-F5344CB8AC3E}">
         <p14:creationId xmlns:p14="http://schemas.microsoft.com/office/powerpoint/2010/main" val="1028389668"/>
-      </p:ext>
-    </p:extLst>
-  </p:cSld>
-  <p:clrMapOvr>
-    <a:masterClrMapping/>
-  </p:clrMapOvr>
-</p:notes>
-</file>
-
-<file path=ppt/notesSlides/notesSlide8.xml><?xml version="1.0" encoding="utf-8"?>
-<p:notes xmlns:a="http://schemas.openxmlformats.org/drawingml/2006/main" xmlns:r="http://schemas.openxmlformats.org/officeDocument/2006/relationships" xmlns:p="http://schemas.openxmlformats.org/presentationml/2006/main">
-  <p:cSld>
-    <p:spTree>
-      <p:nvGrpSpPr>
-        <p:cNvPr id="1" name=""/>
-        <p:cNvGrpSpPr/>
-        <p:nvPr/>
-      </p:nvGrpSpPr>
-      <p:grpSpPr>
-        <a:xfrm>
-          <a:off x="0" y="0"/>
-          <a:ext cx="0" cy="0"/>
-          <a:chOff x="0" y="0"/>
-          <a:chExt cx="0" cy="0"/>
-        </a:xfrm>
-      </p:grpSpPr>
-      <p:sp>
-        <p:nvSpPr>
-          <p:cNvPr id="2" name="Slide Image Placeholder 1"/>
-          <p:cNvSpPr>
-            <a:spLocks noGrp="1" noRot="1" noChangeAspect="1"/>
-          </p:cNvSpPr>
-          <p:nvPr>
-            <p:ph type="sldImg"/>
-          </p:nvPr>
-        </p:nvSpPr>
-        <p:spPr/>
-      </p:sp>
-      <p:sp>
-        <p:nvSpPr>
-          <p:cNvPr id="3" name="Notes Placeholder 2"/>
-          <p:cNvSpPr>
-            <a:spLocks noGrp="1"/>
-          </p:cNvSpPr>
-          <p:nvPr>
-            <p:ph type="body" idx="1"/>
-          </p:nvPr>
-        </p:nvSpPr>
-        <p:spPr/>
-        <p:txBody>
-          <a:bodyPr/>
-          <a:lstStyle/>
-          <a:p>
-            <a:endParaRPr lang="en-US" dirty="0"/>
-          </a:p>
-        </p:txBody>
-      </p:sp>
-      <p:sp>
-        <p:nvSpPr>
-          <p:cNvPr id="4" name="Slide Number Placeholder 3"/>
-          <p:cNvSpPr>
-            <a:spLocks noGrp="1"/>
-          </p:cNvSpPr>
-          <p:nvPr>
-            <p:ph type="sldNum" sz="quarter" idx="5"/>
-          </p:nvPr>
-        </p:nvSpPr>
-        <p:spPr/>
-        <p:txBody>
-          <a:bodyPr/>
-          <a:lstStyle/>
-          <a:p>
-            <a:fld id="{061BAA8C-FDC6-D345-B4E0-3B02449209FB}" type="slidenum">
-              <a:rPr lang="en-US" smtClean="0"/>
-              <a:t>8</a:t>
-            </a:fld>
-            <a:endParaRPr lang="en-US"/>
-          </a:p>
-        </p:txBody>
-      </p:sp>
-    </p:spTree>
-    <p:extLst>
-      <p:ext uri="{BB962C8B-B14F-4D97-AF65-F5344CB8AC3E}">
-        <p14:creationId xmlns:p14="http://schemas.microsoft.com/office/powerpoint/2010/main" val="3703388347"/>
-      </p:ext>
-    </p:extLst>
-  </p:cSld>
-  <p:clrMapOvr>
-    <a:masterClrMapping/>
-  </p:clrMapOvr>
-</p:notes>
-</file>
-
-<file path=ppt/notesSlides/notesSlide9.xml><?xml version="1.0" encoding="utf-8"?>
-<p:notes xmlns:a="http://schemas.openxmlformats.org/drawingml/2006/main" xmlns:r="http://schemas.openxmlformats.org/officeDocument/2006/relationships" xmlns:p="http://schemas.openxmlformats.org/presentationml/2006/main">
-  <p:cSld>
-    <p:spTree>
-      <p:nvGrpSpPr>
-        <p:cNvPr id="1" name=""/>
-        <p:cNvGrpSpPr/>
-        <p:nvPr/>
-      </p:nvGrpSpPr>
-      <p:grpSpPr>
-        <a:xfrm>
-          <a:off x="0" y="0"/>
-          <a:ext cx="0" cy="0"/>
-          <a:chOff x="0" y="0"/>
-          <a:chExt cx="0" cy="0"/>
-        </a:xfrm>
-      </p:grpSpPr>
-      <p:sp>
-        <p:nvSpPr>
-          <p:cNvPr id="2" name="Slide Image Placeholder 1"/>
-          <p:cNvSpPr>
-            <a:spLocks noGrp="1" noRot="1" noChangeAspect="1"/>
-          </p:cNvSpPr>
-          <p:nvPr>
-            <p:ph type="sldImg"/>
-          </p:nvPr>
-        </p:nvSpPr>
-        <p:spPr/>
-      </p:sp>
-      <p:sp>
-        <p:nvSpPr>
-          <p:cNvPr id="3" name="Notes Placeholder 2"/>
-          <p:cNvSpPr>
-            <a:spLocks noGrp="1"/>
-          </p:cNvSpPr>
-          <p:nvPr>
-            <p:ph type="body" idx="1"/>
-          </p:nvPr>
-        </p:nvSpPr>
-        <p:spPr/>
-        <p:txBody>
-          <a:bodyPr/>
-          <a:lstStyle/>
-          <a:p>
-            <a:endParaRPr lang="en-US" b="0" i="0" u="none" strike="noStrike" dirty="0">
-              <a:solidFill>
-                <a:srgbClr val="212121"/>
-              </a:solidFill>
-              <a:effectLst/>
-              <a:latin typeface="Cambria" panose="02040503050406030204" pitchFamily="18" charset="0"/>
-            </a:endParaRPr>
-          </a:p>
-        </p:txBody>
-      </p:sp>
-      <p:sp>
-        <p:nvSpPr>
-          <p:cNvPr id="4" name="Slide Number Placeholder 3"/>
-          <p:cNvSpPr>
-            <a:spLocks noGrp="1"/>
-          </p:cNvSpPr>
-          <p:nvPr>
-            <p:ph type="sldNum" sz="quarter" idx="5"/>
-          </p:nvPr>
-        </p:nvSpPr>
-        <p:spPr/>
-        <p:txBody>
-          <a:bodyPr/>
-          <a:lstStyle/>
-          <a:p>
-            <a:fld id="{061BAA8C-FDC6-D345-B4E0-3B02449209FB}" type="slidenum">
-              <a:rPr lang="en-US" smtClean="0"/>
-              <a:t>9</a:t>
-            </a:fld>
-            <a:endParaRPr lang="en-US"/>
-          </a:p>
-        </p:txBody>
-      </p:sp>
-    </p:spTree>
-    <p:extLst>
-      <p:ext uri="{BB962C8B-B14F-4D97-AF65-F5344CB8AC3E}">
-        <p14:creationId xmlns:p14="http://schemas.microsoft.com/office/powerpoint/2010/main" val="605091724"/>
       </p:ext>
     </p:extLst>
   </p:cSld>
@@ -2799,7 +3070,7 @@
           <a:p>
             <a:fld id="{80FC6068-BAFB-FC44-B9D8-F4B3BB105DE6}" type="datetimeFigureOut">
               <a:rPr lang="en-US" smtClean="0"/>
-              <a:t>9/23/24</a:t>
+              <a:t>9/24/24</a:t>
             </a:fld>
             <a:endParaRPr lang="en-US"/>
           </a:p>
@@ -2997,7 +3268,7 @@
           <a:p>
             <a:fld id="{80FC6068-BAFB-FC44-B9D8-F4B3BB105DE6}" type="datetimeFigureOut">
               <a:rPr lang="en-US" smtClean="0"/>
-              <a:t>9/23/24</a:t>
+              <a:t>9/24/24</a:t>
             </a:fld>
             <a:endParaRPr lang="en-US"/>
           </a:p>
@@ -3205,7 +3476,7 @@
           <a:p>
             <a:fld id="{80FC6068-BAFB-FC44-B9D8-F4B3BB105DE6}" type="datetimeFigureOut">
               <a:rPr lang="en-US" smtClean="0"/>
-              <a:t>9/23/24</a:t>
+              <a:t>9/24/24</a:t>
             </a:fld>
             <a:endParaRPr lang="en-US"/>
           </a:p>
@@ -3409,7 +3680,7 @@
           <a:p>
             <a:fld id="{80FC6068-BAFB-FC44-B9D8-F4B3BB105DE6}" type="datetimeFigureOut">
               <a:rPr lang="en-US" smtClean="0"/>
-              <a:t>9/23/24</a:t>
+              <a:t>9/24/24</a:t>
             </a:fld>
             <a:endParaRPr lang="en-US"/>
           </a:p>
@@ -3700,7 +3971,7 @@
           <a:p>
             <a:fld id="{80FC6068-BAFB-FC44-B9D8-F4B3BB105DE6}" type="datetimeFigureOut">
               <a:rPr lang="en-US" smtClean="0"/>
-              <a:t>9/23/24</a:t>
+              <a:t>9/24/24</a:t>
             </a:fld>
             <a:endParaRPr lang="en-US"/>
           </a:p>
@@ -3965,7 +4236,7 @@
           <a:p>
             <a:fld id="{80FC6068-BAFB-FC44-B9D8-F4B3BB105DE6}" type="datetimeFigureOut">
               <a:rPr lang="en-US" smtClean="0"/>
-              <a:t>9/23/24</a:t>
+              <a:t>9/24/24</a:t>
             </a:fld>
             <a:endParaRPr lang="en-US"/>
           </a:p>
@@ -4377,7 +4648,7 @@
           <a:p>
             <a:fld id="{80FC6068-BAFB-FC44-B9D8-F4B3BB105DE6}" type="datetimeFigureOut">
               <a:rPr lang="en-US" smtClean="0"/>
-              <a:t>9/23/24</a:t>
+              <a:t>9/24/24</a:t>
             </a:fld>
             <a:endParaRPr lang="en-US"/>
           </a:p>
@@ -4518,7 +4789,7 @@
           <a:p>
             <a:fld id="{80FC6068-BAFB-FC44-B9D8-F4B3BB105DE6}" type="datetimeFigureOut">
               <a:rPr lang="en-US" smtClean="0"/>
-              <a:t>9/23/24</a:t>
+              <a:t>9/24/24</a:t>
             </a:fld>
             <a:endParaRPr lang="en-US"/>
           </a:p>
@@ -4631,7 +4902,7 @@
           <a:p>
             <a:fld id="{80FC6068-BAFB-FC44-B9D8-F4B3BB105DE6}" type="datetimeFigureOut">
               <a:rPr lang="en-US" smtClean="0"/>
-              <a:t>9/23/24</a:t>
+              <a:t>9/24/24</a:t>
             </a:fld>
             <a:endParaRPr lang="en-US"/>
           </a:p>
@@ -4942,7 +5213,7 @@
           <a:p>
             <a:fld id="{80FC6068-BAFB-FC44-B9D8-F4B3BB105DE6}" type="datetimeFigureOut">
               <a:rPr lang="en-US" smtClean="0"/>
-              <a:t>9/23/24</a:t>
+              <a:t>9/24/24</a:t>
             </a:fld>
             <a:endParaRPr lang="en-US"/>
           </a:p>
@@ -5230,7 +5501,7 @@
           <a:p>
             <a:fld id="{80FC6068-BAFB-FC44-B9D8-F4B3BB105DE6}" type="datetimeFigureOut">
               <a:rPr lang="en-US" smtClean="0"/>
-              <a:t>9/23/24</a:t>
+              <a:t>9/24/24</a:t>
             </a:fld>
             <a:endParaRPr lang="en-US"/>
           </a:p>
@@ -5471,7 +5742,7 @@
           <a:p>
             <a:fld id="{80FC6068-BAFB-FC44-B9D8-F4B3BB105DE6}" type="datetimeFigureOut">
               <a:rPr lang="en-US" smtClean="0"/>
-              <a:t>9/23/24</a:t>
+              <a:t>9/24/24</a:t>
             </a:fld>
             <a:endParaRPr lang="en-US"/>
           </a:p>
@@ -5993,6 +6264,238 @@
 </p:sld>
 </file>
 
+<file path=ppt/slides/slide10.xml><?xml version="1.0" encoding="utf-8"?>
+<p:sld xmlns:a="http://schemas.openxmlformats.org/drawingml/2006/main" xmlns:r="http://schemas.openxmlformats.org/officeDocument/2006/relationships" xmlns:p="http://schemas.openxmlformats.org/presentationml/2006/main">
+  <p:cSld>
+    <p:spTree>
+      <p:nvGrpSpPr>
+        <p:cNvPr id="1" name=""/>
+        <p:cNvGrpSpPr/>
+        <p:nvPr/>
+      </p:nvGrpSpPr>
+      <p:grpSpPr>
+        <a:xfrm>
+          <a:off x="0" y="0"/>
+          <a:ext cx="0" cy="0"/>
+          <a:chOff x="0" y="0"/>
+          <a:chExt cx="0" cy="0"/>
+        </a:xfrm>
+      </p:grpSpPr>
+      <p:sp>
+        <p:nvSpPr>
+          <p:cNvPr id="2" name="Title 1">
+            <a:extLst>
+              <a:ext uri="{FF2B5EF4-FFF2-40B4-BE49-F238E27FC236}">
+                <a16:creationId xmlns:a16="http://schemas.microsoft.com/office/drawing/2014/main" id="{70A4C97D-8F21-3D3B-6A90-EA7145324964}"/>
+              </a:ext>
+            </a:extLst>
+          </p:cNvPr>
+          <p:cNvSpPr>
+            <a:spLocks noGrp="1"/>
+          </p:cNvSpPr>
+          <p:nvPr>
+            <p:ph type="title"/>
+          </p:nvPr>
+        </p:nvSpPr>
+        <p:spPr>
+          <a:xfrm>
+            <a:off x="838200" y="593725"/>
+            <a:ext cx="10515600" cy="1325563"/>
+          </a:xfrm>
+        </p:spPr>
+        <p:txBody>
+          <a:bodyPr>
+            <a:normAutofit/>
+          </a:bodyPr>
+          <a:lstStyle/>
+          <a:p>
+            <a:r>
+              <a:rPr lang="en-US" dirty="0"/>
+              <a:t>Next steps</a:t>
+            </a:r>
+          </a:p>
+        </p:txBody>
+      </p:sp>
+      <p:sp>
+        <p:nvSpPr>
+          <p:cNvPr id="3" name="Content Placeholder 2">
+            <a:extLst>
+              <a:ext uri="{FF2B5EF4-FFF2-40B4-BE49-F238E27FC236}">
+                <a16:creationId xmlns:a16="http://schemas.microsoft.com/office/drawing/2014/main" id="{B9501834-7B32-1ACA-4358-B630FB8EEC36}"/>
+              </a:ext>
+            </a:extLst>
+          </p:cNvPr>
+          <p:cNvSpPr>
+            <a:spLocks noGrp="1"/>
+          </p:cNvSpPr>
+          <p:nvPr>
+            <p:ph idx="1"/>
+          </p:nvPr>
+        </p:nvSpPr>
+        <p:spPr>
+          <a:xfrm>
+            <a:off x="838199" y="1919289"/>
+            <a:ext cx="10384857" cy="4623402"/>
+          </a:xfrm>
+        </p:spPr>
+        <p:txBody>
+          <a:bodyPr>
+            <a:normAutofit/>
+          </a:bodyPr>
+          <a:lstStyle/>
+          <a:p>
+            <a:endParaRPr lang="en-US" dirty="0"/>
+          </a:p>
+        </p:txBody>
+      </p:sp>
+    </p:spTree>
+    <p:extLst>
+      <p:ext uri="{BB962C8B-B14F-4D97-AF65-F5344CB8AC3E}">
+        <p14:creationId xmlns:p14="http://schemas.microsoft.com/office/powerpoint/2010/main" val="4091688872"/>
+      </p:ext>
+    </p:extLst>
+  </p:cSld>
+  <p:clrMapOvr>
+    <a:masterClrMapping/>
+  </p:clrMapOvr>
+</p:sld>
+</file>
+
+<file path=ppt/slides/slide11.xml><?xml version="1.0" encoding="utf-8"?>
+<p:sld xmlns:a="http://schemas.openxmlformats.org/drawingml/2006/main" xmlns:r="http://schemas.openxmlformats.org/officeDocument/2006/relationships" xmlns:p="http://schemas.openxmlformats.org/presentationml/2006/main">
+  <p:cSld>
+    <p:spTree>
+      <p:nvGrpSpPr>
+        <p:cNvPr id="1" name=""/>
+        <p:cNvGrpSpPr/>
+        <p:nvPr/>
+      </p:nvGrpSpPr>
+      <p:grpSpPr>
+        <a:xfrm>
+          <a:off x="0" y="0"/>
+          <a:ext cx="0" cy="0"/>
+          <a:chOff x="0" y="0"/>
+          <a:chExt cx="0" cy="0"/>
+        </a:xfrm>
+      </p:grpSpPr>
+      <p:pic>
+        <p:nvPicPr>
+          <p:cNvPr id="6" name="Picture 5">
+            <a:extLst>
+              <a:ext uri="{FF2B5EF4-FFF2-40B4-BE49-F238E27FC236}">
+                <a16:creationId xmlns:a16="http://schemas.microsoft.com/office/drawing/2014/main" id="{E21F8D95-5379-5DDA-F135-1A690381F6C0}"/>
+              </a:ext>
+            </a:extLst>
+          </p:cNvPr>
+          <p:cNvPicPr>
+            <a:picLocks noChangeAspect="1"/>
+          </p:cNvPicPr>
+          <p:nvPr/>
+        </p:nvPicPr>
+        <p:blipFill>
+          <a:blip r:embed="rId3"/>
+          <a:stretch>
+            <a:fillRect/>
+          </a:stretch>
+        </p:blipFill>
+        <p:spPr>
+          <a:xfrm>
+            <a:off x="0" y="4527042"/>
+            <a:ext cx="8664498" cy="2322530"/>
+          </a:xfrm>
+          <a:prstGeom prst="rect">
+            <a:avLst/>
+          </a:prstGeom>
+        </p:spPr>
+      </p:pic>
+      <p:sp>
+        <p:nvSpPr>
+          <p:cNvPr id="2" name="Title 1">
+            <a:extLst>
+              <a:ext uri="{FF2B5EF4-FFF2-40B4-BE49-F238E27FC236}">
+                <a16:creationId xmlns:a16="http://schemas.microsoft.com/office/drawing/2014/main" id="{70A4C97D-8F21-3D3B-6A90-EA7145324964}"/>
+              </a:ext>
+            </a:extLst>
+          </p:cNvPr>
+          <p:cNvSpPr>
+            <a:spLocks noGrp="1"/>
+          </p:cNvSpPr>
+          <p:nvPr>
+            <p:ph type="title"/>
+          </p:nvPr>
+        </p:nvSpPr>
+        <p:spPr>
+          <a:xfrm>
+            <a:off x="838200" y="593725"/>
+            <a:ext cx="10515600" cy="1325563"/>
+          </a:xfrm>
+        </p:spPr>
+        <p:txBody>
+          <a:bodyPr>
+            <a:normAutofit/>
+          </a:bodyPr>
+          <a:lstStyle/>
+          <a:p>
+            <a:r>
+              <a:rPr lang="en-US" dirty="0"/>
+              <a:t>Acknowledgements</a:t>
+            </a:r>
+          </a:p>
+        </p:txBody>
+      </p:sp>
+      <p:sp>
+        <p:nvSpPr>
+          <p:cNvPr id="3" name="Content Placeholder 2">
+            <a:extLst>
+              <a:ext uri="{FF2B5EF4-FFF2-40B4-BE49-F238E27FC236}">
+                <a16:creationId xmlns:a16="http://schemas.microsoft.com/office/drawing/2014/main" id="{B9501834-7B32-1ACA-4358-B630FB8EEC36}"/>
+              </a:ext>
+            </a:extLst>
+          </p:cNvPr>
+          <p:cNvSpPr>
+            <a:spLocks noGrp="1"/>
+          </p:cNvSpPr>
+          <p:nvPr>
+            <p:ph idx="1"/>
+          </p:nvPr>
+        </p:nvSpPr>
+        <p:spPr>
+          <a:xfrm>
+            <a:off x="838200" y="1919289"/>
+            <a:ext cx="10515600" cy="4623402"/>
+          </a:xfrm>
+        </p:spPr>
+        <p:txBody>
+          <a:bodyPr numCol="2">
+            <a:normAutofit/>
+          </a:bodyPr>
+          <a:lstStyle/>
+          <a:p>
+            <a:r>
+              <a:rPr lang="en-US" dirty="0"/>
+              <a:t>Holly </a:t>
+            </a:r>
+            <a:r>
+              <a:rPr lang="en-US" dirty="0" err="1"/>
+              <a:t>Akilesh</a:t>
+            </a:r>
+            <a:endParaRPr lang="en-US" dirty="0"/>
+          </a:p>
+        </p:txBody>
+      </p:sp>
+    </p:spTree>
+    <p:extLst>
+      <p:ext uri="{BB962C8B-B14F-4D97-AF65-F5344CB8AC3E}">
+        <p14:creationId xmlns:p14="http://schemas.microsoft.com/office/powerpoint/2010/main" val="2018884985"/>
+      </p:ext>
+    </p:extLst>
+  </p:cSld>
+  <p:clrMapOvr>
+    <a:masterClrMapping/>
+  </p:clrMapOvr>
+</p:sld>
+</file>
+
 <file path=ppt/slides/slide2.xml><?xml version="1.0" encoding="utf-8"?>
 <p:sld xmlns:a="http://schemas.openxmlformats.org/drawingml/2006/main" xmlns:r="http://schemas.openxmlformats.org/officeDocument/2006/relationships" xmlns:p="http://schemas.openxmlformats.org/presentationml/2006/main">
   <p:cSld>
@@ -6046,17 +6549,17 @@
           <a:p>
             <a:r>
               <a:rPr lang="en-US" dirty="0"/>
-              <a:t>Baseline immunotypes are somewhat distinct by group</a:t>
+              <a:t>Baseline immunotypes are not distinct by group</a:t>
             </a:r>
           </a:p>
         </p:txBody>
       </p:sp>
       <p:pic>
         <p:nvPicPr>
-          <p:cNvPr id="4" name="Picture 3">
-            <a:extLst>
-              <a:ext uri="{FF2B5EF4-FFF2-40B4-BE49-F238E27FC236}">
-                <a16:creationId xmlns:a16="http://schemas.microsoft.com/office/drawing/2014/main" id="{EA42346D-20DE-98E7-2375-20C8629428A4}"/>
+          <p:cNvPr id="3" name="Picture 2">
+            <a:extLst>
+              <a:ext uri="{FF2B5EF4-FFF2-40B4-BE49-F238E27FC236}">
+                <a16:creationId xmlns:a16="http://schemas.microsoft.com/office/drawing/2014/main" id="{6FC95C29-1EB2-BDF7-AF8F-F74CA31A1429}"/>
               </a:ext>
             </a:extLst>
           </p:cNvPr>
@@ -6073,8 +6576,8 @@
         </p:blipFill>
         <p:spPr>
           <a:xfrm>
-            <a:off x="3238395" y="1530849"/>
-            <a:ext cx="4588561" cy="5327151"/>
+            <a:off x="3394841" y="1535126"/>
+            <a:ext cx="4519635" cy="5322874"/>
           </a:xfrm>
           <a:prstGeom prst="rect">
             <a:avLst/>
@@ -6102,6 +6605,107 @@
         <p:cNvPr id="1" name="">
           <a:extLst>
             <a:ext uri="{FF2B5EF4-FFF2-40B4-BE49-F238E27FC236}">
+              <a16:creationId xmlns:a16="http://schemas.microsoft.com/office/drawing/2014/main" id="{4E13CED7-4737-19B6-F4E2-01288DB1C176}"/>
+            </a:ext>
+          </a:extLst>
+        </p:cNvPr>
+        <p:cNvGrpSpPr/>
+        <p:nvPr/>
+      </p:nvGrpSpPr>
+      <p:grpSpPr>
+        <a:xfrm>
+          <a:off x="0" y="0"/>
+          <a:ext cx="0" cy="0"/>
+          <a:chOff x="0" y="0"/>
+          <a:chExt cx="0" cy="0"/>
+        </a:xfrm>
+      </p:grpSpPr>
+      <p:sp>
+        <p:nvSpPr>
+          <p:cNvPr id="2" name="Title 1">
+            <a:extLst>
+              <a:ext uri="{FF2B5EF4-FFF2-40B4-BE49-F238E27FC236}">
+                <a16:creationId xmlns:a16="http://schemas.microsoft.com/office/drawing/2014/main" id="{9D4E28D0-7EE4-DB72-EED9-085B4EC8A1EC}"/>
+              </a:ext>
+            </a:extLst>
+          </p:cNvPr>
+          <p:cNvSpPr>
+            <a:spLocks noGrp="1"/>
+          </p:cNvSpPr>
+          <p:nvPr>
+            <p:ph type="title"/>
+          </p:nvPr>
+        </p:nvSpPr>
+        <p:spPr>
+          <a:xfrm>
+            <a:off x="838200" y="593725"/>
+            <a:ext cx="10515600" cy="1325563"/>
+          </a:xfrm>
+        </p:spPr>
+        <p:txBody>
+          <a:bodyPr>
+            <a:normAutofit/>
+          </a:bodyPr>
+          <a:lstStyle/>
+          <a:p>
+            <a:r>
+              <a:rPr lang="en-US" dirty="0"/>
+              <a:t>ICA doesn’t appear better at distinguishing unique immunotypes by group than PCA (baseline data)</a:t>
+            </a:r>
+          </a:p>
+        </p:txBody>
+      </p:sp>
+      <p:pic>
+        <p:nvPicPr>
+          <p:cNvPr id="8" name="Picture 7">
+            <a:extLst>
+              <a:ext uri="{FF2B5EF4-FFF2-40B4-BE49-F238E27FC236}">
+                <a16:creationId xmlns:a16="http://schemas.microsoft.com/office/drawing/2014/main" id="{DB2E070D-6739-1D73-1C94-F7D293ED2D40}"/>
+              </a:ext>
+            </a:extLst>
+          </p:cNvPr>
+          <p:cNvPicPr>
+            <a:picLocks noChangeAspect="1"/>
+          </p:cNvPicPr>
+          <p:nvPr/>
+        </p:nvPicPr>
+        <p:blipFill>
+          <a:blip r:embed="rId3"/>
+          <a:stretch>
+            <a:fillRect/>
+          </a:stretch>
+        </p:blipFill>
+        <p:spPr>
+          <a:xfrm>
+            <a:off x="2075047" y="1919288"/>
+            <a:ext cx="7772400" cy="4919524"/>
+          </a:xfrm>
+          <a:prstGeom prst="rect">
+            <a:avLst/>
+          </a:prstGeom>
+        </p:spPr>
+      </p:pic>
+    </p:spTree>
+    <p:extLst>
+      <p:ext uri="{BB962C8B-B14F-4D97-AF65-F5344CB8AC3E}">
+        <p14:creationId xmlns:p14="http://schemas.microsoft.com/office/powerpoint/2010/main" val="21908112"/>
+      </p:ext>
+    </p:extLst>
+  </p:cSld>
+  <p:clrMapOvr>
+    <a:masterClrMapping/>
+  </p:clrMapOvr>
+</p:sld>
+</file>
+
+<file path=ppt/slides/slide4.xml><?xml version="1.0" encoding="utf-8"?>
+<p:sld xmlns:a="http://schemas.openxmlformats.org/drawingml/2006/main" xmlns:r="http://schemas.openxmlformats.org/officeDocument/2006/relationships" xmlns:p="http://schemas.openxmlformats.org/presentationml/2006/main">
+  <p:cSld>
+    <p:spTree>
+      <p:nvGrpSpPr>
+        <p:cNvPr id="1" name="">
+          <a:extLst>
+            <a:ext uri="{FF2B5EF4-FFF2-40B4-BE49-F238E27FC236}">
               <a16:creationId xmlns:a16="http://schemas.microsoft.com/office/drawing/2014/main" id="{17D769D9-0D87-68BD-22F3-2937DBD7745F}"/>
             </a:ext>
           </a:extLst>
@@ -6147,17 +6751,17 @@
           <a:p>
             <a:r>
               <a:rPr lang="en-US" dirty="0"/>
-              <a:t>RA and T1D immunotypes are somewhat distinct</a:t>
+              <a:t>AID subgroup immunotypes are not very distinct either</a:t>
             </a:r>
           </a:p>
         </p:txBody>
       </p:sp>
       <p:pic>
         <p:nvPicPr>
-          <p:cNvPr id="3" name="Picture 2">
-            <a:extLst>
-              <a:ext uri="{FF2B5EF4-FFF2-40B4-BE49-F238E27FC236}">
-                <a16:creationId xmlns:a16="http://schemas.microsoft.com/office/drawing/2014/main" id="{86C87453-6DF8-72FD-0D2F-025513F28D5F}"/>
+          <p:cNvPr id="4" name="Picture 3">
+            <a:extLst>
+              <a:ext uri="{FF2B5EF4-FFF2-40B4-BE49-F238E27FC236}">
+                <a16:creationId xmlns:a16="http://schemas.microsoft.com/office/drawing/2014/main" id="{CFD5CAB1-8519-2D73-EF19-4B2049FA8279}"/>
               </a:ext>
             </a:extLst>
           </p:cNvPr>
@@ -6174,8 +6778,8 @@
         </p:blipFill>
         <p:spPr>
           <a:xfrm>
-            <a:off x="3601909" y="1732547"/>
-            <a:ext cx="4557106" cy="5125453"/>
+            <a:off x="3659345" y="1597572"/>
+            <a:ext cx="4523331" cy="5260428"/>
           </a:xfrm>
           <a:prstGeom prst="rect">
             <a:avLst/>
@@ -6195,7 +6799,7 @@
 </p:sld>
 </file>
 
-<file path=ppt/slides/slide4.xml><?xml version="1.0" encoding="utf-8"?>
+<file path=ppt/slides/slide5.xml><?xml version="1.0" encoding="utf-8"?>
 <p:sld xmlns:a="http://schemas.openxmlformats.org/drawingml/2006/main" xmlns:r="http://schemas.openxmlformats.org/officeDocument/2006/relationships" xmlns:p="http://schemas.openxmlformats.org/presentationml/2006/main">
   <p:cSld>
     <p:spTree>
@@ -6236,8 +6840,8 @@
         </p:nvSpPr>
         <p:spPr>
           <a:xfrm>
-            <a:off x="838200" y="593725"/>
-            <a:ext cx="6072739" cy="1325563"/>
+            <a:off x="838201" y="593725"/>
+            <a:ext cx="5257800" cy="1648732"/>
           </a:xfrm>
         </p:spPr>
         <p:txBody>
@@ -6248,17 +6852,17 @@
           <a:p>
             <a:r>
               <a:rPr lang="en-US" dirty="0"/>
-              <a:t>Baseline head, neck, and lung cancer immunotypes are somewhat distinct</a:t>
+              <a:t>Baseline head, neck, and lung cancer immunotypes are distinct from other cancer subtypes</a:t>
             </a:r>
           </a:p>
         </p:txBody>
       </p:sp>
       <p:pic>
         <p:nvPicPr>
-          <p:cNvPr id="4" name="Picture 3">
-            <a:extLst>
-              <a:ext uri="{FF2B5EF4-FFF2-40B4-BE49-F238E27FC236}">
-                <a16:creationId xmlns:a16="http://schemas.microsoft.com/office/drawing/2014/main" id="{E25694B4-A270-D118-B083-CDC322AB0F72}"/>
+          <p:cNvPr id="3" name="Picture 2">
+            <a:extLst>
+              <a:ext uri="{FF2B5EF4-FFF2-40B4-BE49-F238E27FC236}">
+                <a16:creationId xmlns:a16="http://schemas.microsoft.com/office/drawing/2014/main" id="{7A3C4F14-8A8E-A7E5-2ACD-6B56BC24C801}"/>
               </a:ext>
             </a:extLst>
           </p:cNvPr>
@@ -6275,8 +6879,8 @@
         </p:blipFill>
         <p:spPr>
           <a:xfrm>
-            <a:off x="7096599" y="0"/>
-            <a:ext cx="5095401" cy="6858000"/>
+            <a:off x="6292869" y="0"/>
+            <a:ext cx="5899131" cy="6858000"/>
           </a:xfrm>
           <a:prstGeom prst="rect">
             <a:avLst/>
@@ -6296,7 +6900,7 @@
 </p:sld>
 </file>
 
-<file path=ppt/slides/slide5.xml><?xml version="1.0" encoding="utf-8"?>
+<file path=ppt/slides/slide6.xml><?xml version="1.0" encoding="utf-8"?>
 <p:sld xmlns:a="http://schemas.openxmlformats.org/drawingml/2006/main" xmlns:r="http://schemas.openxmlformats.org/officeDocument/2006/relationships" xmlns:p="http://schemas.openxmlformats.org/presentationml/2006/main">
   <p:cSld>
     <p:spTree>
@@ -6319,47 +6923,12 @@
           <a:chExt cx="0" cy="0"/>
         </a:xfrm>
       </p:grpSpPr>
-      <p:sp>
-        <p:nvSpPr>
-          <p:cNvPr id="2" name="Title 1">
-            <a:extLst>
-              <a:ext uri="{FF2B5EF4-FFF2-40B4-BE49-F238E27FC236}">
-                <a16:creationId xmlns:a16="http://schemas.microsoft.com/office/drawing/2014/main" id="{BA0B7527-DCB7-85E8-6583-F5F59FEAAB9E}"/>
-              </a:ext>
-            </a:extLst>
-          </p:cNvPr>
-          <p:cNvSpPr>
-            <a:spLocks noGrp="1"/>
-          </p:cNvSpPr>
-          <p:nvPr>
-            <p:ph type="title"/>
-          </p:nvPr>
-        </p:nvSpPr>
-        <p:spPr>
-          <a:xfrm>
-            <a:off x="838201" y="593725"/>
-            <a:ext cx="5257800" cy="1325563"/>
-          </a:xfrm>
-        </p:spPr>
-        <p:txBody>
-          <a:bodyPr>
-            <a:normAutofit/>
-          </a:bodyPr>
-          <a:lstStyle/>
-          <a:p>
-            <a:r>
-              <a:rPr lang="en-US" dirty="0"/>
-              <a:t>~Some evidence of batch effects in baseline data</a:t>
-            </a:r>
-          </a:p>
-        </p:txBody>
-      </p:sp>
       <p:pic>
         <p:nvPicPr>
-          <p:cNvPr id="3" name="Picture 2">
-            <a:extLst>
-              <a:ext uri="{FF2B5EF4-FFF2-40B4-BE49-F238E27FC236}">
-                <a16:creationId xmlns:a16="http://schemas.microsoft.com/office/drawing/2014/main" id="{7E8016DE-2597-7A74-B6B0-52B2231430D3}"/>
+          <p:cNvPr id="4" name="Picture 3">
+            <a:extLst>
+              <a:ext uri="{FF2B5EF4-FFF2-40B4-BE49-F238E27FC236}">
+                <a16:creationId xmlns:a16="http://schemas.microsoft.com/office/drawing/2014/main" id="{5868B0AF-CA81-4B2A-3E92-AD4286A0B4A8}"/>
               </a:ext>
             </a:extLst>
           </p:cNvPr>
@@ -6376,8 +6945,8 @@
         </p:blipFill>
         <p:spPr>
           <a:xfrm>
-            <a:off x="6288823" y="0"/>
-            <a:ext cx="5903177" cy="6858000"/>
+            <a:off x="6477000" y="95250"/>
+            <a:ext cx="5715000" cy="6667500"/>
           </a:xfrm>
           <a:prstGeom prst="rect">
             <a:avLst/>
@@ -6386,6 +6955,41 @@
       </p:pic>
       <p:sp>
         <p:nvSpPr>
+          <p:cNvPr id="2" name="Title 1">
+            <a:extLst>
+              <a:ext uri="{FF2B5EF4-FFF2-40B4-BE49-F238E27FC236}">
+                <a16:creationId xmlns:a16="http://schemas.microsoft.com/office/drawing/2014/main" id="{BA0B7527-DCB7-85E8-6583-F5F59FEAAB9E}"/>
+              </a:ext>
+            </a:extLst>
+          </p:cNvPr>
+          <p:cNvSpPr>
+            <a:spLocks noGrp="1"/>
+          </p:cNvSpPr>
+          <p:nvPr>
+            <p:ph type="title"/>
+          </p:nvPr>
+        </p:nvSpPr>
+        <p:spPr>
+          <a:xfrm>
+            <a:off x="838201" y="593725"/>
+            <a:ext cx="5257800" cy="1325563"/>
+          </a:xfrm>
+        </p:spPr>
+        <p:txBody>
+          <a:bodyPr>
+            <a:normAutofit/>
+          </a:bodyPr>
+          <a:lstStyle/>
+          <a:p>
+            <a:r>
+              <a:rPr lang="en-US" dirty="0"/>
+              <a:t>Some evidence of batch effects in baseline data</a:t>
+            </a:r>
+          </a:p>
+        </p:txBody>
+      </p:sp>
+      <p:sp>
+        <p:nvSpPr>
           <p:cNvPr id="7" name="TextBox 6">
             <a:extLst>
               <a:ext uri="{FF2B5EF4-FFF2-40B4-BE49-F238E27FC236}">
@@ -6398,7 +7002,7 @@
         </p:nvSpPr>
         <p:spPr>
           <a:xfrm>
-            <a:off x="6679933" y="5890660"/>
+            <a:off x="6843219" y="5770917"/>
             <a:ext cx="880241" cy="369332"/>
           </a:xfrm>
           <a:prstGeom prst="rect">
@@ -6432,7 +7036,7 @@
 </p:sld>
 </file>
 
-<file path=ppt/slides/slide6.xml><?xml version="1.0" encoding="utf-8"?>
+<file path=ppt/slides/slide7.xml><?xml version="1.0" encoding="utf-8"?>
 <p:sld xmlns:a="http://schemas.openxmlformats.org/drawingml/2006/main" xmlns:r="http://schemas.openxmlformats.org/officeDocument/2006/relationships" xmlns:p="http://schemas.openxmlformats.org/presentationml/2006/main">
   <p:cSld>
     <p:spTree>
@@ -6455,47 +7059,12 @@
           <a:chExt cx="0" cy="0"/>
         </a:xfrm>
       </p:grpSpPr>
-      <p:sp>
-        <p:nvSpPr>
-          <p:cNvPr id="2" name="Title 1">
-            <a:extLst>
-              <a:ext uri="{FF2B5EF4-FFF2-40B4-BE49-F238E27FC236}">
-                <a16:creationId xmlns:a16="http://schemas.microsoft.com/office/drawing/2014/main" id="{099B6722-9F8B-23CC-CF03-C974E55105C8}"/>
-              </a:ext>
-            </a:extLst>
-          </p:cNvPr>
-          <p:cNvSpPr>
-            <a:spLocks noGrp="1"/>
-          </p:cNvSpPr>
-          <p:nvPr>
-            <p:ph type="title"/>
-          </p:nvPr>
-        </p:nvSpPr>
-        <p:spPr>
-          <a:xfrm>
-            <a:off x="838201" y="593725"/>
-            <a:ext cx="5257800" cy="1325563"/>
-          </a:xfrm>
-        </p:spPr>
-        <p:txBody>
-          <a:bodyPr>
-            <a:normAutofit fontScale="90000"/>
-          </a:bodyPr>
-          <a:lstStyle/>
-          <a:p>
-            <a:r>
-              <a:rPr lang="en-US" dirty="0"/>
-              <a:t>Age contributes to variation in PC2 (baseline samples)</a:t>
-            </a:r>
-          </a:p>
-        </p:txBody>
-      </p:sp>
       <p:pic>
         <p:nvPicPr>
-          <p:cNvPr id="5" name="Picture 4">
-            <a:extLst>
-              <a:ext uri="{FF2B5EF4-FFF2-40B4-BE49-F238E27FC236}">
-                <a16:creationId xmlns:a16="http://schemas.microsoft.com/office/drawing/2014/main" id="{2BFC8BA9-CDF9-B7A1-30F6-AC2ECC7D9CED}"/>
+          <p:cNvPr id="6" name="Picture 5">
+            <a:extLst>
+              <a:ext uri="{FF2B5EF4-FFF2-40B4-BE49-F238E27FC236}">
+                <a16:creationId xmlns:a16="http://schemas.microsoft.com/office/drawing/2014/main" id="{0294AC86-94E7-066B-904B-BC5AE1B57AC5}"/>
               </a:ext>
             </a:extLst>
           </p:cNvPr>
@@ -6512,14 +7081,49 @@
         </p:blipFill>
         <p:spPr>
           <a:xfrm>
-            <a:off x="6301863" y="0"/>
-            <a:ext cx="5890137" cy="6858000"/>
+            <a:off x="6350256" y="0"/>
+            <a:ext cx="5841744" cy="6858000"/>
           </a:xfrm>
           <a:prstGeom prst="rect">
             <a:avLst/>
           </a:prstGeom>
         </p:spPr>
       </p:pic>
+      <p:sp>
+        <p:nvSpPr>
+          <p:cNvPr id="2" name="Title 1">
+            <a:extLst>
+              <a:ext uri="{FF2B5EF4-FFF2-40B4-BE49-F238E27FC236}">
+                <a16:creationId xmlns:a16="http://schemas.microsoft.com/office/drawing/2014/main" id="{099B6722-9F8B-23CC-CF03-C974E55105C8}"/>
+              </a:ext>
+            </a:extLst>
+          </p:cNvPr>
+          <p:cNvSpPr>
+            <a:spLocks noGrp="1"/>
+          </p:cNvSpPr>
+          <p:nvPr>
+            <p:ph type="title"/>
+          </p:nvPr>
+        </p:nvSpPr>
+        <p:spPr>
+          <a:xfrm>
+            <a:off x="838201" y="593725"/>
+            <a:ext cx="5257800" cy="1325563"/>
+          </a:xfrm>
+        </p:spPr>
+        <p:txBody>
+          <a:bodyPr>
+            <a:normAutofit fontScale="90000"/>
+          </a:bodyPr>
+          <a:lstStyle/>
+          <a:p>
+            <a:r>
+              <a:rPr lang="en-US" dirty="0"/>
+              <a:t>Age contributes to variation (baseline samples)</a:t>
+            </a:r>
+          </a:p>
+        </p:txBody>
+      </p:sp>
       <p:sp>
         <p:nvSpPr>
           <p:cNvPr id="4" name="TextBox 3">
@@ -6568,7 +7172,108 @@
 </p:sld>
 </file>
 
-<file path=ppt/slides/slide7.xml><?xml version="1.0" encoding="utf-8"?>
+<file path=ppt/slides/slide8.xml><?xml version="1.0" encoding="utf-8"?>
+<p:sld xmlns:a="http://schemas.openxmlformats.org/drawingml/2006/main" xmlns:r="http://schemas.openxmlformats.org/officeDocument/2006/relationships" xmlns:p="http://schemas.openxmlformats.org/presentationml/2006/main">
+  <p:cSld>
+    <p:spTree>
+      <p:nvGrpSpPr>
+        <p:cNvPr id="1" name="">
+          <a:extLst>
+            <a:ext uri="{FF2B5EF4-FFF2-40B4-BE49-F238E27FC236}">
+              <a16:creationId xmlns:a16="http://schemas.microsoft.com/office/drawing/2014/main" id="{4499FADC-FBBC-EB4A-05BF-5CF1F6439490}"/>
+            </a:ext>
+          </a:extLst>
+        </p:cNvPr>
+        <p:cNvGrpSpPr/>
+        <p:nvPr/>
+      </p:nvGrpSpPr>
+      <p:grpSpPr>
+        <a:xfrm>
+          <a:off x="0" y="0"/>
+          <a:ext cx="0" cy="0"/>
+          <a:chOff x="0" y="0"/>
+          <a:chExt cx="0" cy="0"/>
+        </a:xfrm>
+      </p:grpSpPr>
+      <p:sp>
+        <p:nvSpPr>
+          <p:cNvPr id="2" name="Title 1">
+            <a:extLst>
+              <a:ext uri="{FF2B5EF4-FFF2-40B4-BE49-F238E27FC236}">
+                <a16:creationId xmlns:a16="http://schemas.microsoft.com/office/drawing/2014/main" id="{5EBCB7C7-7960-F4FD-4CEB-710E69BA52B0}"/>
+              </a:ext>
+            </a:extLst>
+          </p:cNvPr>
+          <p:cNvSpPr>
+            <a:spLocks noGrp="1"/>
+          </p:cNvSpPr>
+          <p:nvPr>
+            <p:ph type="title"/>
+          </p:nvPr>
+        </p:nvSpPr>
+        <p:spPr>
+          <a:xfrm>
+            <a:off x="838200" y="593725"/>
+            <a:ext cx="10134599" cy="1325563"/>
+          </a:xfrm>
+        </p:spPr>
+        <p:txBody>
+          <a:bodyPr>
+            <a:normAutofit/>
+          </a:bodyPr>
+          <a:lstStyle/>
+          <a:p>
+            <a:r>
+              <a:rPr lang="en-US" dirty="0"/>
+              <a:t>Certain features contribute more to variation (baseline)</a:t>
+            </a:r>
+          </a:p>
+        </p:txBody>
+      </p:sp>
+      <p:pic>
+        <p:nvPicPr>
+          <p:cNvPr id="7" name="Picture 6">
+            <a:extLst>
+              <a:ext uri="{FF2B5EF4-FFF2-40B4-BE49-F238E27FC236}">
+                <a16:creationId xmlns:a16="http://schemas.microsoft.com/office/drawing/2014/main" id="{2F87F56D-0CFE-CFA2-3209-B454C0FB72CB}"/>
+              </a:ext>
+            </a:extLst>
+          </p:cNvPr>
+          <p:cNvPicPr>
+            <a:picLocks noChangeAspect="1"/>
+          </p:cNvPicPr>
+          <p:nvPr/>
+        </p:nvPicPr>
+        <p:blipFill>
+          <a:blip r:embed="rId3"/>
+          <a:stretch>
+            <a:fillRect/>
+          </a:stretch>
+        </p:blipFill>
+        <p:spPr>
+          <a:xfrm>
+            <a:off x="3167742" y="1257352"/>
+            <a:ext cx="7010399" cy="5600647"/>
+          </a:xfrm>
+          <a:prstGeom prst="rect">
+            <a:avLst/>
+          </a:prstGeom>
+        </p:spPr>
+      </p:pic>
+    </p:spTree>
+    <p:extLst>
+      <p:ext uri="{BB962C8B-B14F-4D97-AF65-F5344CB8AC3E}">
+        <p14:creationId xmlns:p14="http://schemas.microsoft.com/office/powerpoint/2010/main" val="211499257"/>
+      </p:ext>
+    </p:extLst>
+  </p:cSld>
+  <p:clrMapOvr>
+    <a:masterClrMapping/>
+  </p:clrMapOvr>
+</p:sld>
+</file>
+
+<file path=ppt/slides/slide9.xml><?xml version="1.0" encoding="utf-8"?>
 <p:sld xmlns:a="http://schemas.openxmlformats.org/drawingml/2006/main" xmlns:r="http://schemas.openxmlformats.org/officeDocument/2006/relationships" xmlns:p="http://schemas.openxmlformats.org/presentationml/2006/main">
   <p:cSld>
     <p:spTree>
@@ -6659,244 +7364,18 @@
               <a:t>don’t see effect of previous treatments (radiation, chemoradiation…) on baseline cancer immunotypes (data not shown)</a:t>
             </a:r>
           </a:p>
+          <a:p>
+            <a:r>
+              <a:rPr lang="en-US" dirty="0"/>
+              <a:t>ICA does not appear better at distinguishing unique immunotypes by group (baseline) than PCA</a:t>
+            </a:r>
+          </a:p>
         </p:txBody>
       </p:sp>
     </p:spTree>
     <p:extLst>
       <p:ext uri="{BB962C8B-B14F-4D97-AF65-F5344CB8AC3E}">
         <p14:creationId xmlns:p14="http://schemas.microsoft.com/office/powerpoint/2010/main" val="2812621026"/>
-      </p:ext>
-    </p:extLst>
-  </p:cSld>
-  <p:clrMapOvr>
-    <a:masterClrMapping/>
-  </p:clrMapOvr>
-</p:sld>
-</file>
-
-<file path=ppt/slides/slide8.xml><?xml version="1.0" encoding="utf-8"?>
-<p:sld xmlns:a="http://schemas.openxmlformats.org/drawingml/2006/main" xmlns:r="http://schemas.openxmlformats.org/officeDocument/2006/relationships" xmlns:p="http://schemas.openxmlformats.org/presentationml/2006/main">
-  <p:cSld>
-    <p:spTree>
-      <p:nvGrpSpPr>
-        <p:cNvPr id="1" name=""/>
-        <p:cNvGrpSpPr/>
-        <p:nvPr/>
-      </p:nvGrpSpPr>
-      <p:grpSpPr>
-        <a:xfrm>
-          <a:off x="0" y="0"/>
-          <a:ext cx="0" cy="0"/>
-          <a:chOff x="0" y="0"/>
-          <a:chExt cx="0" cy="0"/>
-        </a:xfrm>
-      </p:grpSpPr>
-      <p:sp>
-        <p:nvSpPr>
-          <p:cNvPr id="2" name="Title 1">
-            <a:extLst>
-              <a:ext uri="{FF2B5EF4-FFF2-40B4-BE49-F238E27FC236}">
-                <a16:creationId xmlns:a16="http://schemas.microsoft.com/office/drawing/2014/main" id="{70A4C97D-8F21-3D3B-6A90-EA7145324964}"/>
-              </a:ext>
-            </a:extLst>
-          </p:cNvPr>
-          <p:cNvSpPr>
-            <a:spLocks noGrp="1"/>
-          </p:cNvSpPr>
-          <p:nvPr>
-            <p:ph type="title"/>
-          </p:nvPr>
-        </p:nvSpPr>
-        <p:spPr>
-          <a:xfrm>
-            <a:off x="838200" y="593725"/>
-            <a:ext cx="10515600" cy="1325563"/>
-          </a:xfrm>
-        </p:spPr>
-        <p:txBody>
-          <a:bodyPr>
-            <a:normAutofit/>
-          </a:bodyPr>
-          <a:lstStyle/>
-          <a:p>
-            <a:r>
-              <a:rPr lang="en-US" dirty="0"/>
-              <a:t>Next steps</a:t>
-            </a:r>
-          </a:p>
-        </p:txBody>
-      </p:sp>
-      <p:sp>
-        <p:nvSpPr>
-          <p:cNvPr id="3" name="Content Placeholder 2">
-            <a:extLst>
-              <a:ext uri="{FF2B5EF4-FFF2-40B4-BE49-F238E27FC236}">
-                <a16:creationId xmlns:a16="http://schemas.microsoft.com/office/drawing/2014/main" id="{B9501834-7B32-1ACA-4358-B630FB8EEC36}"/>
-              </a:ext>
-            </a:extLst>
-          </p:cNvPr>
-          <p:cNvSpPr>
-            <a:spLocks noGrp="1"/>
-          </p:cNvSpPr>
-          <p:nvPr>
-            <p:ph idx="1"/>
-          </p:nvPr>
-        </p:nvSpPr>
-        <p:spPr>
-          <a:xfrm>
-            <a:off x="838199" y="1919289"/>
-            <a:ext cx="10384857" cy="4623402"/>
-          </a:xfrm>
-        </p:spPr>
-        <p:txBody>
-          <a:bodyPr>
-            <a:normAutofit/>
-          </a:bodyPr>
-          <a:lstStyle/>
-          <a:p>
-            <a:endParaRPr lang="en-US" dirty="0"/>
-          </a:p>
-        </p:txBody>
-      </p:sp>
-    </p:spTree>
-    <p:extLst>
-      <p:ext uri="{BB962C8B-B14F-4D97-AF65-F5344CB8AC3E}">
-        <p14:creationId xmlns:p14="http://schemas.microsoft.com/office/powerpoint/2010/main" val="4091688872"/>
-      </p:ext>
-    </p:extLst>
-  </p:cSld>
-  <p:clrMapOvr>
-    <a:masterClrMapping/>
-  </p:clrMapOvr>
-</p:sld>
-</file>
-
-<file path=ppt/slides/slide9.xml><?xml version="1.0" encoding="utf-8"?>
-<p:sld xmlns:a="http://schemas.openxmlformats.org/drawingml/2006/main" xmlns:r="http://schemas.openxmlformats.org/officeDocument/2006/relationships" xmlns:p="http://schemas.openxmlformats.org/presentationml/2006/main">
-  <p:cSld>
-    <p:spTree>
-      <p:nvGrpSpPr>
-        <p:cNvPr id="1" name=""/>
-        <p:cNvGrpSpPr/>
-        <p:nvPr/>
-      </p:nvGrpSpPr>
-      <p:grpSpPr>
-        <a:xfrm>
-          <a:off x="0" y="0"/>
-          <a:ext cx="0" cy="0"/>
-          <a:chOff x="0" y="0"/>
-          <a:chExt cx="0" cy="0"/>
-        </a:xfrm>
-      </p:grpSpPr>
-      <p:pic>
-        <p:nvPicPr>
-          <p:cNvPr id="6" name="Picture 5">
-            <a:extLst>
-              <a:ext uri="{FF2B5EF4-FFF2-40B4-BE49-F238E27FC236}">
-                <a16:creationId xmlns:a16="http://schemas.microsoft.com/office/drawing/2014/main" id="{E21F8D95-5379-5DDA-F135-1A690381F6C0}"/>
-              </a:ext>
-            </a:extLst>
-          </p:cNvPr>
-          <p:cNvPicPr>
-            <a:picLocks noChangeAspect="1"/>
-          </p:cNvPicPr>
-          <p:nvPr/>
-        </p:nvPicPr>
-        <p:blipFill>
-          <a:blip r:embed="rId3"/>
-          <a:stretch>
-            <a:fillRect/>
-          </a:stretch>
-        </p:blipFill>
-        <p:spPr>
-          <a:xfrm>
-            <a:off x="0" y="4527042"/>
-            <a:ext cx="8664498" cy="2322530"/>
-          </a:xfrm>
-          <a:prstGeom prst="rect">
-            <a:avLst/>
-          </a:prstGeom>
-        </p:spPr>
-      </p:pic>
-      <p:sp>
-        <p:nvSpPr>
-          <p:cNvPr id="2" name="Title 1">
-            <a:extLst>
-              <a:ext uri="{FF2B5EF4-FFF2-40B4-BE49-F238E27FC236}">
-                <a16:creationId xmlns:a16="http://schemas.microsoft.com/office/drawing/2014/main" id="{70A4C97D-8F21-3D3B-6A90-EA7145324964}"/>
-              </a:ext>
-            </a:extLst>
-          </p:cNvPr>
-          <p:cNvSpPr>
-            <a:spLocks noGrp="1"/>
-          </p:cNvSpPr>
-          <p:nvPr>
-            <p:ph type="title"/>
-          </p:nvPr>
-        </p:nvSpPr>
-        <p:spPr>
-          <a:xfrm>
-            <a:off x="838200" y="593725"/>
-            <a:ext cx="10515600" cy="1325563"/>
-          </a:xfrm>
-        </p:spPr>
-        <p:txBody>
-          <a:bodyPr>
-            <a:normAutofit/>
-          </a:bodyPr>
-          <a:lstStyle/>
-          <a:p>
-            <a:r>
-              <a:rPr lang="en-US" dirty="0"/>
-              <a:t>Acknowledgements</a:t>
-            </a:r>
-          </a:p>
-        </p:txBody>
-      </p:sp>
-      <p:sp>
-        <p:nvSpPr>
-          <p:cNvPr id="3" name="Content Placeholder 2">
-            <a:extLst>
-              <a:ext uri="{FF2B5EF4-FFF2-40B4-BE49-F238E27FC236}">
-                <a16:creationId xmlns:a16="http://schemas.microsoft.com/office/drawing/2014/main" id="{B9501834-7B32-1ACA-4358-B630FB8EEC36}"/>
-              </a:ext>
-            </a:extLst>
-          </p:cNvPr>
-          <p:cNvSpPr>
-            <a:spLocks noGrp="1"/>
-          </p:cNvSpPr>
-          <p:nvPr>
-            <p:ph idx="1"/>
-          </p:nvPr>
-        </p:nvSpPr>
-        <p:spPr>
-          <a:xfrm>
-            <a:off x="838200" y="1919289"/>
-            <a:ext cx="10515600" cy="4623402"/>
-          </a:xfrm>
-        </p:spPr>
-        <p:txBody>
-          <a:bodyPr numCol="2">
-            <a:normAutofit/>
-          </a:bodyPr>
-          <a:lstStyle/>
-          <a:p>
-            <a:r>
-              <a:rPr lang="en-US" dirty="0"/>
-              <a:t>Holly </a:t>
-            </a:r>
-            <a:r>
-              <a:rPr lang="en-US" dirty="0" err="1"/>
-              <a:t>Akilesh</a:t>
-            </a:r>
-            <a:endParaRPr lang="en-US" dirty="0"/>
-          </a:p>
-        </p:txBody>
-      </p:sp>
-    </p:spTree>
-    <p:extLst>
-      <p:ext uri="{BB962C8B-B14F-4D97-AF65-F5344CB8AC3E}">
-        <p14:creationId xmlns:p14="http://schemas.microsoft.com/office/powerpoint/2010/main" val="2018884985"/>
       </p:ext>
     </p:extLst>
   </p:cSld>

</xml_diff>

<commit_message>
Update NCI drafted slides
</commit_message>
<xml_diff>
--- a/presentations/NCI_talks/2024_10_23.pptx
+++ b/presentations/NCI_talks/2024_10_23.pptx
@@ -5,7 +5,7 @@
     <p:sldMasterId id="2147483648" r:id="rId1"/>
   </p:sldMasterIdLst>
   <p:notesMasterIdLst>
-    <p:notesMasterId r:id="rId13"/>
+    <p:notesMasterId r:id="rId14"/>
   </p:notesMasterIdLst>
   <p:sldIdLst>
     <p:sldId id="256" r:id="rId2"/>
@@ -15,10 +15,11 @@
     <p:sldId id="578" r:id="rId6"/>
     <p:sldId id="579" r:id="rId7"/>
     <p:sldId id="580" r:id="rId8"/>
-    <p:sldId id="581" r:id="rId9"/>
-    <p:sldId id="550" r:id="rId10"/>
-    <p:sldId id="529" r:id="rId11"/>
-    <p:sldId id="576" r:id="rId12"/>
+    <p:sldId id="583" r:id="rId9"/>
+    <p:sldId id="581" r:id="rId10"/>
+    <p:sldId id="550" r:id="rId11"/>
+    <p:sldId id="529" r:id="rId12"/>
+    <p:sldId id="576" r:id="rId13"/>
   </p:sldIdLst>
   <p:sldSz cx="12192000" cy="6858000"/>
   <p:notesSz cx="6858000" cy="9144000"/>
@@ -218,7 +219,7 @@
           <a:p>
             <a:fld id="{E933A773-0DCE-3544-BB67-D5FA58DF903C}" type="datetimeFigureOut">
               <a:rPr lang="en-US" smtClean="0"/>
-              <a:t>9/24/24</a:t>
+              <a:t>9/28/24</a:t>
             </a:fld>
             <a:endParaRPr lang="en-US"/>
           </a:p>
@@ -574,7 +575,13 @@
   <p:cSld>
     <p:spTree>
       <p:nvGrpSpPr>
-        <p:cNvPr id="1" name=""/>
+        <p:cNvPr id="1" name="">
+          <a:extLst>
+            <a:ext uri="{FF2B5EF4-FFF2-40B4-BE49-F238E27FC236}">
+              <a16:creationId xmlns:a16="http://schemas.microsoft.com/office/drawing/2014/main" id="{7A8E08F8-B466-1EC2-BB28-39C456B2B371}"/>
+            </a:ext>
+          </a:extLst>
+        </p:cNvPr>
         <p:cNvGrpSpPr/>
         <p:nvPr/>
       </p:nvGrpSpPr>
@@ -588,7 +595,13 @@
       </p:grpSpPr>
       <p:sp>
         <p:nvSpPr>
-          <p:cNvPr id="2" name="Slide Image Placeholder 1"/>
+          <p:cNvPr id="2" name="Slide Image Placeholder 1">
+            <a:extLst>
+              <a:ext uri="{FF2B5EF4-FFF2-40B4-BE49-F238E27FC236}">
+                <a16:creationId xmlns:a16="http://schemas.microsoft.com/office/drawing/2014/main" id="{5696BE36-72D5-DE34-95DF-D8C427005D48}"/>
+              </a:ext>
+            </a:extLst>
+          </p:cNvPr>
           <p:cNvSpPr>
             <a:spLocks noGrp="1" noRot="1" noChangeAspect="1"/>
           </p:cNvSpPr>
@@ -600,7 +613,13 @@
       </p:sp>
       <p:sp>
         <p:nvSpPr>
-          <p:cNvPr id="3" name="Notes Placeholder 2"/>
+          <p:cNvPr id="3" name="Notes Placeholder 2">
+            <a:extLst>
+              <a:ext uri="{FF2B5EF4-FFF2-40B4-BE49-F238E27FC236}">
+                <a16:creationId xmlns:a16="http://schemas.microsoft.com/office/drawing/2014/main" id="{25B0415E-040E-D5F2-7990-EACA108D8779}"/>
+              </a:ext>
+            </a:extLst>
+          </p:cNvPr>
           <p:cNvSpPr>
             <a:spLocks noGrp="1"/>
           </p:cNvSpPr>
@@ -613,13 +632,25 @@
           <a:bodyPr/>
           <a:lstStyle/>
           <a:p>
-            <a:endParaRPr lang="en-US" dirty="0"/>
-          </a:p>
-        </p:txBody>
-      </p:sp>
-      <p:sp>
-        <p:nvSpPr>
-          <p:cNvPr id="4" name="Slide Number Placeholder 3"/>
+            <a:endParaRPr lang="en-US" b="0" dirty="0">
+              <a:solidFill>
+                <a:srgbClr val="CCCCCC"/>
+              </a:solidFill>
+              <a:effectLst/>
+              <a:latin typeface="Menlo" panose="020B0609030804020204" pitchFamily="49" charset="0"/>
+            </a:endParaRPr>
+          </a:p>
+        </p:txBody>
+      </p:sp>
+      <p:sp>
+        <p:nvSpPr>
+          <p:cNvPr id="4" name="Slide Number Placeholder 3">
+            <a:extLst>
+              <a:ext uri="{FF2B5EF4-FFF2-40B4-BE49-F238E27FC236}">
+                <a16:creationId xmlns:a16="http://schemas.microsoft.com/office/drawing/2014/main" id="{E6805331-9119-1300-9EBD-B7D430F65B48}"/>
+              </a:ext>
+            </a:extLst>
+          </p:cNvPr>
           <p:cNvSpPr>
             <a:spLocks noGrp="1"/>
           </p:cNvSpPr>
@@ -643,7 +674,7 @@
     </p:spTree>
     <p:extLst>
       <p:ext uri="{BB962C8B-B14F-4D97-AF65-F5344CB8AC3E}">
-        <p14:creationId xmlns:p14="http://schemas.microsoft.com/office/powerpoint/2010/main" val="3703388347"/>
+        <p14:creationId xmlns:p14="http://schemas.microsoft.com/office/powerpoint/2010/main" val="1028389668"/>
       </p:ext>
     </p:extLst>
   </p:cSld>
@@ -697,6 +728,90 @@
           <a:bodyPr/>
           <a:lstStyle/>
           <a:p>
+            <a:endParaRPr lang="en-US" dirty="0"/>
+          </a:p>
+        </p:txBody>
+      </p:sp>
+      <p:sp>
+        <p:nvSpPr>
+          <p:cNvPr id="4" name="Slide Number Placeholder 3"/>
+          <p:cNvSpPr>
+            <a:spLocks noGrp="1"/>
+          </p:cNvSpPr>
+          <p:nvPr>
+            <p:ph type="sldNum" sz="quarter" idx="5"/>
+          </p:nvPr>
+        </p:nvSpPr>
+        <p:spPr/>
+        <p:txBody>
+          <a:bodyPr/>
+          <a:lstStyle/>
+          <a:p>
+            <a:fld id="{061BAA8C-FDC6-D345-B4E0-3B02449209FB}" type="slidenum">
+              <a:rPr lang="en-US" smtClean="0"/>
+              <a:t>11</a:t>
+            </a:fld>
+            <a:endParaRPr lang="en-US"/>
+          </a:p>
+        </p:txBody>
+      </p:sp>
+    </p:spTree>
+    <p:extLst>
+      <p:ext uri="{BB962C8B-B14F-4D97-AF65-F5344CB8AC3E}">
+        <p14:creationId xmlns:p14="http://schemas.microsoft.com/office/powerpoint/2010/main" val="3703388347"/>
+      </p:ext>
+    </p:extLst>
+  </p:cSld>
+  <p:clrMapOvr>
+    <a:masterClrMapping/>
+  </p:clrMapOvr>
+</p:notes>
+</file>
+
+<file path=ppt/notesSlides/notesSlide12.xml><?xml version="1.0" encoding="utf-8"?>
+<p:notes xmlns:a="http://schemas.openxmlformats.org/drawingml/2006/main" xmlns:r="http://schemas.openxmlformats.org/officeDocument/2006/relationships" xmlns:p="http://schemas.openxmlformats.org/presentationml/2006/main">
+  <p:cSld>
+    <p:spTree>
+      <p:nvGrpSpPr>
+        <p:cNvPr id="1" name=""/>
+        <p:cNvGrpSpPr/>
+        <p:nvPr/>
+      </p:nvGrpSpPr>
+      <p:grpSpPr>
+        <a:xfrm>
+          <a:off x="0" y="0"/>
+          <a:ext cx="0" cy="0"/>
+          <a:chOff x="0" y="0"/>
+          <a:chExt cx="0" cy="0"/>
+        </a:xfrm>
+      </p:grpSpPr>
+      <p:sp>
+        <p:nvSpPr>
+          <p:cNvPr id="2" name="Slide Image Placeholder 1"/>
+          <p:cNvSpPr>
+            <a:spLocks noGrp="1" noRot="1" noChangeAspect="1"/>
+          </p:cNvSpPr>
+          <p:nvPr>
+            <p:ph type="sldImg"/>
+          </p:nvPr>
+        </p:nvSpPr>
+        <p:spPr/>
+      </p:sp>
+      <p:sp>
+        <p:nvSpPr>
+          <p:cNvPr id="3" name="Notes Placeholder 2"/>
+          <p:cNvSpPr>
+            <a:spLocks noGrp="1"/>
+          </p:cNvSpPr>
+          <p:nvPr>
+            <p:ph type="body" idx="1"/>
+          </p:nvPr>
+        </p:nvSpPr>
+        <p:spPr/>
+        <p:txBody>
+          <a:bodyPr/>
+          <a:lstStyle/>
+          <a:p>
             <a:endParaRPr lang="en-US" b="0" i="0" u="none" strike="noStrike" dirty="0">
               <a:solidFill>
                 <a:srgbClr val="212121"/>
@@ -724,7 +839,7 @@
           <a:p>
             <a:fld id="{061BAA8C-FDC6-D345-B4E0-3B02449209FB}" type="slidenum">
               <a:rPr lang="en-US" smtClean="0"/>
-              <a:t>11</a:t>
+              <a:t>12</a:t>
             </a:fld>
             <a:endParaRPr lang="en-US"/>
           </a:p>
@@ -2703,7 +2818,7 @@
         <p:cNvPr id="1" name="">
           <a:extLst>
             <a:ext uri="{FF2B5EF4-FFF2-40B4-BE49-F238E27FC236}">
-              <a16:creationId xmlns:a16="http://schemas.microsoft.com/office/drawing/2014/main" id="{1A615A9B-FCEE-6F7D-9622-145DAC34BE0D}"/>
+              <a16:creationId xmlns:a16="http://schemas.microsoft.com/office/drawing/2014/main" id="{DB2D8766-1E27-65A2-2E09-52977FB8C63E}"/>
             </a:ext>
           </a:extLst>
         </p:cNvPr>
@@ -2723,7 +2838,7 @@
           <p:cNvPr id="2" name="Slide Image Placeholder 1">
             <a:extLst>
               <a:ext uri="{FF2B5EF4-FFF2-40B4-BE49-F238E27FC236}">
-                <a16:creationId xmlns:a16="http://schemas.microsoft.com/office/drawing/2014/main" id="{F88C4DD4-92A1-2BD9-9D66-AE40E8E54748}"/>
+                <a16:creationId xmlns:a16="http://schemas.microsoft.com/office/drawing/2014/main" id="{DBE5A314-014B-5025-5E7E-DA1B4E9701E5}"/>
               </a:ext>
             </a:extLst>
           </p:cNvPr>
@@ -2741,7 +2856,7 @@
           <p:cNvPr id="3" name="Notes Placeholder 2">
             <a:extLst>
               <a:ext uri="{FF2B5EF4-FFF2-40B4-BE49-F238E27FC236}">
-                <a16:creationId xmlns:a16="http://schemas.microsoft.com/office/drawing/2014/main" id="{8F6F45D9-2262-CE49-7AAF-99DB701077C6}"/>
+                <a16:creationId xmlns:a16="http://schemas.microsoft.com/office/drawing/2014/main" id="{72CC1E7A-A289-AE99-8314-C9DB75EAA278}"/>
               </a:ext>
             </a:extLst>
           </p:cNvPr>
@@ -2756,6 +2871,18 @@
         <p:txBody>
           <a:bodyPr/>
           <a:lstStyle/>
+          <a:p>
+            <a:r>
+              <a:rPr lang="en-US" b="0" dirty="0">
+                <a:solidFill>
+                  <a:srgbClr val="CCCCCC"/>
+                </a:solidFill>
+                <a:effectLst/>
+                <a:latin typeface="Menlo" panose="020B0609030804020204" pitchFamily="49" charset="0"/>
+              </a:rPr>
+              <a:t>Left is normal logit</a:t>
+            </a:r>
+          </a:p>
           <a:p>
             <a:endParaRPr lang="en-US" b="0" dirty="0">
               <a:solidFill>
@@ -2765,6 +2892,18 @@
               <a:latin typeface="Menlo" panose="020B0609030804020204" pitchFamily="49" charset="0"/>
             </a:endParaRPr>
           </a:p>
+          <a:p>
+            <a:r>
+              <a:rPr lang="en-US" b="0" dirty="0">
+                <a:solidFill>
+                  <a:srgbClr val="CCCCCC"/>
+                </a:solidFill>
+                <a:effectLst/>
+                <a:latin typeface="Menlo" panose="020B0609030804020204" pitchFamily="49" charset="0"/>
+              </a:rPr>
+              <a:t>Right is residuals from linear models with age and Batch as confounders</a:t>
+            </a:r>
+          </a:p>
         </p:txBody>
       </p:sp>
       <p:sp>
@@ -2772,7 +2911,7 @@
           <p:cNvPr id="4" name="Slide Number Placeholder 3">
             <a:extLst>
               <a:ext uri="{FF2B5EF4-FFF2-40B4-BE49-F238E27FC236}">
-                <a16:creationId xmlns:a16="http://schemas.microsoft.com/office/drawing/2014/main" id="{28F708A8-1A74-B964-5810-DE42CC8DD556}"/>
+                <a16:creationId xmlns:a16="http://schemas.microsoft.com/office/drawing/2014/main" id="{04CFC37C-928C-8DB7-6374-D293E62499EE}"/>
               </a:ext>
             </a:extLst>
           </p:cNvPr>
@@ -2799,7 +2938,7 @@
     </p:spTree>
     <p:extLst>
       <p:ext uri="{BB962C8B-B14F-4D97-AF65-F5344CB8AC3E}">
-        <p14:creationId xmlns:p14="http://schemas.microsoft.com/office/powerpoint/2010/main" val="1387096064"/>
+        <p14:creationId xmlns:p14="http://schemas.microsoft.com/office/powerpoint/2010/main" val="1988724932"/>
       </p:ext>
     </p:extLst>
   </p:cSld>
@@ -2817,7 +2956,7 @@
         <p:cNvPr id="1" name="">
           <a:extLst>
             <a:ext uri="{FF2B5EF4-FFF2-40B4-BE49-F238E27FC236}">
-              <a16:creationId xmlns:a16="http://schemas.microsoft.com/office/drawing/2014/main" id="{7A8E08F8-B466-1EC2-BB28-39C456B2B371}"/>
+              <a16:creationId xmlns:a16="http://schemas.microsoft.com/office/drawing/2014/main" id="{1A615A9B-FCEE-6F7D-9622-145DAC34BE0D}"/>
             </a:ext>
           </a:extLst>
         </p:cNvPr>
@@ -2837,7 +2976,7 @@
           <p:cNvPr id="2" name="Slide Image Placeholder 1">
             <a:extLst>
               <a:ext uri="{FF2B5EF4-FFF2-40B4-BE49-F238E27FC236}">
-                <a16:creationId xmlns:a16="http://schemas.microsoft.com/office/drawing/2014/main" id="{5696BE36-72D5-DE34-95DF-D8C427005D48}"/>
+                <a16:creationId xmlns:a16="http://schemas.microsoft.com/office/drawing/2014/main" id="{F88C4DD4-92A1-2BD9-9D66-AE40E8E54748}"/>
               </a:ext>
             </a:extLst>
           </p:cNvPr>
@@ -2855,7 +2994,7 @@
           <p:cNvPr id="3" name="Notes Placeholder 2">
             <a:extLst>
               <a:ext uri="{FF2B5EF4-FFF2-40B4-BE49-F238E27FC236}">
-                <a16:creationId xmlns:a16="http://schemas.microsoft.com/office/drawing/2014/main" id="{25B0415E-040E-D5F2-7990-EACA108D8779}"/>
+                <a16:creationId xmlns:a16="http://schemas.microsoft.com/office/drawing/2014/main" id="{8F6F45D9-2262-CE49-7AAF-99DB701077C6}"/>
               </a:ext>
             </a:extLst>
           </p:cNvPr>
@@ -2886,7 +3025,7 @@
           <p:cNvPr id="4" name="Slide Number Placeholder 3">
             <a:extLst>
               <a:ext uri="{FF2B5EF4-FFF2-40B4-BE49-F238E27FC236}">
-                <a16:creationId xmlns:a16="http://schemas.microsoft.com/office/drawing/2014/main" id="{E6805331-9119-1300-9EBD-B7D430F65B48}"/>
+                <a16:creationId xmlns:a16="http://schemas.microsoft.com/office/drawing/2014/main" id="{28F708A8-1A74-B964-5810-DE42CC8DD556}"/>
               </a:ext>
             </a:extLst>
           </p:cNvPr>
@@ -2913,7 +3052,7 @@
     </p:spTree>
     <p:extLst>
       <p:ext uri="{BB962C8B-B14F-4D97-AF65-F5344CB8AC3E}">
-        <p14:creationId xmlns:p14="http://schemas.microsoft.com/office/powerpoint/2010/main" val="1028389668"/>
+        <p14:creationId xmlns:p14="http://schemas.microsoft.com/office/powerpoint/2010/main" val="1387096064"/>
       </p:ext>
     </p:extLst>
   </p:cSld>
@@ -3070,7 +3209,7 @@
           <a:p>
             <a:fld id="{80FC6068-BAFB-FC44-B9D8-F4B3BB105DE6}" type="datetimeFigureOut">
               <a:rPr lang="en-US" smtClean="0"/>
-              <a:t>9/24/24</a:t>
+              <a:t>9/28/24</a:t>
             </a:fld>
             <a:endParaRPr lang="en-US"/>
           </a:p>
@@ -3268,7 +3407,7 @@
           <a:p>
             <a:fld id="{80FC6068-BAFB-FC44-B9D8-F4B3BB105DE6}" type="datetimeFigureOut">
               <a:rPr lang="en-US" smtClean="0"/>
-              <a:t>9/24/24</a:t>
+              <a:t>9/28/24</a:t>
             </a:fld>
             <a:endParaRPr lang="en-US"/>
           </a:p>
@@ -3476,7 +3615,7 @@
           <a:p>
             <a:fld id="{80FC6068-BAFB-FC44-B9D8-F4B3BB105DE6}" type="datetimeFigureOut">
               <a:rPr lang="en-US" smtClean="0"/>
-              <a:t>9/24/24</a:t>
+              <a:t>9/28/24</a:t>
             </a:fld>
             <a:endParaRPr lang="en-US"/>
           </a:p>
@@ -3680,7 +3819,7 @@
           <a:p>
             <a:fld id="{80FC6068-BAFB-FC44-B9D8-F4B3BB105DE6}" type="datetimeFigureOut">
               <a:rPr lang="en-US" smtClean="0"/>
-              <a:t>9/24/24</a:t>
+              <a:t>9/28/24</a:t>
             </a:fld>
             <a:endParaRPr lang="en-US"/>
           </a:p>
@@ -3971,7 +4110,7 @@
           <a:p>
             <a:fld id="{80FC6068-BAFB-FC44-B9D8-F4B3BB105DE6}" type="datetimeFigureOut">
               <a:rPr lang="en-US" smtClean="0"/>
-              <a:t>9/24/24</a:t>
+              <a:t>9/28/24</a:t>
             </a:fld>
             <a:endParaRPr lang="en-US"/>
           </a:p>
@@ -4236,7 +4375,7 @@
           <a:p>
             <a:fld id="{80FC6068-BAFB-FC44-B9D8-F4B3BB105DE6}" type="datetimeFigureOut">
               <a:rPr lang="en-US" smtClean="0"/>
-              <a:t>9/24/24</a:t>
+              <a:t>9/28/24</a:t>
             </a:fld>
             <a:endParaRPr lang="en-US"/>
           </a:p>
@@ -4648,7 +4787,7 @@
           <a:p>
             <a:fld id="{80FC6068-BAFB-FC44-B9D8-F4B3BB105DE6}" type="datetimeFigureOut">
               <a:rPr lang="en-US" smtClean="0"/>
-              <a:t>9/24/24</a:t>
+              <a:t>9/28/24</a:t>
             </a:fld>
             <a:endParaRPr lang="en-US"/>
           </a:p>
@@ -4789,7 +4928,7 @@
           <a:p>
             <a:fld id="{80FC6068-BAFB-FC44-B9D8-F4B3BB105DE6}" type="datetimeFigureOut">
               <a:rPr lang="en-US" smtClean="0"/>
-              <a:t>9/24/24</a:t>
+              <a:t>9/28/24</a:t>
             </a:fld>
             <a:endParaRPr lang="en-US"/>
           </a:p>
@@ -4902,7 +5041,7 @@
           <a:p>
             <a:fld id="{80FC6068-BAFB-FC44-B9D8-F4B3BB105DE6}" type="datetimeFigureOut">
               <a:rPr lang="en-US" smtClean="0"/>
-              <a:t>9/24/24</a:t>
+              <a:t>9/28/24</a:t>
             </a:fld>
             <a:endParaRPr lang="en-US"/>
           </a:p>
@@ -5213,7 +5352,7 @@
           <a:p>
             <a:fld id="{80FC6068-BAFB-FC44-B9D8-F4B3BB105DE6}" type="datetimeFigureOut">
               <a:rPr lang="en-US" smtClean="0"/>
-              <a:t>9/24/24</a:t>
+              <a:t>9/28/24</a:t>
             </a:fld>
             <a:endParaRPr lang="en-US"/>
           </a:p>
@@ -5501,7 +5640,7 @@
           <a:p>
             <a:fld id="{80FC6068-BAFB-FC44-B9D8-F4B3BB105DE6}" type="datetimeFigureOut">
               <a:rPr lang="en-US" smtClean="0"/>
-              <a:t>9/24/24</a:t>
+              <a:t>9/28/24</a:t>
             </a:fld>
             <a:endParaRPr lang="en-US"/>
           </a:p>
@@ -5742,7 +5881,7 @@
           <a:p>
             <a:fld id="{80FC6068-BAFB-FC44-B9D8-F4B3BB105DE6}" type="datetimeFigureOut">
               <a:rPr lang="en-US" smtClean="0"/>
-              <a:t>9/24/24</a:t>
+              <a:t>9/28/24</a:t>
             </a:fld>
             <a:endParaRPr lang="en-US"/>
           </a:p>
@@ -6269,6 +6408,118 @@
   <p:cSld>
     <p:spTree>
       <p:nvGrpSpPr>
+        <p:cNvPr id="1" name="">
+          <a:extLst>
+            <a:ext uri="{FF2B5EF4-FFF2-40B4-BE49-F238E27FC236}">
+              <a16:creationId xmlns:a16="http://schemas.microsoft.com/office/drawing/2014/main" id="{C55D7743-C5CC-7163-42F9-8A139DE9A99C}"/>
+            </a:ext>
+          </a:extLst>
+        </p:cNvPr>
+        <p:cNvGrpSpPr/>
+        <p:nvPr/>
+      </p:nvGrpSpPr>
+      <p:grpSpPr>
+        <a:xfrm>
+          <a:off x="0" y="0"/>
+          <a:ext cx="0" cy="0"/>
+          <a:chOff x="0" y="0"/>
+          <a:chExt cx="0" cy="0"/>
+        </a:xfrm>
+      </p:grpSpPr>
+      <p:sp>
+        <p:nvSpPr>
+          <p:cNvPr id="2" name="Title 1">
+            <a:extLst>
+              <a:ext uri="{FF2B5EF4-FFF2-40B4-BE49-F238E27FC236}">
+                <a16:creationId xmlns:a16="http://schemas.microsoft.com/office/drawing/2014/main" id="{9F9D9FA2-5D53-2BEB-66A2-ABC93F201395}"/>
+              </a:ext>
+            </a:extLst>
+          </p:cNvPr>
+          <p:cNvSpPr>
+            <a:spLocks noGrp="1"/>
+          </p:cNvSpPr>
+          <p:nvPr>
+            <p:ph type="title"/>
+          </p:nvPr>
+        </p:nvSpPr>
+        <p:spPr>
+          <a:xfrm>
+            <a:off x="838200" y="593725"/>
+            <a:ext cx="10515600" cy="1325563"/>
+          </a:xfrm>
+        </p:spPr>
+        <p:txBody>
+          <a:bodyPr>
+            <a:normAutofit/>
+          </a:bodyPr>
+          <a:lstStyle/>
+          <a:p>
+            <a:r>
+              <a:rPr lang="en-US" dirty="0"/>
+              <a:t>Conclusions</a:t>
+            </a:r>
+          </a:p>
+        </p:txBody>
+      </p:sp>
+      <p:sp>
+        <p:nvSpPr>
+          <p:cNvPr id="3" name="Content Placeholder 2">
+            <a:extLst>
+              <a:ext uri="{FF2B5EF4-FFF2-40B4-BE49-F238E27FC236}">
+                <a16:creationId xmlns:a16="http://schemas.microsoft.com/office/drawing/2014/main" id="{C4F1A618-530F-D746-FAF5-0E38C47B5C08}"/>
+              </a:ext>
+            </a:extLst>
+          </p:cNvPr>
+          <p:cNvSpPr>
+            <a:spLocks noGrp="1"/>
+          </p:cNvSpPr>
+          <p:nvPr>
+            <p:ph idx="1"/>
+          </p:nvPr>
+        </p:nvSpPr>
+        <p:spPr>
+          <a:xfrm>
+            <a:off x="838200" y="1919289"/>
+            <a:ext cx="10515600" cy="4623402"/>
+          </a:xfrm>
+        </p:spPr>
+        <p:txBody>
+          <a:bodyPr>
+            <a:normAutofit/>
+          </a:bodyPr>
+          <a:lstStyle/>
+          <a:p>
+            <a:r>
+              <a:rPr lang="en-US" dirty="0"/>
+              <a:t>don’t see effect of previous treatments (radiation, chemoradiation…) on baseline cancer immunotypes (data not shown)</a:t>
+            </a:r>
+          </a:p>
+          <a:p>
+            <a:r>
+              <a:rPr lang="en-US" dirty="0"/>
+              <a:t>ICA does not appear better at distinguishing unique immunotypes by group (baseline) than PCA</a:t>
+            </a:r>
+          </a:p>
+        </p:txBody>
+      </p:sp>
+    </p:spTree>
+    <p:extLst>
+      <p:ext uri="{BB962C8B-B14F-4D97-AF65-F5344CB8AC3E}">
+        <p14:creationId xmlns:p14="http://schemas.microsoft.com/office/powerpoint/2010/main" val="2812621026"/>
+      </p:ext>
+    </p:extLst>
+  </p:cSld>
+  <p:clrMapOvr>
+    <a:masterClrMapping/>
+  </p:clrMapOvr>
+</p:sld>
+</file>
+
+<file path=ppt/slides/slide11.xml><?xml version="1.0" encoding="utf-8"?>
+<p:sld xmlns:a="http://schemas.openxmlformats.org/drawingml/2006/main" xmlns:r="http://schemas.openxmlformats.org/officeDocument/2006/relationships" xmlns:p="http://schemas.openxmlformats.org/presentationml/2006/main">
+  <p:cSld>
+    <p:spTree>
+      <p:nvGrpSpPr>
         <p:cNvPr id="1" name=""/>
         <p:cNvGrpSpPr/>
         <p:nvPr/>
@@ -6361,7 +6612,7 @@
 </p:sld>
 </file>
 
-<file path=ppt/slides/slide11.xml><?xml version="1.0" encoding="utf-8"?>
+<file path=ppt/slides/slide12.xml><?xml version="1.0" encoding="utf-8"?>
 <p:sld xmlns:a="http://schemas.openxmlformats.org/drawingml/2006/main" xmlns:r="http://schemas.openxmlformats.org/officeDocument/2006/relationships" xmlns:p="http://schemas.openxmlformats.org/presentationml/2006/main">
   <p:cSld>
     <p:spTree>
@@ -6576,7 +6827,7 @@
         </p:blipFill>
         <p:spPr>
           <a:xfrm>
-            <a:off x="3394841" y="1535126"/>
+            <a:off x="3645098" y="1535126"/>
             <a:ext cx="4519635" cy="5322874"/>
           </a:xfrm>
           <a:prstGeom prst="rect">
@@ -7180,6 +7431,172 @@
         <p:cNvPr id="1" name="">
           <a:extLst>
             <a:ext uri="{FF2B5EF4-FFF2-40B4-BE49-F238E27FC236}">
+              <a16:creationId xmlns:a16="http://schemas.microsoft.com/office/drawing/2014/main" id="{EE08D85A-F69E-2E4C-58D3-455B3D110417}"/>
+            </a:ext>
+          </a:extLst>
+        </p:cNvPr>
+        <p:cNvGrpSpPr/>
+        <p:nvPr/>
+      </p:nvGrpSpPr>
+      <p:grpSpPr>
+        <a:xfrm>
+          <a:off x="0" y="0"/>
+          <a:ext cx="0" cy="0"/>
+          <a:chOff x="0" y="0"/>
+          <a:chExt cx="0" cy="0"/>
+        </a:xfrm>
+      </p:grpSpPr>
+      <p:sp>
+        <p:nvSpPr>
+          <p:cNvPr id="2" name="Title 1">
+            <a:extLst>
+              <a:ext uri="{FF2B5EF4-FFF2-40B4-BE49-F238E27FC236}">
+                <a16:creationId xmlns:a16="http://schemas.microsoft.com/office/drawing/2014/main" id="{5E94DD65-B471-F5FE-7F08-348C418D3399}"/>
+              </a:ext>
+            </a:extLst>
+          </p:cNvPr>
+          <p:cNvSpPr>
+            <a:spLocks noGrp="1"/>
+          </p:cNvSpPr>
+          <p:nvPr>
+            <p:ph type="title"/>
+          </p:nvPr>
+        </p:nvSpPr>
+        <p:spPr>
+          <a:xfrm>
+            <a:off x="838200" y="593725"/>
+            <a:ext cx="10515600" cy="1325563"/>
+          </a:xfrm>
+        </p:spPr>
+        <p:txBody>
+          <a:bodyPr>
+            <a:normAutofit/>
+          </a:bodyPr>
+          <a:lstStyle/>
+          <a:p>
+            <a:r>
+              <a:rPr lang="en-US" dirty="0"/>
+              <a:t>Regressing out age &amp; batch from baseline samples doesn’t reveal distinct immunotypes</a:t>
+            </a:r>
+          </a:p>
+        </p:txBody>
+      </p:sp>
+      <p:pic>
+        <p:nvPicPr>
+          <p:cNvPr id="3" name="Picture 2">
+            <a:extLst>
+              <a:ext uri="{FF2B5EF4-FFF2-40B4-BE49-F238E27FC236}">
+                <a16:creationId xmlns:a16="http://schemas.microsoft.com/office/drawing/2014/main" id="{9243A392-DD08-CEBF-C46F-6947CF386848}"/>
+              </a:ext>
+            </a:extLst>
+          </p:cNvPr>
+          <p:cNvPicPr>
+            <a:picLocks noChangeAspect="1"/>
+          </p:cNvPicPr>
+          <p:nvPr/>
+        </p:nvPicPr>
+        <p:blipFill>
+          <a:blip r:embed="rId3"/>
+          <a:stretch>
+            <a:fillRect/>
+          </a:stretch>
+        </p:blipFill>
+        <p:spPr>
+          <a:xfrm>
+            <a:off x="1314716" y="1823035"/>
+            <a:ext cx="4193444" cy="4938712"/>
+          </a:xfrm>
+          <a:prstGeom prst="rect">
+            <a:avLst/>
+          </a:prstGeom>
+        </p:spPr>
+      </p:pic>
+      <p:pic>
+        <p:nvPicPr>
+          <p:cNvPr id="4" name="Picture 3">
+            <a:extLst>
+              <a:ext uri="{FF2B5EF4-FFF2-40B4-BE49-F238E27FC236}">
+                <a16:creationId xmlns:a16="http://schemas.microsoft.com/office/drawing/2014/main" id="{653E4C05-C6D8-511E-EBC4-8AA151383D36}"/>
+              </a:ext>
+            </a:extLst>
+          </p:cNvPr>
+          <p:cNvPicPr>
+            <a:picLocks noChangeAspect="1"/>
+          </p:cNvPicPr>
+          <p:nvPr/>
+        </p:nvPicPr>
+        <p:blipFill>
+          <a:blip r:embed="rId4"/>
+          <a:stretch>
+            <a:fillRect/>
+          </a:stretch>
+        </p:blipFill>
+        <p:spPr>
+          <a:xfrm>
+            <a:off x="7007012" y="1817270"/>
+            <a:ext cx="4261834" cy="4938713"/>
+          </a:xfrm>
+          <a:prstGeom prst="rect">
+            <a:avLst/>
+          </a:prstGeom>
+        </p:spPr>
+      </p:pic>
+      <p:sp>
+        <p:nvSpPr>
+          <p:cNvPr id="5" name="TextBox 4">
+            <a:extLst>
+              <a:ext uri="{FF2B5EF4-FFF2-40B4-BE49-F238E27FC236}">
+                <a16:creationId xmlns:a16="http://schemas.microsoft.com/office/drawing/2014/main" id="{F70F31CF-0EC2-1F9D-C893-807E8223190D}"/>
+              </a:ext>
+            </a:extLst>
+          </p:cNvPr>
+          <p:cNvSpPr txBox="1"/>
+          <p:nvPr/>
+        </p:nvSpPr>
+        <p:spPr>
+          <a:xfrm>
+            <a:off x="8155257" y="1549956"/>
+            <a:ext cx="2722027" cy="369332"/>
+          </a:xfrm>
+          <a:prstGeom prst="rect">
+            <a:avLst/>
+          </a:prstGeom>
+          <a:noFill/>
+        </p:spPr>
+        <p:txBody>
+          <a:bodyPr wrap="none" rtlCol="0">
+            <a:spAutoFit/>
+          </a:bodyPr>
+          <a:lstStyle/>
+          <a:p>
+            <a:r>
+              <a:rPr lang="en-US" dirty="0"/>
+              <a:t>Confounders regressed out</a:t>
+            </a:r>
+          </a:p>
+        </p:txBody>
+      </p:sp>
+    </p:spTree>
+    <p:extLst>
+      <p:ext uri="{BB962C8B-B14F-4D97-AF65-F5344CB8AC3E}">
+        <p14:creationId xmlns:p14="http://schemas.microsoft.com/office/powerpoint/2010/main" val="1916179693"/>
+      </p:ext>
+    </p:extLst>
+  </p:cSld>
+  <p:clrMapOvr>
+    <a:masterClrMapping/>
+  </p:clrMapOvr>
+</p:sld>
+</file>
+
+<file path=ppt/slides/slide9.xml><?xml version="1.0" encoding="utf-8"?>
+<p:sld xmlns:a="http://schemas.openxmlformats.org/drawingml/2006/main" xmlns:r="http://schemas.openxmlformats.org/officeDocument/2006/relationships" xmlns:p="http://schemas.openxmlformats.org/presentationml/2006/main">
+  <p:cSld>
+    <p:spTree>
+      <p:nvGrpSpPr>
+        <p:cNvPr id="1" name="">
+          <a:extLst>
+            <a:ext uri="{FF2B5EF4-FFF2-40B4-BE49-F238E27FC236}">
               <a16:creationId xmlns:a16="http://schemas.microsoft.com/office/drawing/2014/main" id="{4499FADC-FBBC-EB4A-05BF-5CF1F6439490}"/>
             </a:ext>
           </a:extLst>
@@ -7264,118 +7681,6 @@
     <p:extLst>
       <p:ext uri="{BB962C8B-B14F-4D97-AF65-F5344CB8AC3E}">
         <p14:creationId xmlns:p14="http://schemas.microsoft.com/office/powerpoint/2010/main" val="211499257"/>
-      </p:ext>
-    </p:extLst>
-  </p:cSld>
-  <p:clrMapOvr>
-    <a:masterClrMapping/>
-  </p:clrMapOvr>
-</p:sld>
-</file>
-
-<file path=ppt/slides/slide9.xml><?xml version="1.0" encoding="utf-8"?>
-<p:sld xmlns:a="http://schemas.openxmlformats.org/drawingml/2006/main" xmlns:r="http://schemas.openxmlformats.org/officeDocument/2006/relationships" xmlns:p="http://schemas.openxmlformats.org/presentationml/2006/main">
-  <p:cSld>
-    <p:spTree>
-      <p:nvGrpSpPr>
-        <p:cNvPr id="1" name="">
-          <a:extLst>
-            <a:ext uri="{FF2B5EF4-FFF2-40B4-BE49-F238E27FC236}">
-              <a16:creationId xmlns:a16="http://schemas.microsoft.com/office/drawing/2014/main" id="{C55D7743-C5CC-7163-42F9-8A139DE9A99C}"/>
-            </a:ext>
-          </a:extLst>
-        </p:cNvPr>
-        <p:cNvGrpSpPr/>
-        <p:nvPr/>
-      </p:nvGrpSpPr>
-      <p:grpSpPr>
-        <a:xfrm>
-          <a:off x="0" y="0"/>
-          <a:ext cx="0" cy="0"/>
-          <a:chOff x="0" y="0"/>
-          <a:chExt cx="0" cy="0"/>
-        </a:xfrm>
-      </p:grpSpPr>
-      <p:sp>
-        <p:nvSpPr>
-          <p:cNvPr id="2" name="Title 1">
-            <a:extLst>
-              <a:ext uri="{FF2B5EF4-FFF2-40B4-BE49-F238E27FC236}">
-                <a16:creationId xmlns:a16="http://schemas.microsoft.com/office/drawing/2014/main" id="{9F9D9FA2-5D53-2BEB-66A2-ABC93F201395}"/>
-              </a:ext>
-            </a:extLst>
-          </p:cNvPr>
-          <p:cNvSpPr>
-            <a:spLocks noGrp="1"/>
-          </p:cNvSpPr>
-          <p:nvPr>
-            <p:ph type="title"/>
-          </p:nvPr>
-        </p:nvSpPr>
-        <p:spPr>
-          <a:xfrm>
-            <a:off x="838200" y="593725"/>
-            <a:ext cx="10515600" cy="1325563"/>
-          </a:xfrm>
-        </p:spPr>
-        <p:txBody>
-          <a:bodyPr>
-            <a:normAutofit/>
-          </a:bodyPr>
-          <a:lstStyle/>
-          <a:p>
-            <a:r>
-              <a:rPr lang="en-US" dirty="0"/>
-              <a:t>Conclusions</a:t>
-            </a:r>
-          </a:p>
-        </p:txBody>
-      </p:sp>
-      <p:sp>
-        <p:nvSpPr>
-          <p:cNvPr id="3" name="Content Placeholder 2">
-            <a:extLst>
-              <a:ext uri="{FF2B5EF4-FFF2-40B4-BE49-F238E27FC236}">
-                <a16:creationId xmlns:a16="http://schemas.microsoft.com/office/drawing/2014/main" id="{C4F1A618-530F-D746-FAF5-0E38C47B5C08}"/>
-              </a:ext>
-            </a:extLst>
-          </p:cNvPr>
-          <p:cNvSpPr>
-            <a:spLocks noGrp="1"/>
-          </p:cNvSpPr>
-          <p:nvPr>
-            <p:ph idx="1"/>
-          </p:nvPr>
-        </p:nvSpPr>
-        <p:spPr>
-          <a:xfrm>
-            <a:off x="838200" y="1919289"/>
-            <a:ext cx="10515600" cy="4623402"/>
-          </a:xfrm>
-        </p:spPr>
-        <p:txBody>
-          <a:bodyPr>
-            <a:normAutofit/>
-          </a:bodyPr>
-          <a:lstStyle/>
-          <a:p>
-            <a:r>
-              <a:rPr lang="en-US" dirty="0"/>
-              <a:t>don’t see effect of previous treatments (radiation, chemoradiation…) on baseline cancer immunotypes (data not shown)</a:t>
-            </a:r>
-          </a:p>
-          <a:p>
-            <a:r>
-              <a:rPr lang="en-US" dirty="0"/>
-              <a:t>ICA does not appear better at distinguishing unique immunotypes by group (baseline) than PCA</a:t>
-            </a:r>
-          </a:p>
-        </p:txBody>
-      </p:sp>
-    </p:spTree>
-    <p:extLst>
-      <p:ext uri="{BB962C8B-B14F-4D97-AF65-F5344CB8AC3E}">
-        <p14:creationId xmlns:p14="http://schemas.microsoft.com/office/powerpoint/2010/main" val="2812621026"/>
       </p:ext>
     </p:extLst>
   </p:cSld>

</xml_diff>

<commit_message>
Add ~significant no vs. yes irae baseline results
</commit_message>
<xml_diff>
--- a/presentations/NCI_talks/2024_10_23.pptx
+++ b/presentations/NCI_talks/2024_10_23.pptx
@@ -5,7 +5,7 @@
     <p:sldMasterId id="2147483648" r:id="rId1"/>
   </p:sldMasterIdLst>
   <p:notesMasterIdLst>
-    <p:notesMasterId r:id="rId14"/>
+    <p:notesMasterId r:id="rId16"/>
   </p:notesMasterIdLst>
   <p:sldIdLst>
     <p:sldId id="256" r:id="rId2"/>
@@ -16,10 +16,12 @@
     <p:sldId id="579" r:id="rId7"/>
     <p:sldId id="580" r:id="rId8"/>
     <p:sldId id="583" r:id="rId9"/>
-    <p:sldId id="581" r:id="rId10"/>
-    <p:sldId id="550" r:id="rId11"/>
-    <p:sldId id="529" r:id="rId12"/>
-    <p:sldId id="576" r:id="rId13"/>
+    <p:sldId id="585" r:id="rId10"/>
+    <p:sldId id="581" r:id="rId11"/>
+    <p:sldId id="550" r:id="rId12"/>
+    <p:sldId id="529" r:id="rId13"/>
+    <p:sldId id="576" r:id="rId14"/>
+    <p:sldId id="584" r:id="rId15"/>
   </p:sldIdLst>
   <p:sldSz cx="12192000" cy="6858000"/>
   <p:notesSz cx="6858000" cy="9144000"/>
@@ -219,7 +221,7 @@
           <a:p>
             <a:fld id="{E933A773-0DCE-3544-BB67-D5FA58DF903C}" type="datetimeFigureOut">
               <a:rPr lang="en-US" smtClean="0"/>
-              <a:t>9/28/24</a:t>
+              <a:t>10/9/24</a:t>
             </a:fld>
             <a:endParaRPr lang="en-US"/>
           </a:p>
@@ -578,6 +580,120 @@
         <p:cNvPr id="1" name="">
           <a:extLst>
             <a:ext uri="{FF2B5EF4-FFF2-40B4-BE49-F238E27FC236}">
+              <a16:creationId xmlns:a16="http://schemas.microsoft.com/office/drawing/2014/main" id="{1A615A9B-FCEE-6F7D-9622-145DAC34BE0D}"/>
+            </a:ext>
+          </a:extLst>
+        </p:cNvPr>
+        <p:cNvGrpSpPr/>
+        <p:nvPr/>
+      </p:nvGrpSpPr>
+      <p:grpSpPr>
+        <a:xfrm>
+          <a:off x="0" y="0"/>
+          <a:ext cx="0" cy="0"/>
+          <a:chOff x="0" y="0"/>
+          <a:chExt cx="0" cy="0"/>
+        </a:xfrm>
+      </p:grpSpPr>
+      <p:sp>
+        <p:nvSpPr>
+          <p:cNvPr id="2" name="Slide Image Placeholder 1">
+            <a:extLst>
+              <a:ext uri="{FF2B5EF4-FFF2-40B4-BE49-F238E27FC236}">
+                <a16:creationId xmlns:a16="http://schemas.microsoft.com/office/drawing/2014/main" id="{F88C4DD4-92A1-2BD9-9D66-AE40E8E54748}"/>
+              </a:ext>
+            </a:extLst>
+          </p:cNvPr>
+          <p:cNvSpPr>
+            <a:spLocks noGrp="1" noRot="1" noChangeAspect="1"/>
+          </p:cNvSpPr>
+          <p:nvPr>
+            <p:ph type="sldImg"/>
+          </p:nvPr>
+        </p:nvSpPr>
+        <p:spPr/>
+      </p:sp>
+      <p:sp>
+        <p:nvSpPr>
+          <p:cNvPr id="3" name="Notes Placeholder 2">
+            <a:extLst>
+              <a:ext uri="{FF2B5EF4-FFF2-40B4-BE49-F238E27FC236}">
+                <a16:creationId xmlns:a16="http://schemas.microsoft.com/office/drawing/2014/main" id="{8F6F45D9-2262-CE49-7AAF-99DB701077C6}"/>
+              </a:ext>
+            </a:extLst>
+          </p:cNvPr>
+          <p:cNvSpPr>
+            <a:spLocks noGrp="1"/>
+          </p:cNvSpPr>
+          <p:nvPr>
+            <p:ph type="body" idx="1"/>
+          </p:nvPr>
+        </p:nvSpPr>
+        <p:spPr/>
+        <p:txBody>
+          <a:bodyPr/>
+          <a:lstStyle/>
+          <a:p>
+            <a:endParaRPr lang="en-US" b="0" dirty="0">
+              <a:solidFill>
+                <a:srgbClr val="CCCCCC"/>
+              </a:solidFill>
+              <a:effectLst/>
+              <a:latin typeface="Menlo" panose="020B0609030804020204" pitchFamily="49" charset="0"/>
+            </a:endParaRPr>
+          </a:p>
+        </p:txBody>
+      </p:sp>
+      <p:sp>
+        <p:nvSpPr>
+          <p:cNvPr id="4" name="Slide Number Placeholder 3">
+            <a:extLst>
+              <a:ext uri="{FF2B5EF4-FFF2-40B4-BE49-F238E27FC236}">
+                <a16:creationId xmlns:a16="http://schemas.microsoft.com/office/drawing/2014/main" id="{28F708A8-1A74-B964-5810-DE42CC8DD556}"/>
+              </a:ext>
+            </a:extLst>
+          </p:cNvPr>
+          <p:cNvSpPr>
+            <a:spLocks noGrp="1"/>
+          </p:cNvSpPr>
+          <p:nvPr>
+            <p:ph type="sldNum" sz="quarter" idx="5"/>
+          </p:nvPr>
+        </p:nvSpPr>
+        <p:spPr/>
+        <p:txBody>
+          <a:bodyPr/>
+          <a:lstStyle/>
+          <a:p>
+            <a:fld id="{061BAA8C-FDC6-D345-B4E0-3B02449209FB}" type="slidenum">
+              <a:rPr lang="en-US" smtClean="0"/>
+              <a:t>10</a:t>
+            </a:fld>
+            <a:endParaRPr lang="en-US"/>
+          </a:p>
+        </p:txBody>
+      </p:sp>
+    </p:spTree>
+    <p:extLst>
+      <p:ext uri="{BB962C8B-B14F-4D97-AF65-F5344CB8AC3E}">
+        <p14:creationId xmlns:p14="http://schemas.microsoft.com/office/powerpoint/2010/main" val="1387096064"/>
+      </p:ext>
+    </p:extLst>
+  </p:cSld>
+  <p:clrMapOvr>
+    <a:masterClrMapping/>
+  </p:clrMapOvr>
+</p:notes>
+</file>
+
+<file path=ppt/notesSlides/notesSlide11.xml><?xml version="1.0" encoding="utf-8"?>
+<p:notes xmlns:a="http://schemas.openxmlformats.org/drawingml/2006/main" xmlns:r="http://schemas.openxmlformats.org/officeDocument/2006/relationships" xmlns:p="http://schemas.openxmlformats.org/presentationml/2006/main">
+  <p:cSld>
+    <p:spTree>
+      <p:nvGrpSpPr>
+        <p:cNvPr id="1" name="">
+          <a:extLst>
+            <a:ext uri="{FF2B5EF4-FFF2-40B4-BE49-F238E27FC236}">
               <a16:creationId xmlns:a16="http://schemas.microsoft.com/office/drawing/2014/main" id="{7A8E08F8-B466-1EC2-BB28-39C456B2B371}"/>
             </a:ext>
           </a:extLst>
@@ -665,7 +781,7 @@
           <a:p>
             <a:fld id="{061BAA8C-FDC6-D345-B4E0-3B02449209FB}" type="slidenum">
               <a:rPr lang="en-US" smtClean="0"/>
-              <a:t>10</a:t>
+              <a:t>11</a:t>
             </a:fld>
             <a:endParaRPr lang="en-US"/>
           </a:p>
@@ -675,90 +791,6 @@
     <p:extLst>
       <p:ext uri="{BB962C8B-B14F-4D97-AF65-F5344CB8AC3E}">
         <p14:creationId xmlns:p14="http://schemas.microsoft.com/office/powerpoint/2010/main" val="1028389668"/>
-      </p:ext>
-    </p:extLst>
-  </p:cSld>
-  <p:clrMapOvr>
-    <a:masterClrMapping/>
-  </p:clrMapOvr>
-</p:notes>
-</file>
-
-<file path=ppt/notesSlides/notesSlide11.xml><?xml version="1.0" encoding="utf-8"?>
-<p:notes xmlns:a="http://schemas.openxmlformats.org/drawingml/2006/main" xmlns:r="http://schemas.openxmlformats.org/officeDocument/2006/relationships" xmlns:p="http://schemas.openxmlformats.org/presentationml/2006/main">
-  <p:cSld>
-    <p:spTree>
-      <p:nvGrpSpPr>
-        <p:cNvPr id="1" name=""/>
-        <p:cNvGrpSpPr/>
-        <p:nvPr/>
-      </p:nvGrpSpPr>
-      <p:grpSpPr>
-        <a:xfrm>
-          <a:off x="0" y="0"/>
-          <a:ext cx="0" cy="0"/>
-          <a:chOff x="0" y="0"/>
-          <a:chExt cx="0" cy="0"/>
-        </a:xfrm>
-      </p:grpSpPr>
-      <p:sp>
-        <p:nvSpPr>
-          <p:cNvPr id="2" name="Slide Image Placeholder 1"/>
-          <p:cNvSpPr>
-            <a:spLocks noGrp="1" noRot="1" noChangeAspect="1"/>
-          </p:cNvSpPr>
-          <p:nvPr>
-            <p:ph type="sldImg"/>
-          </p:nvPr>
-        </p:nvSpPr>
-        <p:spPr/>
-      </p:sp>
-      <p:sp>
-        <p:nvSpPr>
-          <p:cNvPr id="3" name="Notes Placeholder 2"/>
-          <p:cNvSpPr>
-            <a:spLocks noGrp="1"/>
-          </p:cNvSpPr>
-          <p:nvPr>
-            <p:ph type="body" idx="1"/>
-          </p:nvPr>
-        </p:nvSpPr>
-        <p:spPr/>
-        <p:txBody>
-          <a:bodyPr/>
-          <a:lstStyle/>
-          <a:p>
-            <a:endParaRPr lang="en-US" dirty="0"/>
-          </a:p>
-        </p:txBody>
-      </p:sp>
-      <p:sp>
-        <p:nvSpPr>
-          <p:cNvPr id="4" name="Slide Number Placeholder 3"/>
-          <p:cNvSpPr>
-            <a:spLocks noGrp="1"/>
-          </p:cNvSpPr>
-          <p:nvPr>
-            <p:ph type="sldNum" sz="quarter" idx="5"/>
-          </p:nvPr>
-        </p:nvSpPr>
-        <p:spPr/>
-        <p:txBody>
-          <a:bodyPr/>
-          <a:lstStyle/>
-          <a:p>
-            <a:fld id="{061BAA8C-FDC6-D345-B4E0-3B02449209FB}" type="slidenum">
-              <a:rPr lang="en-US" smtClean="0"/>
-              <a:t>11</a:t>
-            </a:fld>
-            <a:endParaRPr lang="en-US"/>
-          </a:p>
-        </p:txBody>
-      </p:sp>
-    </p:spTree>
-    <p:extLst>
-      <p:ext uri="{BB962C8B-B14F-4D97-AF65-F5344CB8AC3E}">
-        <p14:creationId xmlns:p14="http://schemas.microsoft.com/office/powerpoint/2010/main" val="3703388347"/>
       </p:ext>
     </p:extLst>
   </p:cSld>
@@ -812,6 +844,90 @@
           <a:bodyPr/>
           <a:lstStyle/>
           <a:p>
+            <a:endParaRPr lang="en-US" dirty="0"/>
+          </a:p>
+        </p:txBody>
+      </p:sp>
+      <p:sp>
+        <p:nvSpPr>
+          <p:cNvPr id="4" name="Slide Number Placeholder 3"/>
+          <p:cNvSpPr>
+            <a:spLocks noGrp="1"/>
+          </p:cNvSpPr>
+          <p:nvPr>
+            <p:ph type="sldNum" sz="quarter" idx="5"/>
+          </p:nvPr>
+        </p:nvSpPr>
+        <p:spPr/>
+        <p:txBody>
+          <a:bodyPr/>
+          <a:lstStyle/>
+          <a:p>
+            <a:fld id="{061BAA8C-FDC6-D345-B4E0-3B02449209FB}" type="slidenum">
+              <a:rPr lang="en-US" smtClean="0"/>
+              <a:t>12</a:t>
+            </a:fld>
+            <a:endParaRPr lang="en-US"/>
+          </a:p>
+        </p:txBody>
+      </p:sp>
+    </p:spTree>
+    <p:extLst>
+      <p:ext uri="{BB962C8B-B14F-4D97-AF65-F5344CB8AC3E}">
+        <p14:creationId xmlns:p14="http://schemas.microsoft.com/office/powerpoint/2010/main" val="3703388347"/>
+      </p:ext>
+    </p:extLst>
+  </p:cSld>
+  <p:clrMapOvr>
+    <a:masterClrMapping/>
+  </p:clrMapOvr>
+</p:notes>
+</file>
+
+<file path=ppt/notesSlides/notesSlide13.xml><?xml version="1.0" encoding="utf-8"?>
+<p:notes xmlns:a="http://schemas.openxmlformats.org/drawingml/2006/main" xmlns:r="http://schemas.openxmlformats.org/officeDocument/2006/relationships" xmlns:p="http://schemas.openxmlformats.org/presentationml/2006/main">
+  <p:cSld>
+    <p:spTree>
+      <p:nvGrpSpPr>
+        <p:cNvPr id="1" name=""/>
+        <p:cNvGrpSpPr/>
+        <p:nvPr/>
+      </p:nvGrpSpPr>
+      <p:grpSpPr>
+        <a:xfrm>
+          <a:off x="0" y="0"/>
+          <a:ext cx="0" cy="0"/>
+          <a:chOff x="0" y="0"/>
+          <a:chExt cx="0" cy="0"/>
+        </a:xfrm>
+      </p:grpSpPr>
+      <p:sp>
+        <p:nvSpPr>
+          <p:cNvPr id="2" name="Slide Image Placeholder 1"/>
+          <p:cNvSpPr>
+            <a:spLocks noGrp="1" noRot="1" noChangeAspect="1"/>
+          </p:cNvSpPr>
+          <p:nvPr>
+            <p:ph type="sldImg"/>
+          </p:nvPr>
+        </p:nvSpPr>
+        <p:spPr/>
+      </p:sp>
+      <p:sp>
+        <p:nvSpPr>
+          <p:cNvPr id="3" name="Notes Placeholder 2"/>
+          <p:cNvSpPr>
+            <a:spLocks noGrp="1"/>
+          </p:cNvSpPr>
+          <p:nvPr>
+            <p:ph type="body" idx="1"/>
+          </p:nvPr>
+        </p:nvSpPr>
+        <p:spPr/>
+        <p:txBody>
+          <a:bodyPr/>
+          <a:lstStyle/>
+          <a:p>
             <a:endParaRPr lang="en-US" b="0" i="0" u="none" strike="noStrike" dirty="0">
               <a:solidFill>
                 <a:srgbClr val="212121"/>
@@ -839,7 +955,7 @@
           <a:p>
             <a:fld id="{061BAA8C-FDC6-D345-B4E0-3B02449209FB}" type="slidenum">
               <a:rPr lang="en-US" smtClean="0"/>
-              <a:t>12</a:t>
+              <a:t>13</a:t>
             </a:fld>
             <a:endParaRPr lang="en-US"/>
           </a:p>
@@ -849,6 +965,120 @@
     <p:extLst>
       <p:ext uri="{BB962C8B-B14F-4D97-AF65-F5344CB8AC3E}">
         <p14:creationId xmlns:p14="http://schemas.microsoft.com/office/powerpoint/2010/main" val="605091724"/>
+      </p:ext>
+    </p:extLst>
+  </p:cSld>
+  <p:clrMapOvr>
+    <a:masterClrMapping/>
+  </p:clrMapOvr>
+</p:notes>
+</file>
+
+<file path=ppt/notesSlides/notesSlide14.xml><?xml version="1.0" encoding="utf-8"?>
+<p:notes xmlns:a="http://schemas.openxmlformats.org/drawingml/2006/main" xmlns:r="http://schemas.openxmlformats.org/officeDocument/2006/relationships" xmlns:p="http://schemas.openxmlformats.org/presentationml/2006/main">
+  <p:cSld>
+    <p:spTree>
+      <p:nvGrpSpPr>
+        <p:cNvPr id="1" name="">
+          <a:extLst>
+            <a:ext uri="{FF2B5EF4-FFF2-40B4-BE49-F238E27FC236}">
+              <a16:creationId xmlns:a16="http://schemas.microsoft.com/office/drawing/2014/main" id="{555F9067-16DF-05C2-4F7D-D4AD8A50B093}"/>
+            </a:ext>
+          </a:extLst>
+        </p:cNvPr>
+        <p:cNvGrpSpPr/>
+        <p:nvPr/>
+      </p:nvGrpSpPr>
+      <p:grpSpPr>
+        <a:xfrm>
+          <a:off x="0" y="0"/>
+          <a:ext cx="0" cy="0"/>
+          <a:chOff x="0" y="0"/>
+          <a:chExt cx="0" cy="0"/>
+        </a:xfrm>
+      </p:grpSpPr>
+      <p:sp>
+        <p:nvSpPr>
+          <p:cNvPr id="2" name="Slide Image Placeholder 1">
+            <a:extLst>
+              <a:ext uri="{FF2B5EF4-FFF2-40B4-BE49-F238E27FC236}">
+                <a16:creationId xmlns:a16="http://schemas.microsoft.com/office/drawing/2014/main" id="{7DC6132F-9268-A499-59F0-7BA2FC6C10FD}"/>
+              </a:ext>
+            </a:extLst>
+          </p:cNvPr>
+          <p:cNvSpPr>
+            <a:spLocks noGrp="1" noRot="1" noChangeAspect="1"/>
+          </p:cNvSpPr>
+          <p:nvPr>
+            <p:ph type="sldImg"/>
+          </p:nvPr>
+        </p:nvSpPr>
+        <p:spPr/>
+      </p:sp>
+      <p:sp>
+        <p:nvSpPr>
+          <p:cNvPr id="3" name="Notes Placeholder 2">
+            <a:extLst>
+              <a:ext uri="{FF2B5EF4-FFF2-40B4-BE49-F238E27FC236}">
+                <a16:creationId xmlns:a16="http://schemas.microsoft.com/office/drawing/2014/main" id="{C9C9BA8A-8BC5-48B5-29E8-0A6462EE560F}"/>
+              </a:ext>
+            </a:extLst>
+          </p:cNvPr>
+          <p:cNvSpPr>
+            <a:spLocks noGrp="1"/>
+          </p:cNvSpPr>
+          <p:nvPr>
+            <p:ph type="body" idx="1"/>
+          </p:nvPr>
+        </p:nvSpPr>
+        <p:spPr/>
+        <p:txBody>
+          <a:bodyPr/>
+          <a:lstStyle/>
+          <a:p>
+            <a:endParaRPr lang="en-US" b="0" i="0" u="none" strike="noStrike" dirty="0">
+              <a:solidFill>
+                <a:srgbClr val="212121"/>
+              </a:solidFill>
+              <a:effectLst/>
+              <a:latin typeface="Cambria" panose="02040503050406030204" pitchFamily="18" charset="0"/>
+            </a:endParaRPr>
+          </a:p>
+        </p:txBody>
+      </p:sp>
+      <p:sp>
+        <p:nvSpPr>
+          <p:cNvPr id="4" name="Slide Number Placeholder 3">
+            <a:extLst>
+              <a:ext uri="{FF2B5EF4-FFF2-40B4-BE49-F238E27FC236}">
+                <a16:creationId xmlns:a16="http://schemas.microsoft.com/office/drawing/2014/main" id="{38FE31FB-F0DE-A1A1-3935-AADC8A3CFC74}"/>
+              </a:ext>
+            </a:extLst>
+          </p:cNvPr>
+          <p:cNvSpPr>
+            <a:spLocks noGrp="1"/>
+          </p:cNvSpPr>
+          <p:nvPr>
+            <p:ph type="sldNum" sz="quarter" idx="5"/>
+          </p:nvPr>
+        </p:nvSpPr>
+        <p:spPr/>
+        <p:txBody>
+          <a:bodyPr/>
+          <a:lstStyle/>
+          <a:p>
+            <a:fld id="{061BAA8C-FDC6-D345-B4E0-3B02449209FB}" type="slidenum">
+              <a:rPr lang="en-US" smtClean="0"/>
+              <a:t>14</a:t>
+            </a:fld>
+            <a:endParaRPr lang="en-US"/>
+          </a:p>
+        </p:txBody>
+      </p:sp>
+    </p:spTree>
+    <p:extLst>
+      <p:ext uri="{BB962C8B-B14F-4D97-AF65-F5344CB8AC3E}">
+        <p14:creationId xmlns:p14="http://schemas.microsoft.com/office/powerpoint/2010/main" val="3768784977"/>
       </p:ext>
     </p:extLst>
   </p:cSld>
@@ -2956,7 +3186,7 @@
         <p:cNvPr id="1" name="">
           <a:extLst>
             <a:ext uri="{FF2B5EF4-FFF2-40B4-BE49-F238E27FC236}">
-              <a16:creationId xmlns:a16="http://schemas.microsoft.com/office/drawing/2014/main" id="{1A615A9B-FCEE-6F7D-9622-145DAC34BE0D}"/>
+              <a16:creationId xmlns:a16="http://schemas.microsoft.com/office/drawing/2014/main" id="{0348CD35-B26E-DD31-6A9C-1245CDAA48E4}"/>
             </a:ext>
           </a:extLst>
         </p:cNvPr>
@@ -2976,7 +3206,7 @@
           <p:cNvPr id="2" name="Slide Image Placeholder 1">
             <a:extLst>
               <a:ext uri="{FF2B5EF4-FFF2-40B4-BE49-F238E27FC236}">
-                <a16:creationId xmlns:a16="http://schemas.microsoft.com/office/drawing/2014/main" id="{F88C4DD4-92A1-2BD9-9D66-AE40E8E54748}"/>
+                <a16:creationId xmlns:a16="http://schemas.microsoft.com/office/drawing/2014/main" id="{5E7D9DF8-F76D-F55E-AF01-22FBA1B00E54}"/>
               </a:ext>
             </a:extLst>
           </p:cNvPr>
@@ -2994,7 +3224,7 @@
           <p:cNvPr id="3" name="Notes Placeholder 2">
             <a:extLst>
               <a:ext uri="{FF2B5EF4-FFF2-40B4-BE49-F238E27FC236}">
-                <a16:creationId xmlns:a16="http://schemas.microsoft.com/office/drawing/2014/main" id="{8F6F45D9-2262-CE49-7AAF-99DB701077C6}"/>
+                <a16:creationId xmlns:a16="http://schemas.microsoft.com/office/drawing/2014/main" id="{534E5AB6-4F7F-3A4B-FFFA-BB5C8E16DDF8}"/>
               </a:ext>
             </a:extLst>
           </p:cNvPr>
@@ -3025,7 +3255,7 @@
           <p:cNvPr id="4" name="Slide Number Placeholder 3">
             <a:extLst>
               <a:ext uri="{FF2B5EF4-FFF2-40B4-BE49-F238E27FC236}">
-                <a16:creationId xmlns:a16="http://schemas.microsoft.com/office/drawing/2014/main" id="{28F708A8-1A74-B964-5810-DE42CC8DD556}"/>
+                <a16:creationId xmlns:a16="http://schemas.microsoft.com/office/drawing/2014/main" id="{DD806F56-D23A-01B9-33C3-2F721CA8230C}"/>
               </a:ext>
             </a:extLst>
           </p:cNvPr>
@@ -3052,7 +3282,7 @@
     </p:spTree>
     <p:extLst>
       <p:ext uri="{BB962C8B-B14F-4D97-AF65-F5344CB8AC3E}">
-        <p14:creationId xmlns:p14="http://schemas.microsoft.com/office/powerpoint/2010/main" val="1387096064"/>
+        <p14:creationId xmlns:p14="http://schemas.microsoft.com/office/powerpoint/2010/main" val="3929315933"/>
       </p:ext>
     </p:extLst>
   </p:cSld>
@@ -3209,7 +3439,7 @@
           <a:p>
             <a:fld id="{80FC6068-BAFB-FC44-B9D8-F4B3BB105DE6}" type="datetimeFigureOut">
               <a:rPr lang="en-US" smtClean="0"/>
-              <a:t>9/28/24</a:t>
+              <a:t>10/9/24</a:t>
             </a:fld>
             <a:endParaRPr lang="en-US"/>
           </a:p>
@@ -3407,7 +3637,7 @@
           <a:p>
             <a:fld id="{80FC6068-BAFB-FC44-B9D8-F4B3BB105DE6}" type="datetimeFigureOut">
               <a:rPr lang="en-US" smtClean="0"/>
-              <a:t>9/28/24</a:t>
+              <a:t>10/9/24</a:t>
             </a:fld>
             <a:endParaRPr lang="en-US"/>
           </a:p>
@@ -3615,7 +3845,7 @@
           <a:p>
             <a:fld id="{80FC6068-BAFB-FC44-B9D8-F4B3BB105DE6}" type="datetimeFigureOut">
               <a:rPr lang="en-US" smtClean="0"/>
-              <a:t>9/28/24</a:t>
+              <a:t>10/9/24</a:t>
             </a:fld>
             <a:endParaRPr lang="en-US"/>
           </a:p>
@@ -3819,7 +4049,7 @@
           <a:p>
             <a:fld id="{80FC6068-BAFB-FC44-B9D8-F4B3BB105DE6}" type="datetimeFigureOut">
               <a:rPr lang="en-US" smtClean="0"/>
-              <a:t>9/28/24</a:t>
+              <a:t>10/9/24</a:t>
             </a:fld>
             <a:endParaRPr lang="en-US"/>
           </a:p>
@@ -4110,7 +4340,7 @@
           <a:p>
             <a:fld id="{80FC6068-BAFB-FC44-B9D8-F4B3BB105DE6}" type="datetimeFigureOut">
               <a:rPr lang="en-US" smtClean="0"/>
-              <a:t>9/28/24</a:t>
+              <a:t>10/9/24</a:t>
             </a:fld>
             <a:endParaRPr lang="en-US"/>
           </a:p>
@@ -4375,7 +4605,7 @@
           <a:p>
             <a:fld id="{80FC6068-BAFB-FC44-B9D8-F4B3BB105DE6}" type="datetimeFigureOut">
               <a:rPr lang="en-US" smtClean="0"/>
-              <a:t>9/28/24</a:t>
+              <a:t>10/9/24</a:t>
             </a:fld>
             <a:endParaRPr lang="en-US"/>
           </a:p>
@@ -4787,7 +5017,7 @@
           <a:p>
             <a:fld id="{80FC6068-BAFB-FC44-B9D8-F4B3BB105DE6}" type="datetimeFigureOut">
               <a:rPr lang="en-US" smtClean="0"/>
-              <a:t>9/28/24</a:t>
+              <a:t>10/9/24</a:t>
             </a:fld>
             <a:endParaRPr lang="en-US"/>
           </a:p>
@@ -4928,7 +5158,7 @@
           <a:p>
             <a:fld id="{80FC6068-BAFB-FC44-B9D8-F4B3BB105DE6}" type="datetimeFigureOut">
               <a:rPr lang="en-US" smtClean="0"/>
-              <a:t>9/28/24</a:t>
+              <a:t>10/9/24</a:t>
             </a:fld>
             <a:endParaRPr lang="en-US"/>
           </a:p>
@@ -5041,7 +5271,7 @@
           <a:p>
             <a:fld id="{80FC6068-BAFB-FC44-B9D8-F4B3BB105DE6}" type="datetimeFigureOut">
               <a:rPr lang="en-US" smtClean="0"/>
-              <a:t>9/28/24</a:t>
+              <a:t>10/9/24</a:t>
             </a:fld>
             <a:endParaRPr lang="en-US"/>
           </a:p>
@@ -5352,7 +5582,7 @@
           <a:p>
             <a:fld id="{80FC6068-BAFB-FC44-B9D8-F4B3BB105DE6}" type="datetimeFigureOut">
               <a:rPr lang="en-US" smtClean="0"/>
-              <a:t>9/28/24</a:t>
+              <a:t>10/9/24</a:t>
             </a:fld>
             <a:endParaRPr lang="en-US"/>
           </a:p>
@@ -5640,7 +5870,7 @@
           <a:p>
             <a:fld id="{80FC6068-BAFB-FC44-B9D8-F4B3BB105DE6}" type="datetimeFigureOut">
               <a:rPr lang="en-US" smtClean="0"/>
-              <a:t>9/28/24</a:t>
+              <a:t>10/9/24</a:t>
             </a:fld>
             <a:endParaRPr lang="en-US"/>
           </a:p>
@@ -5881,7 +6111,7 @@
           <a:p>
             <a:fld id="{80FC6068-BAFB-FC44-B9D8-F4B3BB105DE6}" type="datetimeFigureOut">
               <a:rPr lang="en-US" smtClean="0"/>
-              <a:t>9/28/24</a:t>
+              <a:t>10/9/24</a:t>
             </a:fld>
             <a:endParaRPr lang="en-US"/>
           </a:p>
@@ -6411,6 +6641,107 @@
         <p:cNvPr id="1" name="">
           <a:extLst>
             <a:ext uri="{FF2B5EF4-FFF2-40B4-BE49-F238E27FC236}">
+              <a16:creationId xmlns:a16="http://schemas.microsoft.com/office/drawing/2014/main" id="{4499FADC-FBBC-EB4A-05BF-5CF1F6439490}"/>
+            </a:ext>
+          </a:extLst>
+        </p:cNvPr>
+        <p:cNvGrpSpPr/>
+        <p:nvPr/>
+      </p:nvGrpSpPr>
+      <p:grpSpPr>
+        <a:xfrm>
+          <a:off x="0" y="0"/>
+          <a:ext cx="0" cy="0"/>
+          <a:chOff x="0" y="0"/>
+          <a:chExt cx="0" cy="0"/>
+        </a:xfrm>
+      </p:grpSpPr>
+      <p:sp>
+        <p:nvSpPr>
+          <p:cNvPr id="2" name="Title 1">
+            <a:extLst>
+              <a:ext uri="{FF2B5EF4-FFF2-40B4-BE49-F238E27FC236}">
+                <a16:creationId xmlns:a16="http://schemas.microsoft.com/office/drawing/2014/main" id="{5EBCB7C7-7960-F4FD-4CEB-710E69BA52B0}"/>
+              </a:ext>
+            </a:extLst>
+          </p:cNvPr>
+          <p:cNvSpPr>
+            <a:spLocks noGrp="1"/>
+          </p:cNvSpPr>
+          <p:nvPr>
+            <p:ph type="title"/>
+          </p:nvPr>
+        </p:nvSpPr>
+        <p:spPr>
+          <a:xfrm>
+            <a:off x="838200" y="593725"/>
+            <a:ext cx="10134599" cy="1325563"/>
+          </a:xfrm>
+        </p:spPr>
+        <p:txBody>
+          <a:bodyPr>
+            <a:normAutofit/>
+          </a:bodyPr>
+          <a:lstStyle/>
+          <a:p>
+            <a:r>
+              <a:rPr lang="en-US" dirty="0"/>
+              <a:t>Certain features contribute more to variation (baseline)</a:t>
+            </a:r>
+          </a:p>
+        </p:txBody>
+      </p:sp>
+      <p:pic>
+        <p:nvPicPr>
+          <p:cNvPr id="7" name="Picture 6">
+            <a:extLst>
+              <a:ext uri="{FF2B5EF4-FFF2-40B4-BE49-F238E27FC236}">
+                <a16:creationId xmlns:a16="http://schemas.microsoft.com/office/drawing/2014/main" id="{2F87F56D-0CFE-CFA2-3209-B454C0FB72CB}"/>
+              </a:ext>
+            </a:extLst>
+          </p:cNvPr>
+          <p:cNvPicPr>
+            <a:picLocks noChangeAspect="1"/>
+          </p:cNvPicPr>
+          <p:nvPr/>
+        </p:nvPicPr>
+        <p:blipFill>
+          <a:blip r:embed="rId3"/>
+          <a:stretch>
+            <a:fillRect/>
+          </a:stretch>
+        </p:blipFill>
+        <p:spPr>
+          <a:xfrm>
+            <a:off x="3167742" y="1257352"/>
+            <a:ext cx="7010399" cy="5600647"/>
+          </a:xfrm>
+          <a:prstGeom prst="rect">
+            <a:avLst/>
+          </a:prstGeom>
+        </p:spPr>
+      </p:pic>
+    </p:spTree>
+    <p:extLst>
+      <p:ext uri="{BB962C8B-B14F-4D97-AF65-F5344CB8AC3E}">
+        <p14:creationId xmlns:p14="http://schemas.microsoft.com/office/powerpoint/2010/main" val="211499257"/>
+      </p:ext>
+    </p:extLst>
+  </p:cSld>
+  <p:clrMapOvr>
+    <a:masterClrMapping/>
+  </p:clrMapOvr>
+</p:sld>
+</file>
+
+<file path=ppt/slides/slide11.xml><?xml version="1.0" encoding="utf-8"?>
+<p:sld xmlns:a="http://schemas.openxmlformats.org/drawingml/2006/main" xmlns:r="http://schemas.openxmlformats.org/officeDocument/2006/relationships" xmlns:p="http://schemas.openxmlformats.org/presentationml/2006/main">
+  <p:cSld>
+    <p:spTree>
+      <p:nvGrpSpPr>
+        <p:cNvPr id="1" name="">
+          <a:extLst>
+            <a:ext uri="{FF2B5EF4-FFF2-40B4-BE49-F238E27FC236}">
               <a16:creationId xmlns:a16="http://schemas.microsoft.com/office/drawing/2014/main" id="{C55D7743-C5CC-7163-42F9-8A139DE9A99C}"/>
             </a:ext>
           </a:extLst>
@@ -6500,109 +6831,66 @@
               <a:t>ICA does not appear better at distinguishing unique immunotypes by group (baseline) than PCA</a:t>
             </a:r>
           </a:p>
+          <a:p>
+            <a:r>
+              <a:rPr lang="en-US" dirty="0"/>
+              <a:t>PD1</a:t>
+            </a:r>
+            <a:r>
+              <a:rPr lang="en-US" baseline="30000" dirty="0"/>
+              <a:t>+</a:t>
+            </a:r>
+            <a:r>
+              <a:rPr lang="en-US" dirty="0"/>
+              <a:t> of CM </a:t>
+            </a:r>
+            <a:r>
+              <a:rPr lang="en-US" dirty="0" err="1"/>
+              <a:t>T</a:t>
+            </a:r>
+            <a:r>
+              <a:rPr lang="en-US" baseline="-25000" dirty="0" err="1"/>
+              <a:t>conv</a:t>
+            </a:r>
+            <a:r>
+              <a:rPr lang="en-US" dirty="0"/>
+              <a:t> </a:t>
+            </a:r>
+            <a:r>
+              <a:rPr lang="en-US" dirty="0" err="1"/>
+              <a:t>T</a:t>
+            </a:r>
+            <a:r>
+              <a:rPr lang="en-US" baseline="-25000" dirty="0" err="1"/>
+              <a:t>cells</a:t>
+            </a:r>
+            <a:r>
+              <a:rPr lang="en-US" dirty="0"/>
+              <a:t> slightly higher in non-</a:t>
+            </a:r>
+            <a:r>
+              <a:rPr lang="en-US" dirty="0" err="1"/>
+              <a:t>irAE</a:t>
+            </a:r>
+            <a:r>
+              <a:rPr lang="en-US" dirty="0"/>
+              <a:t> group vs. </a:t>
+            </a:r>
+            <a:r>
+              <a:rPr lang="en-US" dirty="0" err="1"/>
+              <a:t>irAE</a:t>
+            </a:r>
+            <a:r>
+              <a:rPr lang="en-US" dirty="0"/>
+              <a:t>/SAE group at baseline (after regressing out batch)</a:t>
+            </a:r>
+          </a:p>
         </p:txBody>
       </p:sp>
     </p:spTree>
     <p:extLst>
       <p:ext uri="{BB962C8B-B14F-4D97-AF65-F5344CB8AC3E}">
         <p14:creationId xmlns:p14="http://schemas.microsoft.com/office/powerpoint/2010/main" val="2812621026"/>
-      </p:ext>
-    </p:extLst>
-  </p:cSld>
-  <p:clrMapOvr>
-    <a:masterClrMapping/>
-  </p:clrMapOvr>
-</p:sld>
-</file>
-
-<file path=ppt/slides/slide11.xml><?xml version="1.0" encoding="utf-8"?>
-<p:sld xmlns:a="http://schemas.openxmlformats.org/drawingml/2006/main" xmlns:r="http://schemas.openxmlformats.org/officeDocument/2006/relationships" xmlns:p="http://schemas.openxmlformats.org/presentationml/2006/main">
-  <p:cSld>
-    <p:spTree>
-      <p:nvGrpSpPr>
-        <p:cNvPr id="1" name=""/>
-        <p:cNvGrpSpPr/>
-        <p:nvPr/>
-      </p:nvGrpSpPr>
-      <p:grpSpPr>
-        <a:xfrm>
-          <a:off x="0" y="0"/>
-          <a:ext cx="0" cy="0"/>
-          <a:chOff x="0" y="0"/>
-          <a:chExt cx="0" cy="0"/>
-        </a:xfrm>
-      </p:grpSpPr>
-      <p:sp>
-        <p:nvSpPr>
-          <p:cNvPr id="2" name="Title 1">
-            <a:extLst>
-              <a:ext uri="{FF2B5EF4-FFF2-40B4-BE49-F238E27FC236}">
-                <a16:creationId xmlns:a16="http://schemas.microsoft.com/office/drawing/2014/main" id="{70A4C97D-8F21-3D3B-6A90-EA7145324964}"/>
-              </a:ext>
-            </a:extLst>
-          </p:cNvPr>
-          <p:cNvSpPr>
-            <a:spLocks noGrp="1"/>
-          </p:cNvSpPr>
-          <p:nvPr>
-            <p:ph type="title"/>
-          </p:nvPr>
-        </p:nvSpPr>
-        <p:spPr>
-          <a:xfrm>
-            <a:off x="838200" y="593725"/>
-            <a:ext cx="10515600" cy="1325563"/>
-          </a:xfrm>
-        </p:spPr>
-        <p:txBody>
-          <a:bodyPr>
-            <a:normAutofit/>
-          </a:bodyPr>
-          <a:lstStyle/>
-          <a:p>
-            <a:r>
-              <a:rPr lang="en-US" dirty="0"/>
-              <a:t>Next steps</a:t>
-            </a:r>
-          </a:p>
-        </p:txBody>
-      </p:sp>
-      <p:sp>
-        <p:nvSpPr>
-          <p:cNvPr id="3" name="Content Placeholder 2">
-            <a:extLst>
-              <a:ext uri="{FF2B5EF4-FFF2-40B4-BE49-F238E27FC236}">
-                <a16:creationId xmlns:a16="http://schemas.microsoft.com/office/drawing/2014/main" id="{B9501834-7B32-1ACA-4358-B630FB8EEC36}"/>
-              </a:ext>
-            </a:extLst>
-          </p:cNvPr>
-          <p:cNvSpPr>
-            <a:spLocks noGrp="1"/>
-          </p:cNvSpPr>
-          <p:nvPr>
-            <p:ph idx="1"/>
-          </p:nvPr>
-        </p:nvSpPr>
-        <p:spPr>
-          <a:xfrm>
-            <a:off x="838199" y="1919289"/>
-            <a:ext cx="10384857" cy="4623402"/>
-          </a:xfrm>
-        </p:spPr>
-        <p:txBody>
-          <a:bodyPr>
-            <a:normAutofit/>
-          </a:bodyPr>
-          <a:lstStyle/>
-          <a:p>
-            <a:endParaRPr lang="en-US" dirty="0"/>
-          </a:p>
-        </p:txBody>
-      </p:sp>
-    </p:spTree>
-    <p:extLst>
-      <p:ext uri="{BB962C8B-B14F-4D97-AF65-F5344CB8AC3E}">
-        <p14:creationId xmlns:p14="http://schemas.microsoft.com/office/powerpoint/2010/main" val="4091688872"/>
       </p:ext>
     </p:extLst>
   </p:cSld>
@@ -6629,6 +6917,103 @@
           <a:chExt cx="0" cy="0"/>
         </a:xfrm>
       </p:grpSpPr>
+      <p:sp>
+        <p:nvSpPr>
+          <p:cNvPr id="2" name="Title 1">
+            <a:extLst>
+              <a:ext uri="{FF2B5EF4-FFF2-40B4-BE49-F238E27FC236}">
+                <a16:creationId xmlns:a16="http://schemas.microsoft.com/office/drawing/2014/main" id="{70A4C97D-8F21-3D3B-6A90-EA7145324964}"/>
+              </a:ext>
+            </a:extLst>
+          </p:cNvPr>
+          <p:cNvSpPr>
+            <a:spLocks noGrp="1"/>
+          </p:cNvSpPr>
+          <p:nvPr>
+            <p:ph type="title"/>
+          </p:nvPr>
+        </p:nvSpPr>
+        <p:spPr>
+          <a:xfrm>
+            <a:off x="838200" y="593725"/>
+            <a:ext cx="10515600" cy="1325563"/>
+          </a:xfrm>
+        </p:spPr>
+        <p:txBody>
+          <a:bodyPr>
+            <a:normAutofit/>
+          </a:bodyPr>
+          <a:lstStyle/>
+          <a:p>
+            <a:r>
+              <a:rPr lang="en-US" dirty="0"/>
+              <a:t>Next steps</a:t>
+            </a:r>
+          </a:p>
+        </p:txBody>
+      </p:sp>
+      <p:sp>
+        <p:nvSpPr>
+          <p:cNvPr id="3" name="Content Placeholder 2">
+            <a:extLst>
+              <a:ext uri="{FF2B5EF4-FFF2-40B4-BE49-F238E27FC236}">
+                <a16:creationId xmlns:a16="http://schemas.microsoft.com/office/drawing/2014/main" id="{B9501834-7B32-1ACA-4358-B630FB8EEC36}"/>
+              </a:ext>
+            </a:extLst>
+          </p:cNvPr>
+          <p:cNvSpPr>
+            <a:spLocks noGrp="1"/>
+          </p:cNvSpPr>
+          <p:nvPr>
+            <p:ph idx="1"/>
+          </p:nvPr>
+        </p:nvSpPr>
+        <p:spPr>
+          <a:xfrm>
+            <a:off x="838199" y="1919289"/>
+            <a:ext cx="10384857" cy="4623402"/>
+          </a:xfrm>
+        </p:spPr>
+        <p:txBody>
+          <a:bodyPr>
+            <a:normAutofit/>
+          </a:bodyPr>
+          <a:lstStyle/>
+          <a:p>
+            <a:endParaRPr lang="en-US" dirty="0"/>
+          </a:p>
+        </p:txBody>
+      </p:sp>
+    </p:spTree>
+    <p:extLst>
+      <p:ext uri="{BB962C8B-B14F-4D97-AF65-F5344CB8AC3E}">
+        <p14:creationId xmlns:p14="http://schemas.microsoft.com/office/powerpoint/2010/main" val="4091688872"/>
+      </p:ext>
+    </p:extLst>
+  </p:cSld>
+  <p:clrMapOvr>
+    <a:masterClrMapping/>
+  </p:clrMapOvr>
+</p:sld>
+</file>
+
+<file path=ppt/slides/slide13.xml><?xml version="1.0" encoding="utf-8"?>
+<p:sld xmlns:a="http://schemas.openxmlformats.org/drawingml/2006/main" xmlns:r="http://schemas.openxmlformats.org/officeDocument/2006/relationships" xmlns:p="http://schemas.openxmlformats.org/presentationml/2006/main">
+  <p:cSld>
+    <p:spTree>
+      <p:nvGrpSpPr>
+        <p:cNvPr id="1" name=""/>
+        <p:cNvGrpSpPr/>
+        <p:nvPr/>
+      </p:nvGrpSpPr>
+      <p:grpSpPr>
+        <a:xfrm>
+          <a:off x="0" y="0"/>
+          <a:ext cx="0" cy="0"/>
+          <a:chOff x="0" y="0"/>
+          <a:chExt cx="0" cy="0"/>
+        </a:xfrm>
+      </p:grpSpPr>
       <p:pic>
         <p:nvPicPr>
           <p:cNvPr id="6" name="Picture 5">
@@ -6738,6 +7123,142 @@
     <p:extLst>
       <p:ext uri="{BB962C8B-B14F-4D97-AF65-F5344CB8AC3E}">
         <p14:creationId xmlns:p14="http://schemas.microsoft.com/office/powerpoint/2010/main" val="2018884985"/>
+      </p:ext>
+    </p:extLst>
+  </p:cSld>
+  <p:clrMapOvr>
+    <a:masterClrMapping/>
+  </p:clrMapOvr>
+</p:sld>
+</file>
+
+<file path=ppt/slides/slide14.xml><?xml version="1.0" encoding="utf-8"?>
+<p:sld xmlns:a="http://schemas.openxmlformats.org/drawingml/2006/main" xmlns:r="http://schemas.openxmlformats.org/officeDocument/2006/relationships" xmlns:p="http://schemas.openxmlformats.org/presentationml/2006/main">
+  <p:cSld>
+    <p:spTree>
+      <p:nvGrpSpPr>
+        <p:cNvPr id="1" name="">
+          <a:extLst>
+            <a:ext uri="{FF2B5EF4-FFF2-40B4-BE49-F238E27FC236}">
+              <a16:creationId xmlns:a16="http://schemas.microsoft.com/office/drawing/2014/main" id="{2256A9F8-8FCD-A612-3C8B-11CEDB555932}"/>
+            </a:ext>
+          </a:extLst>
+        </p:cNvPr>
+        <p:cNvGrpSpPr/>
+        <p:nvPr/>
+      </p:nvGrpSpPr>
+      <p:grpSpPr>
+        <a:xfrm>
+          <a:off x="0" y="0"/>
+          <a:ext cx="0" cy="0"/>
+          <a:chOff x="0" y="0"/>
+          <a:chExt cx="0" cy="0"/>
+        </a:xfrm>
+      </p:grpSpPr>
+      <p:sp>
+        <p:nvSpPr>
+          <p:cNvPr id="2" name="Title 1">
+            <a:extLst>
+              <a:ext uri="{FF2B5EF4-FFF2-40B4-BE49-F238E27FC236}">
+                <a16:creationId xmlns:a16="http://schemas.microsoft.com/office/drawing/2014/main" id="{01902C8D-12DC-6B73-CA6B-A2FCF8CCD218}"/>
+              </a:ext>
+            </a:extLst>
+          </p:cNvPr>
+          <p:cNvSpPr>
+            <a:spLocks noGrp="1"/>
+          </p:cNvSpPr>
+          <p:nvPr>
+            <p:ph type="title"/>
+          </p:nvPr>
+        </p:nvSpPr>
+        <p:spPr>
+          <a:xfrm>
+            <a:off x="838200" y="593725"/>
+            <a:ext cx="10515600" cy="1325563"/>
+          </a:xfrm>
+        </p:spPr>
+        <p:txBody>
+          <a:bodyPr>
+            <a:normAutofit/>
+          </a:bodyPr>
+          <a:lstStyle/>
+          <a:p>
+            <a:r>
+              <a:rPr lang="en-US" dirty="0"/>
+              <a:t>Regressing out batch works</a:t>
+            </a:r>
+          </a:p>
+        </p:txBody>
+      </p:sp>
+      <p:pic>
+        <p:nvPicPr>
+          <p:cNvPr id="7" name="Picture 6">
+            <a:extLst>
+              <a:ext uri="{FF2B5EF4-FFF2-40B4-BE49-F238E27FC236}">
+                <a16:creationId xmlns:a16="http://schemas.microsoft.com/office/drawing/2014/main" id="{D6774A84-8B48-E4E6-4383-3A394284D732}"/>
+              </a:ext>
+            </a:extLst>
+          </p:cNvPr>
+          <p:cNvPicPr>
+            <a:picLocks noChangeAspect="1"/>
+          </p:cNvPicPr>
+          <p:nvPr/>
+        </p:nvPicPr>
+        <p:blipFill>
+          <a:blip r:embed="rId3"/>
+          <a:stretch>
+            <a:fillRect/>
+          </a:stretch>
+        </p:blipFill>
+        <p:spPr>
+          <a:xfrm>
+            <a:off x="3914280" y="1443789"/>
+            <a:ext cx="4637605" cy="5414211"/>
+          </a:xfrm>
+          <a:prstGeom prst="rect">
+            <a:avLst/>
+          </a:prstGeom>
+        </p:spPr>
+      </p:pic>
+      <p:sp>
+        <p:nvSpPr>
+          <p:cNvPr id="8" name="TextBox 7">
+            <a:extLst>
+              <a:ext uri="{FF2B5EF4-FFF2-40B4-BE49-F238E27FC236}">
+                <a16:creationId xmlns:a16="http://schemas.microsoft.com/office/drawing/2014/main" id="{56336676-434D-4DB1-E0FE-5CCB6400864E}"/>
+              </a:ext>
+            </a:extLst>
+          </p:cNvPr>
+          <p:cNvSpPr txBox="1"/>
+          <p:nvPr/>
+        </p:nvSpPr>
+        <p:spPr>
+          <a:xfrm>
+            <a:off x="4148145" y="6079609"/>
+            <a:ext cx="880241" cy="369332"/>
+          </a:xfrm>
+          <a:prstGeom prst="rect">
+            <a:avLst/>
+          </a:prstGeom>
+          <a:noFill/>
+        </p:spPr>
+        <p:txBody>
+          <a:bodyPr wrap="none" rtlCol="0">
+            <a:spAutoFit/>
+          </a:bodyPr>
+          <a:lstStyle/>
+          <a:p>
+            <a:r>
+              <a:rPr lang="en-US" dirty="0"/>
+              <a:t>Batch #</a:t>
+            </a:r>
+          </a:p>
+        </p:txBody>
+      </p:sp>
+    </p:spTree>
+    <p:extLst>
+      <p:ext uri="{BB962C8B-B14F-4D97-AF65-F5344CB8AC3E}">
+        <p14:creationId xmlns:p14="http://schemas.microsoft.com/office/powerpoint/2010/main" val="952937781"/>
       </p:ext>
     </p:extLst>
   </p:cSld>
@@ -7476,7 +7997,7 @@
           <a:p>
             <a:r>
               <a:rPr lang="en-US" dirty="0"/>
-              <a:t>Regressing out age &amp; batch from baseline samples doesn’t reveal distinct immunotypes</a:t>
+              <a:t>Regressing out age &amp; batch from baseline samples doesn’t reveal clearly distinct immunotypes</a:t>
             </a:r>
           </a:p>
         </p:txBody>
@@ -7503,20 +8024,55 @@
         </p:blipFill>
         <p:spPr>
           <a:xfrm>
-            <a:off x="1314716" y="1823035"/>
-            <a:ext cx="4193444" cy="4938712"/>
+            <a:off x="1314716" y="2114954"/>
+            <a:ext cx="4027305" cy="4743046"/>
           </a:xfrm>
           <a:prstGeom prst="rect">
             <a:avLst/>
           </a:prstGeom>
         </p:spPr>
       </p:pic>
+      <p:sp>
+        <p:nvSpPr>
+          <p:cNvPr id="5" name="TextBox 4">
+            <a:extLst>
+              <a:ext uri="{FF2B5EF4-FFF2-40B4-BE49-F238E27FC236}">
+                <a16:creationId xmlns:a16="http://schemas.microsoft.com/office/drawing/2014/main" id="{F70F31CF-0EC2-1F9D-C893-807E8223190D}"/>
+              </a:ext>
+            </a:extLst>
+          </p:cNvPr>
+          <p:cNvSpPr txBox="1"/>
+          <p:nvPr/>
+        </p:nvSpPr>
+        <p:spPr>
+          <a:xfrm>
+            <a:off x="8126381" y="1745622"/>
+            <a:ext cx="2049215" cy="369332"/>
+          </a:xfrm>
+          <a:prstGeom prst="rect">
+            <a:avLst/>
+          </a:prstGeom>
+          <a:noFill/>
+        </p:spPr>
+        <p:txBody>
+          <a:bodyPr wrap="none" rtlCol="0">
+            <a:spAutoFit/>
+          </a:bodyPr>
+          <a:lstStyle/>
+          <a:p>
+            <a:r>
+              <a:rPr lang="en-US" dirty="0"/>
+              <a:t>Batch regressed out</a:t>
+            </a:r>
+          </a:p>
+        </p:txBody>
+      </p:sp>
       <p:pic>
         <p:nvPicPr>
-          <p:cNvPr id="4" name="Picture 3">
-            <a:extLst>
-              <a:ext uri="{FF2B5EF4-FFF2-40B4-BE49-F238E27FC236}">
-                <a16:creationId xmlns:a16="http://schemas.microsoft.com/office/drawing/2014/main" id="{653E4C05-C6D8-511E-EBC4-8AA151383D36}"/>
+          <p:cNvPr id="6" name="Picture 5">
+            <a:extLst>
+              <a:ext uri="{FF2B5EF4-FFF2-40B4-BE49-F238E27FC236}">
+                <a16:creationId xmlns:a16="http://schemas.microsoft.com/office/drawing/2014/main" id="{208B599F-04B2-0EAD-7CD1-F94898E80236}"/>
               </a:ext>
             </a:extLst>
           </p:cNvPr>
@@ -7533,49 +8089,14 @@
         </p:blipFill>
         <p:spPr>
           <a:xfrm>
-            <a:off x="7007012" y="1817270"/>
-            <a:ext cx="4261834" cy="4938713"/>
+            <a:off x="6778066" y="2114954"/>
+            <a:ext cx="4056271" cy="4743047"/>
           </a:xfrm>
           <a:prstGeom prst="rect">
             <a:avLst/>
           </a:prstGeom>
         </p:spPr>
       </p:pic>
-      <p:sp>
-        <p:nvSpPr>
-          <p:cNvPr id="5" name="TextBox 4">
-            <a:extLst>
-              <a:ext uri="{FF2B5EF4-FFF2-40B4-BE49-F238E27FC236}">
-                <a16:creationId xmlns:a16="http://schemas.microsoft.com/office/drawing/2014/main" id="{F70F31CF-0EC2-1F9D-C893-807E8223190D}"/>
-              </a:ext>
-            </a:extLst>
-          </p:cNvPr>
-          <p:cNvSpPr txBox="1"/>
-          <p:nvPr/>
-        </p:nvSpPr>
-        <p:spPr>
-          <a:xfrm>
-            <a:off x="8155257" y="1549956"/>
-            <a:ext cx="2722027" cy="369332"/>
-          </a:xfrm>
-          <a:prstGeom prst="rect">
-            <a:avLst/>
-          </a:prstGeom>
-          <a:noFill/>
-        </p:spPr>
-        <p:txBody>
-          <a:bodyPr wrap="none" rtlCol="0">
-            <a:spAutoFit/>
-          </a:bodyPr>
-          <a:lstStyle/>
-          <a:p>
-            <a:r>
-              <a:rPr lang="en-US" dirty="0"/>
-              <a:t>Confounders regressed out</a:t>
-            </a:r>
-          </a:p>
-        </p:txBody>
-      </p:sp>
     </p:spTree>
     <p:extLst>
       <p:ext uri="{BB962C8B-B14F-4D97-AF65-F5344CB8AC3E}">
@@ -7597,7 +8118,7 @@
         <p:cNvPr id="1" name="">
           <a:extLst>
             <a:ext uri="{FF2B5EF4-FFF2-40B4-BE49-F238E27FC236}">
-              <a16:creationId xmlns:a16="http://schemas.microsoft.com/office/drawing/2014/main" id="{4499FADC-FBBC-EB4A-05BF-5CF1F6439490}"/>
+              <a16:creationId xmlns:a16="http://schemas.microsoft.com/office/drawing/2014/main" id="{A5E81DFF-553A-FA3A-9A7E-0534236C2DCA}"/>
             </a:ext>
           </a:extLst>
         </p:cNvPr>
@@ -7617,7 +8138,7 @@
           <p:cNvPr id="2" name="Title 1">
             <a:extLst>
               <a:ext uri="{FF2B5EF4-FFF2-40B4-BE49-F238E27FC236}">
-                <a16:creationId xmlns:a16="http://schemas.microsoft.com/office/drawing/2014/main" id="{5EBCB7C7-7960-F4FD-4CEB-710E69BA52B0}"/>
+                <a16:creationId xmlns:a16="http://schemas.microsoft.com/office/drawing/2014/main" id="{702937F6-E5F6-FA8A-65BE-95654D7B0140}"/>
               </a:ext>
             </a:extLst>
           </p:cNvPr>
@@ -7631,28 +8152,76 @@
         <p:spPr>
           <a:xfrm>
             <a:off x="838200" y="593725"/>
-            <a:ext cx="10134599" cy="1325563"/>
+            <a:ext cx="10515600" cy="1325563"/>
           </a:xfrm>
         </p:spPr>
         <p:txBody>
           <a:bodyPr>
-            <a:normAutofit/>
+            <a:normAutofit fontScale="90000"/>
           </a:bodyPr>
           <a:lstStyle/>
           <a:p>
             <a:r>
               <a:rPr lang="en-US" dirty="0"/>
-              <a:t>Certain features contribute more to variation (baseline)</a:t>
+              <a:t>However, PD1</a:t>
+            </a:r>
+            <a:r>
+              <a:rPr lang="en-US" baseline="30000" dirty="0"/>
+              <a:t>+</a:t>
+            </a:r>
+            <a:r>
+              <a:rPr lang="en-US" dirty="0"/>
+              <a:t> of CM </a:t>
+            </a:r>
+            <a:r>
+              <a:rPr lang="en-US" dirty="0" err="1"/>
+              <a:t>T</a:t>
+            </a:r>
+            <a:r>
+              <a:rPr lang="en-US" baseline="-25000" dirty="0" err="1"/>
+              <a:t>conv</a:t>
+            </a:r>
+            <a:r>
+              <a:rPr lang="en-US" dirty="0"/>
+              <a:t> </a:t>
+            </a:r>
+            <a:r>
+              <a:rPr lang="en-US" dirty="0" err="1"/>
+              <a:t>T</a:t>
+            </a:r>
+            <a:r>
+              <a:rPr lang="en-US" baseline="-25000" dirty="0" err="1"/>
+              <a:t>cells</a:t>
+            </a:r>
+            <a:r>
+              <a:rPr lang="en-US" dirty="0"/>
+              <a:t> does appear slightly higher in non-</a:t>
+            </a:r>
+            <a:r>
+              <a:rPr lang="en-US" dirty="0" err="1"/>
+              <a:t>irAE</a:t>
+            </a:r>
+            <a:r>
+              <a:rPr lang="en-US" dirty="0"/>
+              <a:t> group vs. </a:t>
+            </a:r>
+            <a:r>
+              <a:rPr lang="en-US" dirty="0" err="1"/>
+              <a:t>irAE</a:t>
+            </a:r>
+            <a:r>
+              <a:rPr lang="en-US" dirty="0"/>
+              <a:t>/SAE group post-regressing out batch</a:t>
             </a:r>
           </a:p>
         </p:txBody>
       </p:sp>
       <p:pic>
         <p:nvPicPr>
-          <p:cNvPr id="7" name="Picture 6">
-            <a:extLst>
-              <a:ext uri="{FF2B5EF4-FFF2-40B4-BE49-F238E27FC236}">
-                <a16:creationId xmlns:a16="http://schemas.microsoft.com/office/drawing/2014/main" id="{2F87F56D-0CFE-CFA2-3209-B454C0FB72CB}"/>
+          <p:cNvPr id="8" name="Picture 7">
+            <a:extLst>
+              <a:ext uri="{FF2B5EF4-FFF2-40B4-BE49-F238E27FC236}">
+                <a16:creationId xmlns:a16="http://schemas.microsoft.com/office/drawing/2014/main" id="{4B547DCF-6A21-340E-83D0-B8EF19B253BE}"/>
               </a:ext>
             </a:extLst>
           </p:cNvPr>
@@ -7669,18 +8238,172 @@
         </p:blipFill>
         <p:spPr>
           <a:xfrm>
-            <a:off x="3167742" y="1257352"/>
-            <a:ext cx="7010399" cy="5600647"/>
+            <a:off x="1882542" y="1765284"/>
+            <a:ext cx="7772400" cy="4815262"/>
           </a:xfrm>
           <a:prstGeom prst="rect">
             <a:avLst/>
           </a:prstGeom>
         </p:spPr>
       </p:pic>
+      <p:sp>
+        <p:nvSpPr>
+          <p:cNvPr id="13" name="TextBox 12">
+            <a:extLst>
+              <a:ext uri="{FF2B5EF4-FFF2-40B4-BE49-F238E27FC236}">
+                <a16:creationId xmlns:a16="http://schemas.microsoft.com/office/drawing/2014/main" id="{4F15ACFE-ED78-13FB-3C5C-82E8401EC44E}"/>
+              </a:ext>
+            </a:extLst>
+          </p:cNvPr>
+          <p:cNvSpPr txBox="1"/>
+          <p:nvPr/>
+        </p:nvSpPr>
+        <p:spPr>
+          <a:xfrm>
+            <a:off x="2823574" y="6395880"/>
+            <a:ext cx="3744936" cy="369332"/>
+          </a:xfrm>
+          <a:prstGeom prst="rect">
+            <a:avLst/>
+          </a:prstGeom>
+          <a:noFill/>
+        </p:spPr>
+        <p:txBody>
+          <a:bodyPr wrap="none" rtlCol="0">
+            <a:spAutoFit/>
+          </a:bodyPr>
+          <a:lstStyle/>
+          <a:p>
+            <a:r>
+              <a:rPr lang="en-US" dirty="0"/>
+              <a:t>Wilcoxon rank sum test.</a:t>
+            </a:r>
+            <a:r>
+              <a:rPr lang="en-US" dirty="0">
+                <a:latin typeface="Calibri" panose="020F0502020204030204" pitchFamily="34" charset="0"/>
+                <a:cs typeface="Times New Roman" panose="02020603050405020304" pitchFamily="18" charset="0"/>
+              </a:rPr>
+              <a:t> </a:t>
+            </a:r>
+            <a:r>
+              <a:rPr lang="en-US" sz="1800" dirty="0">
+                <a:effectLst/>
+                <a:latin typeface="Calibri" panose="020F0502020204030204" pitchFamily="34" charset="0"/>
+                <a:ea typeface="Calibri" panose="020F0502020204030204" pitchFamily="34" charset="0"/>
+                <a:cs typeface="Times New Roman" panose="02020603050405020304" pitchFamily="18" charset="0"/>
+              </a:rPr>
+              <a:t>~*; </a:t>
+            </a:r>
+            <a:r>
+              <a:rPr lang="en-US" sz="1800" dirty="0" err="1">
+                <a:effectLst/>
+                <a:latin typeface="Calibri" panose="020F0502020204030204" pitchFamily="34" charset="0"/>
+                <a:ea typeface="Calibri" panose="020F0502020204030204" pitchFamily="34" charset="0"/>
+                <a:cs typeface="Times New Roman" panose="02020603050405020304" pitchFamily="18" charset="0"/>
+              </a:rPr>
+              <a:t>padj</a:t>
+            </a:r>
+            <a:r>
+              <a:rPr lang="en-US" sz="1800" dirty="0">
+                <a:effectLst/>
+                <a:latin typeface="Calibri" panose="020F0502020204030204" pitchFamily="34" charset="0"/>
+                <a:ea typeface="Calibri" panose="020F0502020204030204" pitchFamily="34" charset="0"/>
+                <a:cs typeface="Times New Roman" panose="02020603050405020304" pitchFamily="18" charset="0"/>
+              </a:rPr>
+              <a:t> &lt; 0.1</a:t>
+            </a:r>
+            <a:endParaRPr lang="en-US" b="0" i="0" u="none" strike="noStrike" dirty="0">
+              <a:solidFill>
+                <a:srgbClr val="212121"/>
+              </a:solidFill>
+              <a:effectLst/>
+              <a:latin typeface="Cambria" panose="02040503050406030204" pitchFamily="18" charset="0"/>
+            </a:endParaRPr>
+          </a:p>
+        </p:txBody>
+      </p:sp>
+      <p:sp>
+        <p:nvSpPr>
+          <p:cNvPr id="15" name="TextBox 14">
+            <a:extLst>
+              <a:ext uri="{FF2B5EF4-FFF2-40B4-BE49-F238E27FC236}">
+                <a16:creationId xmlns:a16="http://schemas.microsoft.com/office/drawing/2014/main" id="{B29D6EE7-956E-3DAC-53DD-19F13193B0D3}"/>
+              </a:ext>
+            </a:extLst>
+          </p:cNvPr>
+          <p:cNvSpPr txBox="1"/>
+          <p:nvPr/>
+        </p:nvSpPr>
+        <p:spPr>
+          <a:xfrm>
+            <a:off x="6389576" y="2081387"/>
+            <a:ext cx="771619" cy="553998"/>
+          </a:xfrm>
+          <a:prstGeom prst="rect">
+            <a:avLst/>
+          </a:prstGeom>
+          <a:noFill/>
+        </p:spPr>
+        <p:txBody>
+          <a:bodyPr wrap="square" rtlCol="0">
+            <a:spAutoFit/>
+          </a:bodyPr>
+          <a:lstStyle/>
+          <a:p>
+            <a:r>
+              <a:rPr lang="en-US" sz="3000" dirty="0"/>
+              <a:t>~*</a:t>
+            </a:r>
+          </a:p>
+        </p:txBody>
+      </p:sp>
+      <p:cxnSp>
+        <p:nvCxnSpPr>
+          <p:cNvPr id="17" name="Straight Connector 16">
+            <a:extLst>
+              <a:ext uri="{FF2B5EF4-FFF2-40B4-BE49-F238E27FC236}">
+                <a16:creationId xmlns:a16="http://schemas.microsoft.com/office/drawing/2014/main" id="{B1429B1F-14C3-13CF-EE99-28D0332DE8E4}"/>
+              </a:ext>
+            </a:extLst>
+          </p:cNvPr>
+          <p:cNvCxnSpPr>
+            <a:cxnSpLocks/>
+          </p:cNvCxnSpPr>
+          <p:nvPr/>
+        </p:nvCxnSpPr>
+        <p:spPr>
+          <a:xfrm>
+            <a:off x="6096000" y="2081387"/>
+            <a:ext cx="1171074" cy="0"/>
+          </a:xfrm>
+          <a:prstGeom prst="line">
+            <a:avLst/>
+          </a:prstGeom>
+          <a:ln w="19050">
+            <a:solidFill>
+              <a:schemeClr val="tx1"/>
+            </a:solidFill>
+          </a:ln>
+        </p:spPr>
+        <p:style>
+          <a:lnRef idx="1">
+            <a:schemeClr val="accent1"/>
+          </a:lnRef>
+          <a:fillRef idx="0">
+            <a:schemeClr val="accent1"/>
+          </a:fillRef>
+          <a:effectRef idx="0">
+            <a:schemeClr val="accent1"/>
+          </a:effectRef>
+          <a:fontRef idx="minor">
+            <a:schemeClr val="tx1"/>
+          </a:fontRef>
+        </p:style>
+      </p:cxnSp>
     </p:spTree>
     <p:extLst>
       <p:ext uri="{BB962C8B-B14F-4D97-AF65-F5344CB8AC3E}">
-        <p14:creationId xmlns:p14="http://schemas.microsoft.com/office/powerpoint/2010/main" val="211499257"/>
+        <p14:creationId xmlns:p14="http://schemas.microsoft.com/office/powerpoint/2010/main" val="1830127623"/>
       </p:ext>
     </p:extLst>
   </p:cSld>

</xml_diff>

<commit_message>
Clarify lack of baseline results
</commit_message>
<xml_diff>
--- a/presentations/NCI_talks/2024_10_23.pptx
+++ b/presentations/NCI_talks/2024_10_23.pptx
@@ -5,7 +5,7 @@
     <p:sldMasterId id="2147483648" r:id="rId1"/>
   </p:sldMasterIdLst>
   <p:notesMasterIdLst>
-    <p:notesMasterId r:id="rId16"/>
+    <p:notesMasterId r:id="rId15"/>
   </p:notesMasterIdLst>
   <p:sldIdLst>
     <p:sldId id="256" r:id="rId2"/>
@@ -13,15 +13,14 @@
     <p:sldId id="582" r:id="rId4"/>
     <p:sldId id="577" r:id="rId5"/>
     <p:sldId id="578" r:id="rId6"/>
-    <p:sldId id="579" r:id="rId7"/>
-    <p:sldId id="580" r:id="rId8"/>
+    <p:sldId id="580" r:id="rId7"/>
+    <p:sldId id="579" r:id="rId8"/>
     <p:sldId id="583" r:id="rId9"/>
-    <p:sldId id="585" r:id="rId10"/>
-    <p:sldId id="581" r:id="rId11"/>
-    <p:sldId id="550" r:id="rId12"/>
-    <p:sldId id="529" r:id="rId13"/>
-    <p:sldId id="576" r:id="rId14"/>
-    <p:sldId id="584" r:id="rId15"/>
+    <p:sldId id="550" r:id="rId10"/>
+    <p:sldId id="529" r:id="rId11"/>
+    <p:sldId id="576" r:id="rId12"/>
+    <p:sldId id="584" r:id="rId13"/>
+    <p:sldId id="581" r:id="rId14"/>
   </p:sldIdLst>
   <p:sldSz cx="12192000" cy="6858000"/>
   <p:notesSz cx="6858000" cy="9144000"/>
@@ -221,7 +220,7 @@
           <a:p>
             <a:fld id="{E933A773-0DCE-3544-BB67-D5FA58DF903C}" type="datetimeFigureOut">
               <a:rPr lang="en-US" smtClean="0"/>
-              <a:t>10/9/24</a:t>
+              <a:t>10/10/24</a:t>
             </a:fld>
             <a:endParaRPr lang="en-US"/>
           </a:p>
@@ -577,13 +576,7 @@
   <p:cSld>
     <p:spTree>
       <p:nvGrpSpPr>
-        <p:cNvPr id="1" name="">
-          <a:extLst>
-            <a:ext uri="{FF2B5EF4-FFF2-40B4-BE49-F238E27FC236}">
-              <a16:creationId xmlns:a16="http://schemas.microsoft.com/office/drawing/2014/main" id="{1A615A9B-FCEE-6F7D-9622-145DAC34BE0D}"/>
-            </a:ext>
-          </a:extLst>
-        </p:cNvPr>
+        <p:cNvPr id="1" name=""/>
         <p:cNvGrpSpPr/>
         <p:nvPr/>
       </p:nvGrpSpPr>
@@ -597,13 +590,7 @@
       </p:grpSpPr>
       <p:sp>
         <p:nvSpPr>
-          <p:cNvPr id="2" name="Slide Image Placeholder 1">
-            <a:extLst>
-              <a:ext uri="{FF2B5EF4-FFF2-40B4-BE49-F238E27FC236}">
-                <a16:creationId xmlns:a16="http://schemas.microsoft.com/office/drawing/2014/main" id="{F88C4DD4-92A1-2BD9-9D66-AE40E8E54748}"/>
-              </a:ext>
-            </a:extLst>
-          </p:cNvPr>
+          <p:cNvPr id="2" name="Slide Image Placeholder 1"/>
           <p:cNvSpPr>
             <a:spLocks noGrp="1" noRot="1" noChangeAspect="1"/>
           </p:cNvSpPr>
@@ -615,13 +602,7 @@
       </p:sp>
       <p:sp>
         <p:nvSpPr>
-          <p:cNvPr id="3" name="Notes Placeholder 2">
-            <a:extLst>
-              <a:ext uri="{FF2B5EF4-FFF2-40B4-BE49-F238E27FC236}">
-                <a16:creationId xmlns:a16="http://schemas.microsoft.com/office/drawing/2014/main" id="{8F6F45D9-2262-CE49-7AAF-99DB701077C6}"/>
-              </a:ext>
-            </a:extLst>
-          </p:cNvPr>
+          <p:cNvPr id="3" name="Notes Placeholder 2"/>
           <p:cNvSpPr>
             <a:spLocks noGrp="1"/>
           </p:cNvSpPr>
@@ -634,25 +615,13 @@
           <a:bodyPr/>
           <a:lstStyle/>
           <a:p>
-            <a:endParaRPr lang="en-US" b="0" dirty="0">
-              <a:solidFill>
-                <a:srgbClr val="CCCCCC"/>
-              </a:solidFill>
-              <a:effectLst/>
-              <a:latin typeface="Menlo" panose="020B0609030804020204" pitchFamily="49" charset="0"/>
-            </a:endParaRPr>
-          </a:p>
-        </p:txBody>
-      </p:sp>
-      <p:sp>
-        <p:nvSpPr>
-          <p:cNvPr id="4" name="Slide Number Placeholder 3">
-            <a:extLst>
-              <a:ext uri="{FF2B5EF4-FFF2-40B4-BE49-F238E27FC236}">
-                <a16:creationId xmlns:a16="http://schemas.microsoft.com/office/drawing/2014/main" id="{28F708A8-1A74-B964-5810-DE42CC8DD556}"/>
-              </a:ext>
-            </a:extLst>
-          </p:cNvPr>
+            <a:endParaRPr lang="en-US" dirty="0"/>
+          </a:p>
+        </p:txBody>
+      </p:sp>
+      <p:sp>
+        <p:nvSpPr>
+          <p:cNvPr id="4" name="Slide Number Placeholder 3"/>
           <p:cNvSpPr>
             <a:spLocks noGrp="1"/>
           </p:cNvSpPr>
@@ -676,7 +645,7 @@
     </p:spTree>
     <p:extLst>
       <p:ext uri="{BB962C8B-B14F-4D97-AF65-F5344CB8AC3E}">
-        <p14:creationId xmlns:p14="http://schemas.microsoft.com/office/powerpoint/2010/main" val="1387096064"/>
+        <p14:creationId xmlns:p14="http://schemas.microsoft.com/office/powerpoint/2010/main" val="3703388347"/>
       </p:ext>
     </p:extLst>
   </p:cSld>
@@ -687,120 +656,6 @@
 </file>
 
 <file path=ppt/notesSlides/notesSlide11.xml><?xml version="1.0" encoding="utf-8"?>
-<p:notes xmlns:a="http://schemas.openxmlformats.org/drawingml/2006/main" xmlns:r="http://schemas.openxmlformats.org/officeDocument/2006/relationships" xmlns:p="http://schemas.openxmlformats.org/presentationml/2006/main">
-  <p:cSld>
-    <p:spTree>
-      <p:nvGrpSpPr>
-        <p:cNvPr id="1" name="">
-          <a:extLst>
-            <a:ext uri="{FF2B5EF4-FFF2-40B4-BE49-F238E27FC236}">
-              <a16:creationId xmlns:a16="http://schemas.microsoft.com/office/drawing/2014/main" id="{7A8E08F8-B466-1EC2-BB28-39C456B2B371}"/>
-            </a:ext>
-          </a:extLst>
-        </p:cNvPr>
-        <p:cNvGrpSpPr/>
-        <p:nvPr/>
-      </p:nvGrpSpPr>
-      <p:grpSpPr>
-        <a:xfrm>
-          <a:off x="0" y="0"/>
-          <a:ext cx="0" cy="0"/>
-          <a:chOff x="0" y="0"/>
-          <a:chExt cx="0" cy="0"/>
-        </a:xfrm>
-      </p:grpSpPr>
-      <p:sp>
-        <p:nvSpPr>
-          <p:cNvPr id="2" name="Slide Image Placeholder 1">
-            <a:extLst>
-              <a:ext uri="{FF2B5EF4-FFF2-40B4-BE49-F238E27FC236}">
-                <a16:creationId xmlns:a16="http://schemas.microsoft.com/office/drawing/2014/main" id="{5696BE36-72D5-DE34-95DF-D8C427005D48}"/>
-              </a:ext>
-            </a:extLst>
-          </p:cNvPr>
-          <p:cNvSpPr>
-            <a:spLocks noGrp="1" noRot="1" noChangeAspect="1"/>
-          </p:cNvSpPr>
-          <p:nvPr>
-            <p:ph type="sldImg"/>
-          </p:nvPr>
-        </p:nvSpPr>
-        <p:spPr/>
-      </p:sp>
-      <p:sp>
-        <p:nvSpPr>
-          <p:cNvPr id="3" name="Notes Placeholder 2">
-            <a:extLst>
-              <a:ext uri="{FF2B5EF4-FFF2-40B4-BE49-F238E27FC236}">
-                <a16:creationId xmlns:a16="http://schemas.microsoft.com/office/drawing/2014/main" id="{25B0415E-040E-D5F2-7990-EACA108D8779}"/>
-              </a:ext>
-            </a:extLst>
-          </p:cNvPr>
-          <p:cNvSpPr>
-            <a:spLocks noGrp="1"/>
-          </p:cNvSpPr>
-          <p:nvPr>
-            <p:ph type="body" idx="1"/>
-          </p:nvPr>
-        </p:nvSpPr>
-        <p:spPr/>
-        <p:txBody>
-          <a:bodyPr/>
-          <a:lstStyle/>
-          <a:p>
-            <a:endParaRPr lang="en-US" b="0" dirty="0">
-              <a:solidFill>
-                <a:srgbClr val="CCCCCC"/>
-              </a:solidFill>
-              <a:effectLst/>
-              <a:latin typeface="Menlo" panose="020B0609030804020204" pitchFamily="49" charset="0"/>
-            </a:endParaRPr>
-          </a:p>
-        </p:txBody>
-      </p:sp>
-      <p:sp>
-        <p:nvSpPr>
-          <p:cNvPr id="4" name="Slide Number Placeholder 3">
-            <a:extLst>
-              <a:ext uri="{FF2B5EF4-FFF2-40B4-BE49-F238E27FC236}">
-                <a16:creationId xmlns:a16="http://schemas.microsoft.com/office/drawing/2014/main" id="{E6805331-9119-1300-9EBD-B7D430F65B48}"/>
-              </a:ext>
-            </a:extLst>
-          </p:cNvPr>
-          <p:cNvSpPr>
-            <a:spLocks noGrp="1"/>
-          </p:cNvSpPr>
-          <p:nvPr>
-            <p:ph type="sldNum" sz="quarter" idx="5"/>
-          </p:nvPr>
-        </p:nvSpPr>
-        <p:spPr/>
-        <p:txBody>
-          <a:bodyPr/>
-          <a:lstStyle/>
-          <a:p>
-            <a:fld id="{061BAA8C-FDC6-D345-B4E0-3B02449209FB}" type="slidenum">
-              <a:rPr lang="en-US" smtClean="0"/>
-              <a:t>11</a:t>
-            </a:fld>
-            <a:endParaRPr lang="en-US"/>
-          </a:p>
-        </p:txBody>
-      </p:sp>
-    </p:spTree>
-    <p:extLst>
-      <p:ext uri="{BB962C8B-B14F-4D97-AF65-F5344CB8AC3E}">
-        <p14:creationId xmlns:p14="http://schemas.microsoft.com/office/powerpoint/2010/main" val="1028389668"/>
-      </p:ext>
-    </p:extLst>
-  </p:cSld>
-  <p:clrMapOvr>
-    <a:masterClrMapping/>
-  </p:clrMapOvr>
-</p:notes>
-</file>
-
-<file path=ppt/notesSlides/notesSlide12.xml><?xml version="1.0" encoding="utf-8"?>
 <p:notes xmlns:a="http://schemas.openxmlformats.org/drawingml/2006/main" xmlns:r="http://schemas.openxmlformats.org/officeDocument/2006/relationships" xmlns:p="http://schemas.openxmlformats.org/presentationml/2006/main">
   <p:cSld>
     <p:spTree>
@@ -844,90 +699,6 @@
           <a:bodyPr/>
           <a:lstStyle/>
           <a:p>
-            <a:endParaRPr lang="en-US" dirty="0"/>
-          </a:p>
-        </p:txBody>
-      </p:sp>
-      <p:sp>
-        <p:nvSpPr>
-          <p:cNvPr id="4" name="Slide Number Placeholder 3"/>
-          <p:cNvSpPr>
-            <a:spLocks noGrp="1"/>
-          </p:cNvSpPr>
-          <p:nvPr>
-            <p:ph type="sldNum" sz="quarter" idx="5"/>
-          </p:nvPr>
-        </p:nvSpPr>
-        <p:spPr/>
-        <p:txBody>
-          <a:bodyPr/>
-          <a:lstStyle/>
-          <a:p>
-            <a:fld id="{061BAA8C-FDC6-D345-B4E0-3B02449209FB}" type="slidenum">
-              <a:rPr lang="en-US" smtClean="0"/>
-              <a:t>12</a:t>
-            </a:fld>
-            <a:endParaRPr lang="en-US"/>
-          </a:p>
-        </p:txBody>
-      </p:sp>
-    </p:spTree>
-    <p:extLst>
-      <p:ext uri="{BB962C8B-B14F-4D97-AF65-F5344CB8AC3E}">
-        <p14:creationId xmlns:p14="http://schemas.microsoft.com/office/powerpoint/2010/main" val="3703388347"/>
-      </p:ext>
-    </p:extLst>
-  </p:cSld>
-  <p:clrMapOvr>
-    <a:masterClrMapping/>
-  </p:clrMapOvr>
-</p:notes>
-</file>
-
-<file path=ppt/notesSlides/notesSlide13.xml><?xml version="1.0" encoding="utf-8"?>
-<p:notes xmlns:a="http://schemas.openxmlformats.org/drawingml/2006/main" xmlns:r="http://schemas.openxmlformats.org/officeDocument/2006/relationships" xmlns:p="http://schemas.openxmlformats.org/presentationml/2006/main">
-  <p:cSld>
-    <p:spTree>
-      <p:nvGrpSpPr>
-        <p:cNvPr id="1" name=""/>
-        <p:cNvGrpSpPr/>
-        <p:nvPr/>
-      </p:nvGrpSpPr>
-      <p:grpSpPr>
-        <a:xfrm>
-          <a:off x="0" y="0"/>
-          <a:ext cx="0" cy="0"/>
-          <a:chOff x="0" y="0"/>
-          <a:chExt cx="0" cy="0"/>
-        </a:xfrm>
-      </p:grpSpPr>
-      <p:sp>
-        <p:nvSpPr>
-          <p:cNvPr id="2" name="Slide Image Placeholder 1"/>
-          <p:cNvSpPr>
-            <a:spLocks noGrp="1" noRot="1" noChangeAspect="1"/>
-          </p:cNvSpPr>
-          <p:nvPr>
-            <p:ph type="sldImg"/>
-          </p:nvPr>
-        </p:nvSpPr>
-        <p:spPr/>
-      </p:sp>
-      <p:sp>
-        <p:nvSpPr>
-          <p:cNvPr id="3" name="Notes Placeholder 2"/>
-          <p:cNvSpPr>
-            <a:spLocks noGrp="1"/>
-          </p:cNvSpPr>
-          <p:nvPr>
-            <p:ph type="body" idx="1"/>
-          </p:nvPr>
-        </p:nvSpPr>
-        <p:spPr/>
-        <p:txBody>
-          <a:bodyPr/>
-          <a:lstStyle/>
-          <a:p>
             <a:endParaRPr lang="en-US" b="0" i="0" u="none" strike="noStrike" dirty="0">
               <a:solidFill>
                 <a:srgbClr val="212121"/>
@@ -955,7 +726,7 @@
           <a:p>
             <a:fld id="{061BAA8C-FDC6-D345-B4E0-3B02449209FB}" type="slidenum">
               <a:rPr lang="en-US" smtClean="0"/>
-              <a:t>13</a:t>
+              <a:t>11</a:t>
             </a:fld>
             <a:endParaRPr lang="en-US"/>
           </a:p>
@@ -974,7 +745,7 @@
 </p:notes>
 </file>
 
-<file path=ppt/notesSlides/notesSlide14.xml><?xml version="1.0" encoding="utf-8"?>
+<file path=ppt/notesSlides/notesSlide12.xml><?xml version="1.0" encoding="utf-8"?>
 <p:notes xmlns:a="http://schemas.openxmlformats.org/drawingml/2006/main" xmlns:r="http://schemas.openxmlformats.org/officeDocument/2006/relationships" xmlns:p="http://schemas.openxmlformats.org/presentationml/2006/main">
   <p:cSld>
     <p:spTree>
@@ -1069,7 +840,7 @@
           <a:p>
             <a:fld id="{061BAA8C-FDC6-D345-B4E0-3B02449209FB}" type="slidenum">
               <a:rPr lang="en-US" smtClean="0"/>
-              <a:t>14</a:t>
+              <a:t>12</a:t>
             </a:fld>
             <a:endParaRPr lang="en-US"/>
           </a:p>
@@ -1079,6 +850,120 @@
     <p:extLst>
       <p:ext uri="{BB962C8B-B14F-4D97-AF65-F5344CB8AC3E}">
         <p14:creationId xmlns:p14="http://schemas.microsoft.com/office/powerpoint/2010/main" val="3768784977"/>
+      </p:ext>
+    </p:extLst>
+  </p:cSld>
+  <p:clrMapOvr>
+    <a:masterClrMapping/>
+  </p:clrMapOvr>
+</p:notes>
+</file>
+
+<file path=ppt/notesSlides/notesSlide13.xml><?xml version="1.0" encoding="utf-8"?>
+<p:notes xmlns:a="http://schemas.openxmlformats.org/drawingml/2006/main" xmlns:r="http://schemas.openxmlformats.org/officeDocument/2006/relationships" xmlns:p="http://schemas.openxmlformats.org/presentationml/2006/main">
+  <p:cSld>
+    <p:spTree>
+      <p:nvGrpSpPr>
+        <p:cNvPr id="1" name="">
+          <a:extLst>
+            <a:ext uri="{FF2B5EF4-FFF2-40B4-BE49-F238E27FC236}">
+              <a16:creationId xmlns:a16="http://schemas.microsoft.com/office/drawing/2014/main" id="{1A615A9B-FCEE-6F7D-9622-145DAC34BE0D}"/>
+            </a:ext>
+          </a:extLst>
+        </p:cNvPr>
+        <p:cNvGrpSpPr/>
+        <p:nvPr/>
+      </p:nvGrpSpPr>
+      <p:grpSpPr>
+        <a:xfrm>
+          <a:off x="0" y="0"/>
+          <a:ext cx="0" cy="0"/>
+          <a:chOff x="0" y="0"/>
+          <a:chExt cx="0" cy="0"/>
+        </a:xfrm>
+      </p:grpSpPr>
+      <p:sp>
+        <p:nvSpPr>
+          <p:cNvPr id="2" name="Slide Image Placeholder 1">
+            <a:extLst>
+              <a:ext uri="{FF2B5EF4-FFF2-40B4-BE49-F238E27FC236}">
+                <a16:creationId xmlns:a16="http://schemas.microsoft.com/office/drawing/2014/main" id="{F88C4DD4-92A1-2BD9-9D66-AE40E8E54748}"/>
+              </a:ext>
+            </a:extLst>
+          </p:cNvPr>
+          <p:cNvSpPr>
+            <a:spLocks noGrp="1" noRot="1" noChangeAspect="1"/>
+          </p:cNvSpPr>
+          <p:nvPr>
+            <p:ph type="sldImg"/>
+          </p:nvPr>
+        </p:nvSpPr>
+        <p:spPr/>
+      </p:sp>
+      <p:sp>
+        <p:nvSpPr>
+          <p:cNvPr id="3" name="Notes Placeholder 2">
+            <a:extLst>
+              <a:ext uri="{FF2B5EF4-FFF2-40B4-BE49-F238E27FC236}">
+                <a16:creationId xmlns:a16="http://schemas.microsoft.com/office/drawing/2014/main" id="{8F6F45D9-2262-CE49-7AAF-99DB701077C6}"/>
+              </a:ext>
+            </a:extLst>
+          </p:cNvPr>
+          <p:cNvSpPr>
+            <a:spLocks noGrp="1"/>
+          </p:cNvSpPr>
+          <p:nvPr>
+            <p:ph type="body" idx="1"/>
+          </p:nvPr>
+        </p:nvSpPr>
+        <p:spPr/>
+        <p:txBody>
+          <a:bodyPr/>
+          <a:lstStyle/>
+          <a:p>
+            <a:endParaRPr lang="en-US" b="0" dirty="0">
+              <a:solidFill>
+                <a:srgbClr val="CCCCCC"/>
+              </a:solidFill>
+              <a:effectLst/>
+              <a:latin typeface="Menlo" panose="020B0609030804020204" pitchFamily="49" charset="0"/>
+            </a:endParaRPr>
+          </a:p>
+        </p:txBody>
+      </p:sp>
+      <p:sp>
+        <p:nvSpPr>
+          <p:cNvPr id="4" name="Slide Number Placeholder 3">
+            <a:extLst>
+              <a:ext uri="{FF2B5EF4-FFF2-40B4-BE49-F238E27FC236}">
+                <a16:creationId xmlns:a16="http://schemas.microsoft.com/office/drawing/2014/main" id="{28F708A8-1A74-B964-5810-DE42CC8DD556}"/>
+              </a:ext>
+            </a:extLst>
+          </p:cNvPr>
+          <p:cNvSpPr>
+            <a:spLocks noGrp="1"/>
+          </p:cNvSpPr>
+          <p:nvPr>
+            <p:ph type="sldNum" sz="quarter" idx="5"/>
+          </p:nvPr>
+        </p:nvSpPr>
+        <p:spPr/>
+        <p:txBody>
+          <a:bodyPr/>
+          <a:lstStyle/>
+          <a:p>
+            <a:fld id="{061BAA8C-FDC6-D345-B4E0-3B02449209FB}" type="slidenum">
+              <a:rPr lang="en-US" smtClean="0"/>
+              <a:t>13</a:t>
+            </a:fld>
+            <a:endParaRPr lang="en-US"/>
+          </a:p>
+        </p:txBody>
+      </p:sp>
+    </p:spTree>
+    <p:extLst>
+      <p:ext uri="{BB962C8B-B14F-4D97-AF65-F5344CB8AC3E}">
+        <p14:creationId xmlns:p14="http://schemas.microsoft.com/office/powerpoint/2010/main" val="1367934537"/>
       </p:ext>
     </p:extLst>
   </p:cSld>
@@ -2817,7 +2702,7 @@
         <p:cNvPr id="1" name="">
           <a:extLst>
             <a:ext uri="{FF2B5EF4-FFF2-40B4-BE49-F238E27FC236}">
-              <a16:creationId xmlns:a16="http://schemas.microsoft.com/office/drawing/2014/main" id="{013ED76D-5EA1-C9F1-9CA3-A68328CE726C}"/>
+              <a16:creationId xmlns:a16="http://schemas.microsoft.com/office/drawing/2014/main" id="{850A09E1-5BF5-E036-3442-7268BBF3B5B8}"/>
             </a:ext>
           </a:extLst>
         </p:cNvPr>
@@ -2837,7 +2722,7 @@
           <p:cNvPr id="2" name="Slide Image Placeholder 1">
             <a:extLst>
               <a:ext uri="{FF2B5EF4-FFF2-40B4-BE49-F238E27FC236}">
-                <a16:creationId xmlns:a16="http://schemas.microsoft.com/office/drawing/2014/main" id="{0D7D2A23-7FB9-3097-92F2-B6A518AC9B2E}"/>
+                <a16:creationId xmlns:a16="http://schemas.microsoft.com/office/drawing/2014/main" id="{EF6A20BF-8435-5510-3BBC-71CE3DA0EEB9}"/>
               </a:ext>
             </a:extLst>
           </p:cNvPr>
@@ -2855,7 +2740,7 @@
           <p:cNvPr id="3" name="Notes Placeholder 2">
             <a:extLst>
               <a:ext uri="{FF2B5EF4-FFF2-40B4-BE49-F238E27FC236}">
-                <a16:creationId xmlns:a16="http://schemas.microsoft.com/office/drawing/2014/main" id="{296C7834-98F0-D47B-758C-07A4AD9904BB}"/>
+                <a16:creationId xmlns:a16="http://schemas.microsoft.com/office/drawing/2014/main" id="{301A21EA-CF11-4247-8C57-77B0FC92ACE6}"/>
               </a:ext>
             </a:extLst>
           </p:cNvPr>
@@ -2871,16 +2756,13 @@
           <a:bodyPr/>
           <a:lstStyle/>
           <a:p>
-            <a:r>
-              <a:rPr lang="en-US" b="0" dirty="0">
-                <a:solidFill>
-                  <a:srgbClr val="CCCCCC"/>
-                </a:solidFill>
-                <a:effectLst/>
-                <a:latin typeface="Menlo" panose="020B0609030804020204" pitchFamily="49" charset="0"/>
-              </a:rPr>
-              <a:t>Batch 7 kind of all clustering together in bottom left…</a:t>
-            </a:r>
+            <a:endParaRPr lang="en-US" b="0" dirty="0">
+              <a:solidFill>
+                <a:srgbClr val="CCCCCC"/>
+              </a:solidFill>
+              <a:effectLst/>
+              <a:latin typeface="Menlo" panose="020B0609030804020204" pitchFamily="49" charset="0"/>
+            </a:endParaRPr>
           </a:p>
         </p:txBody>
       </p:sp>
@@ -2889,7 +2771,7 @@
           <p:cNvPr id="4" name="Slide Number Placeholder 3">
             <a:extLst>
               <a:ext uri="{FF2B5EF4-FFF2-40B4-BE49-F238E27FC236}">
-                <a16:creationId xmlns:a16="http://schemas.microsoft.com/office/drawing/2014/main" id="{BC12F682-4A29-6867-3B8A-EF94DD7F5926}"/>
+                <a16:creationId xmlns:a16="http://schemas.microsoft.com/office/drawing/2014/main" id="{3ADBCED4-BE32-6B7F-8DE9-954D7F32FE97}"/>
               </a:ext>
             </a:extLst>
           </p:cNvPr>
@@ -2916,7 +2798,7 @@
     </p:spTree>
     <p:extLst>
       <p:ext uri="{BB962C8B-B14F-4D97-AF65-F5344CB8AC3E}">
-        <p14:creationId xmlns:p14="http://schemas.microsoft.com/office/powerpoint/2010/main" val="3635484729"/>
+        <p14:creationId xmlns:p14="http://schemas.microsoft.com/office/powerpoint/2010/main" val="3551600548"/>
       </p:ext>
     </p:extLst>
   </p:cSld>
@@ -2934,7 +2816,7 @@
         <p:cNvPr id="1" name="">
           <a:extLst>
             <a:ext uri="{FF2B5EF4-FFF2-40B4-BE49-F238E27FC236}">
-              <a16:creationId xmlns:a16="http://schemas.microsoft.com/office/drawing/2014/main" id="{850A09E1-5BF5-E036-3442-7268BBF3B5B8}"/>
+              <a16:creationId xmlns:a16="http://schemas.microsoft.com/office/drawing/2014/main" id="{013ED76D-5EA1-C9F1-9CA3-A68328CE726C}"/>
             </a:ext>
           </a:extLst>
         </p:cNvPr>
@@ -2954,7 +2836,7 @@
           <p:cNvPr id="2" name="Slide Image Placeholder 1">
             <a:extLst>
               <a:ext uri="{FF2B5EF4-FFF2-40B4-BE49-F238E27FC236}">
-                <a16:creationId xmlns:a16="http://schemas.microsoft.com/office/drawing/2014/main" id="{EF6A20BF-8435-5510-3BBC-71CE3DA0EEB9}"/>
+                <a16:creationId xmlns:a16="http://schemas.microsoft.com/office/drawing/2014/main" id="{0D7D2A23-7FB9-3097-92F2-B6A518AC9B2E}"/>
               </a:ext>
             </a:extLst>
           </p:cNvPr>
@@ -2972,7 +2854,7 @@
           <p:cNvPr id="3" name="Notes Placeholder 2">
             <a:extLst>
               <a:ext uri="{FF2B5EF4-FFF2-40B4-BE49-F238E27FC236}">
-                <a16:creationId xmlns:a16="http://schemas.microsoft.com/office/drawing/2014/main" id="{301A21EA-CF11-4247-8C57-77B0FC92ACE6}"/>
+                <a16:creationId xmlns:a16="http://schemas.microsoft.com/office/drawing/2014/main" id="{296C7834-98F0-D47B-758C-07A4AD9904BB}"/>
               </a:ext>
             </a:extLst>
           </p:cNvPr>
@@ -2988,13 +2870,16 @@
           <a:bodyPr/>
           <a:lstStyle/>
           <a:p>
-            <a:endParaRPr lang="en-US" b="0" dirty="0">
-              <a:solidFill>
-                <a:srgbClr val="CCCCCC"/>
-              </a:solidFill>
-              <a:effectLst/>
-              <a:latin typeface="Menlo" panose="020B0609030804020204" pitchFamily="49" charset="0"/>
-            </a:endParaRPr>
+            <a:r>
+              <a:rPr lang="en-US" b="0" dirty="0">
+                <a:solidFill>
+                  <a:srgbClr val="CCCCCC"/>
+                </a:solidFill>
+                <a:effectLst/>
+                <a:latin typeface="Menlo" panose="020B0609030804020204" pitchFamily="49" charset="0"/>
+              </a:rPr>
+              <a:t>Batch 7 kind of all clustering together in bottom left…</a:t>
+            </a:r>
           </a:p>
         </p:txBody>
       </p:sp>
@@ -3003,7 +2888,7 @@
           <p:cNvPr id="4" name="Slide Number Placeholder 3">
             <a:extLst>
               <a:ext uri="{FF2B5EF4-FFF2-40B4-BE49-F238E27FC236}">
-                <a16:creationId xmlns:a16="http://schemas.microsoft.com/office/drawing/2014/main" id="{3ADBCED4-BE32-6B7F-8DE9-954D7F32FE97}"/>
+                <a16:creationId xmlns:a16="http://schemas.microsoft.com/office/drawing/2014/main" id="{BC12F682-4A29-6867-3B8A-EF94DD7F5926}"/>
               </a:ext>
             </a:extLst>
           </p:cNvPr>
@@ -3030,7 +2915,7 @@
     </p:spTree>
     <p:extLst>
       <p:ext uri="{BB962C8B-B14F-4D97-AF65-F5344CB8AC3E}">
-        <p14:creationId xmlns:p14="http://schemas.microsoft.com/office/powerpoint/2010/main" val="3551600548"/>
+        <p14:creationId xmlns:p14="http://schemas.microsoft.com/office/powerpoint/2010/main" val="9562053"/>
       </p:ext>
     </p:extLst>
   </p:cSld>
@@ -3186,7 +3071,7 @@
         <p:cNvPr id="1" name="">
           <a:extLst>
             <a:ext uri="{FF2B5EF4-FFF2-40B4-BE49-F238E27FC236}">
-              <a16:creationId xmlns:a16="http://schemas.microsoft.com/office/drawing/2014/main" id="{0348CD35-B26E-DD31-6A9C-1245CDAA48E4}"/>
+              <a16:creationId xmlns:a16="http://schemas.microsoft.com/office/drawing/2014/main" id="{7A8E08F8-B466-1EC2-BB28-39C456B2B371}"/>
             </a:ext>
           </a:extLst>
         </p:cNvPr>
@@ -3206,7 +3091,7 @@
           <p:cNvPr id="2" name="Slide Image Placeholder 1">
             <a:extLst>
               <a:ext uri="{FF2B5EF4-FFF2-40B4-BE49-F238E27FC236}">
-                <a16:creationId xmlns:a16="http://schemas.microsoft.com/office/drawing/2014/main" id="{5E7D9DF8-F76D-F55E-AF01-22FBA1B00E54}"/>
+                <a16:creationId xmlns:a16="http://schemas.microsoft.com/office/drawing/2014/main" id="{5696BE36-72D5-DE34-95DF-D8C427005D48}"/>
               </a:ext>
             </a:extLst>
           </p:cNvPr>
@@ -3224,7 +3109,7 @@
           <p:cNvPr id="3" name="Notes Placeholder 2">
             <a:extLst>
               <a:ext uri="{FF2B5EF4-FFF2-40B4-BE49-F238E27FC236}">
-                <a16:creationId xmlns:a16="http://schemas.microsoft.com/office/drawing/2014/main" id="{534E5AB6-4F7F-3A4B-FFFA-BB5C8E16DDF8}"/>
+                <a16:creationId xmlns:a16="http://schemas.microsoft.com/office/drawing/2014/main" id="{25B0415E-040E-D5F2-7990-EACA108D8779}"/>
               </a:ext>
             </a:extLst>
           </p:cNvPr>
@@ -3240,13 +3125,24 @@
           <a:bodyPr/>
           <a:lstStyle/>
           <a:p>
-            <a:endParaRPr lang="en-US" b="0" dirty="0">
-              <a:solidFill>
-                <a:srgbClr val="CCCCCC"/>
-              </a:solidFill>
-              <a:effectLst/>
-              <a:latin typeface="Menlo" panose="020B0609030804020204" pitchFamily="49" charset="0"/>
-            </a:endParaRPr>
+            <a:pPr marL="0" marR="0" lvl="0" indent="0" algn="l" defTabSz="914400" rtl="0" eaLnBrk="1" fontAlgn="auto" latinLnBrk="0" hangingPunct="1">
+              <a:lnSpc>
+                <a:spcPct val="100000"/>
+              </a:lnSpc>
+              <a:spcBef>
+                <a:spcPts val="0"/>
+              </a:spcBef>
+              <a:spcAft>
+                <a:spcPts val="0"/>
+              </a:spcAft>
+              <a:buClrTx/>
+              <a:buSzTx/>
+              <a:buFontTx/>
+              <a:buNone/>
+              <a:tabLst/>
+              <a:defRPr/>
+            </a:pPr>
+            <a:endParaRPr lang="en-US" dirty="0"/>
           </a:p>
         </p:txBody>
       </p:sp>
@@ -3255,7 +3151,7 @@
           <p:cNvPr id="4" name="Slide Number Placeholder 3">
             <a:extLst>
               <a:ext uri="{FF2B5EF4-FFF2-40B4-BE49-F238E27FC236}">
-                <a16:creationId xmlns:a16="http://schemas.microsoft.com/office/drawing/2014/main" id="{DD806F56-D23A-01B9-33C3-2F721CA8230C}"/>
+                <a16:creationId xmlns:a16="http://schemas.microsoft.com/office/drawing/2014/main" id="{E6805331-9119-1300-9EBD-B7D430F65B48}"/>
               </a:ext>
             </a:extLst>
           </p:cNvPr>
@@ -3282,7 +3178,7 @@
     </p:spTree>
     <p:extLst>
       <p:ext uri="{BB962C8B-B14F-4D97-AF65-F5344CB8AC3E}">
-        <p14:creationId xmlns:p14="http://schemas.microsoft.com/office/powerpoint/2010/main" val="3929315933"/>
+        <p14:creationId xmlns:p14="http://schemas.microsoft.com/office/powerpoint/2010/main" val="1028389668"/>
       </p:ext>
     </p:extLst>
   </p:cSld>
@@ -3439,7 +3335,7 @@
           <a:p>
             <a:fld id="{80FC6068-BAFB-FC44-B9D8-F4B3BB105DE6}" type="datetimeFigureOut">
               <a:rPr lang="en-US" smtClean="0"/>
-              <a:t>10/9/24</a:t>
+              <a:t>10/10/24</a:t>
             </a:fld>
             <a:endParaRPr lang="en-US"/>
           </a:p>
@@ -3637,7 +3533,7 @@
           <a:p>
             <a:fld id="{80FC6068-BAFB-FC44-B9D8-F4B3BB105DE6}" type="datetimeFigureOut">
               <a:rPr lang="en-US" smtClean="0"/>
-              <a:t>10/9/24</a:t>
+              <a:t>10/10/24</a:t>
             </a:fld>
             <a:endParaRPr lang="en-US"/>
           </a:p>
@@ -3845,7 +3741,7 @@
           <a:p>
             <a:fld id="{80FC6068-BAFB-FC44-B9D8-F4B3BB105DE6}" type="datetimeFigureOut">
               <a:rPr lang="en-US" smtClean="0"/>
-              <a:t>10/9/24</a:t>
+              <a:t>10/10/24</a:t>
             </a:fld>
             <a:endParaRPr lang="en-US"/>
           </a:p>
@@ -4049,7 +3945,7 @@
           <a:p>
             <a:fld id="{80FC6068-BAFB-FC44-B9D8-F4B3BB105DE6}" type="datetimeFigureOut">
               <a:rPr lang="en-US" smtClean="0"/>
-              <a:t>10/9/24</a:t>
+              <a:t>10/10/24</a:t>
             </a:fld>
             <a:endParaRPr lang="en-US"/>
           </a:p>
@@ -4340,7 +4236,7 @@
           <a:p>
             <a:fld id="{80FC6068-BAFB-FC44-B9D8-F4B3BB105DE6}" type="datetimeFigureOut">
               <a:rPr lang="en-US" smtClean="0"/>
-              <a:t>10/9/24</a:t>
+              <a:t>10/10/24</a:t>
             </a:fld>
             <a:endParaRPr lang="en-US"/>
           </a:p>
@@ -4605,7 +4501,7 @@
           <a:p>
             <a:fld id="{80FC6068-BAFB-FC44-B9D8-F4B3BB105DE6}" type="datetimeFigureOut">
               <a:rPr lang="en-US" smtClean="0"/>
-              <a:t>10/9/24</a:t>
+              <a:t>10/10/24</a:t>
             </a:fld>
             <a:endParaRPr lang="en-US"/>
           </a:p>
@@ -5017,7 +4913,7 @@
           <a:p>
             <a:fld id="{80FC6068-BAFB-FC44-B9D8-F4B3BB105DE6}" type="datetimeFigureOut">
               <a:rPr lang="en-US" smtClean="0"/>
-              <a:t>10/9/24</a:t>
+              <a:t>10/10/24</a:t>
             </a:fld>
             <a:endParaRPr lang="en-US"/>
           </a:p>
@@ -5158,7 +5054,7 @@
           <a:p>
             <a:fld id="{80FC6068-BAFB-FC44-B9D8-F4B3BB105DE6}" type="datetimeFigureOut">
               <a:rPr lang="en-US" smtClean="0"/>
-              <a:t>10/9/24</a:t>
+              <a:t>10/10/24</a:t>
             </a:fld>
             <a:endParaRPr lang="en-US"/>
           </a:p>
@@ -5271,7 +5167,7 @@
           <a:p>
             <a:fld id="{80FC6068-BAFB-FC44-B9D8-F4B3BB105DE6}" type="datetimeFigureOut">
               <a:rPr lang="en-US" smtClean="0"/>
-              <a:t>10/9/24</a:t>
+              <a:t>10/10/24</a:t>
             </a:fld>
             <a:endParaRPr lang="en-US"/>
           </a:p>
@@ -5582,7 +5478,7 @@
           <a:p>
             <a:fld id="{80FC6068-BAFB-FC44-B9D8-F4B3BB105DE6}" type="datetimeFigureOut">
               <a:rPr lang="en-US" smtClean="0"/>
-              <a:t>10/9/24</a:t>
+              <a:t>10/10/24</a:t>
             </a:fld>
             <a:endParaRPr lang="en-US"/>
           </a:p>
@@ -5870,7 +5766,7 @@
           <a:p>
             <a:fld id="{80FC6068-BAFB-FC44-B9D8-F4B3BB105DE6}" type="datetimeFigureOut">
               <a:rPr lang="en-US" smtClean="0"/>
-              <a:t>10/9/24</a:t>
+              <a:t>10/10/24</a:t>
             </a:fld>
             <a:endParaRPr lang="en-US"/>
           </a:p>
@@ -6111,7 +6007,7 @@
           <a:p>
             <a:fld id="{80FC6068-BAFB-FC44-B9D8-F4B3BB105DE6}" type="datetimeFigureOut">
               <a:rPr lang="en-US" smtClean="0"/>
-              <a:t>10/9/24</a:t>
+              <a:t>10/10/24</a:t>
             </a:fld>
             <a:endParaRPr lang="en-US"/>
           </a:p>
@@ -6638,6 +6534,415 @@
   <p:cSld>
     <p:spTree>
       <p:nvGrpSpPr>
+        <p:cNvPr id="1" name=""/>
+        <p:cNvGrpSpPr/>
+        <p:nvPr/>
+      </p:nvGrpSpPr>
+      <p:grpSpPr>
+        <a:xfrm>
+          <a:off x="0" y="0"/>
+          <a:ext cx="0" cy="0"/>
+          <a:chOff x="0" y="0"/>
+          <a:chExt cx="0" cy="0"/>
+        </a:xfrm>
+      </p:grpSpPr>
+      <p:sp>
+        <p:nvSpPr>
+          <p:cNvPr id="2" name="Title 1">
+            <a:extLst>
+              <a:ext uri="{FF2B5EF4-FFF2-40B4-BE49-F238E27FC236}">
+                <a16:creationId xmlns:a16="http://schemas.microsoft.com/office/drawing/2014/main" id="{70A4C97D-8F21-3D3B-6A90-EA7145324964}"/>
+              </a:ext>
+            </a:extLst>
+          </p:cNvPr>
+          <p:cNvSpPr>
+            <a:spLocks noGrp="1"/>
+          </p:cNvSpPr>
+          <p:nvPr>
+            <p:ph type="title"/>
+          </p:nvPr>
+        </p:nvSpPr>
+        <p:spPr>
+          <a:xfrm>
+            <a:off x="838200" y="593725"/>
+            <a:ext cx="10515600" cy="1325563"/>
+          </a:xfrm>
+        </p:spPr>
+        <p:txBody>
+          <a:bodyPr>
+            <a:normAutofit/>
+          </a:bodyPr>
+          <a:lstStyle/>
+          <a:p>
+            <a:r>
+              <a:rPr lang="en-US" dirty="0"/>
+              <a:t>Next steps</a:t>
+            </a:r>
+          </a:p>
+        </p:txBody>
+      </p:sp>
+      <p:sp>
+        <p:nvSpPr>
+          <p:cNvPr id="3" name="Content Placeholder 2">
+            <a:extLst>
+              <a:ext uri="{FF2B5EF4-FFF2-40B4-BE49-F238E27FC236}">
+                <a16:creationId xmlns:a16="http://schemas.microsoft.com/office/drawing/2014/main" id="{B9501834-7B32-1ACA-4358-B630FB8EEC36}"/>
+              </a:ext>
+            </a:extLst>
+          </p:cNvPr>
+          <p:cNvSpPr>
+            <a:spLocks noGrp="1"/>
+          </p:cNvSpPr>
+          <p:nvPr>
+            <p:ph idx="1"/>
+          </p:nvPr>
+        </p:nvSpPr>
+        <p:spPr>
+          <a:xfrm>
+            <a:off x="838199" y="1919289"/>
+            <a:ext cx="10384857" cy="4623402"/>
+          </a:xfrm>
+        </p:spPr>
+        <p:txBody>
+          <a:bodyPr>
+            <a:normAutofit/>
+          </a:bodyPr>
+          <a:lstStyle/>
+          <a:p>
+            <a:pPr marL="514350" indent="-514350">
+              <a:buFont typeface="+mj-lt"/>
+              <a:buAutoNum type="arabicPeriod"/>
+            </a:pPr>
+            <a:r>
+              <a:rPr lang="en-US" dirty="0"/>
+              <a:t>Do severe </a:t>
+            </a:r>
+            <a:r>
+              <a:rPr lang="en-US" dirty="0" err="1"/>
+              <a:t>irAE</a:t>
+            </a:r>
+            <a:r>
+              <a:rPr lang="en-US" dirty="0"/>
+              <a:t> (high grade) patient immunotypes appear distinct from non-severe </a:t>
+            </a:r>
+            <a:r>
+              <a:rPr lang="en-US" dirty="0" err="1"/>
+              <a:t>irAE</a:t>
+            </a:r>
+            <a:r>
+              <a:rPr lang="en-US" dirty="0"/>
+              <a:t> patient immunotypes at baseline?</a:t>
+            </a:r>
+          </a:p>
+          <a:p>
+            <a:pPr marL="514350" indent="-514350">
+              <a:buFont typeface="+mj-lt"/>
+              <a:buAutoNum type="arabicPeriod"/>
+            </a:pPr>
+            <a:r>
+              <a:rPr lang="en-US" dirty="0"/>
+              <a:t>IMPACD: using hierarchical/combinatory gating, do we see distinct immunotypes by </a:t>
+            </a:r>
+            <a:r>
+              <a:rPr lang="en-US" dirty="0" err="1"/>
+              <a:t>irAE</a:t>
+            </a:r>
+            <a:r>
+              <a:rPr lang="en-US" dirty="0"/>
+              <a:t> group</a:t>
+            </a:r>
+          </a:p>
+        </p:txBody>
+      </p:sp>
+    </p:spTree>
+    <p:extLst>
+      <p:ext uri="{BB962C8B-B14F-4D97-AF65-F5344CB8AC3E}">
+        <p14:creationId xmlns:p14="http://schemas.microsoft.com/office/powerpoint/2010/main" val="4091688872"/>
+      </p:ext>
+    </p:extLst>
+  </p:cSld>
+  <p:clrMapOvr>
+    <a:masterClrMapping/>
+  </p:clrMapOvr>
+</p:sld>
+</file>
+
+<file path=ppt/slides/slide11.xml><?xml version="1.0" encoding="utf-8"?>
+<p:sld xmlns:a="http://schemas.openxmlformats.org/drawingml/2006/main" xmlns:r="http://schemas.openxmlformats.org/officeDocument/2006/relationships" xmlns:p="http://schemas.openxmlformats.org/presentationml/2006/main">
+  <p:cSld>
+    <p:spTree>
+      <p:nvGrpSpPr>
+        <p:cNvPr id="1" name=""/>
+        <p:cNvGrpSpPr/>
+        <p:nvPr/>
+      </p:nvGrpSpPr>
+      <p:grpSpPr>
+        <a:xfrm>
+          <a:off x="0" y="0"/>
+          <a:ext cx="0" cy="0"/>
+          <a:chOff x="0" y="0"/>
+          <a:chExt cx="0" cy="0"/>
+        </a:xfrm>
+      </p:grpSpPr>
+      <p:pic>
+        <p:nvPicPr>
+          <p:cNvPr id="6" name="Picture 5">
+            <a:extLst>
+              <a:ext uri="{FF2B5EF4-FFF2-40B4-BE49-F238E27FC236}">
+                <a16:creationId xmlns:a16="http://schemas.microsoft.com/office/drawing/2014/main" id="{E21F8D95-5379-5DDA-F135-1A690381F6C0}"/>
+              </a:ext>
+            </a:extLst>
+          </p:cNvPr>
+          <p:cNvPicPr>
+            <a:picLocks noChangeAspect="1"/>
+          </p:cNvPicPr>
+          <p:nvPr/>
+        </p:nvPicPr>
+        <p:blipFill>
+          <a:blip r:embed="rId3"/>
+          <a:stretch>
+            <a:fillRect/>
+          </a:stretch>
+        </p:blipFill>
+        <p:spPr>
+          <a:xfrm>
+            <a:off x="0" y="4527042"/>
+            <a:ext cx="8664498" cy="2322530"/>
+          </a:xfrm>
+          <a:prstGeom prst="rect">
+            <a:avLst/>
+          </a:prstGeom>
+        </p:spPr>
+      </p:pic>
+      <p:sp>
+        <p:nvSpPr>
+          <p:cNvPr id="2" name="Title 1">
+            <a:extLst>
+              <a:ext uri="{FF2B5EF4-FFF2-40B4-BE49-F238E27FC236}">
+                <a16:creationId xmlns:a16="http://schemas.microsoft.com/office/drawing/2014/main" id="{70A4C97D-8F21-3D3B-6A90-EA7145324964}"/>
+              </a:ext>
+            </a:extLst>
+          </p:cNvPr>
+          <p:cNvSpPr>
+            <a:spLocks noGrp="1"/>
+          </p:cNvSpPr>
+          <p:nvPr>
+            <p:ph type="title"/>
+          </p:nvPr>
+        </p:nvSpPr>
+        <p:spPr>
+          <a:xfrm>
+            <a:off x="838200" y="593725"/>
+            <a:ext cx="10515600" cy="1325563"/>
+          </a:xfrm>
+        </p:spPr>
+        <p:txBody>
+          <a:bodyPr>
+            <a:normAutofit/>
+          </a:bodyPr>
+          <a:lstStyle/>
+          <a:p>
+            <a:r>
+              <a:rPr lang="en-US" dirty="0"/>
+              <a:t>Acknowledgements</a:t>
+            </a:r>
+          </a:p>
+        </p:txBody>
+      </p:sp>
+      <p:sp>
+        <p:nvSpPr>
+          <p:cNvPr id="3" name="Content Placeholder 2">
+            <a:extLst>
+              <a:ext uri="{FF2B5EF4-FFF2-40B4-BE49-F238E27FC236}">
+                <a16:creationId xmlns:a16="http://schemas.microsoft.com/office/drawing/2014/main" id="{B9501834-7B32-1ACA-4358-B630FB8EEC36}"/>
+              </a:ext>
+            </a:extLst>
+          </p:cNvPr>
+          <p:cNvSpPr>
+            <a:spLocks noGrp="1"/>
+          </p:cNvSpPr>
+          <p:nvPr>
+            <p:ph idx="1"/>
+          </p:nvPr>
+        </p:nvSpPr>
+        <p:spPr>
+          <a:xfrm>
+            <a:off x="838200" y="1919289"/>
+            <a:ext cx="10515600" cy="4623402"/>
+          </a:xfrm>
+        </p:spPr>
+        <p:txBody>
+          <a:bodyPr numCol="2">
+            <a:normAutofit/>
+          </a:bodyPr>
+          <a:lstStyle/>
+          <a:p>
+            <a:r>
+              <a:rPr lang="en-US" dirty="0"/>
+              <a:t>Holly </a:t>
+            </a:r>
+            <a:r>
+              <a:rPr lang="en-US" dirty="0" err="1"/>
+              <a:t>Akilesh</a:t>
+            </a:r>
+            <a:endParaRPr lang="en-US" dirty="0"/>
+          </a:p>
+        </p:txBody>
+      </p:sp>
+    </p:spTree>
+    <p:extLst>
+      <p:ext uri="{BB962C8B-B14F-4D97-AF65-F5344CB8AC3E}">
+        <p14:creationId xmlns:p14="http://schemas.microsoft.com/office/powerpoint/2010/main" val="2018884985"/>
+      </p:ext>
+    </p:extLst>
+  </p:cSld>
+  <p:clrMapOvr>
+    <a:masterClrMapping/>
+  </p:clrMapOvr>
+</p:sld>
+</file>
+
+<file path=ppt/slides/slide12.xml><?xml version="1.0" encoding="utf-8"?>
+<p:sld xmlns:a="http://schemas.openxmlformats.org/drawingml/2006/main" xmlns:r="http://schemas.openxmlformats.org/officeDocument/2006/relationships" xmlns:p="http://schemas.openxmlformats.org/presentationml/2006/main">
+  <p:cSld>
+    <p:spTree>
+      <p:nvGrpSpPr>
+        <p:cNvPr id="1" name="">
+          <a:extLst>
+            <a:ext uri="{FF2B5EF4-FFF2-40B4-BE49-F238E27FC236}">
+              <a16:creationId xmlns:a16="http://schemas.microsoft.com/office/drawing/2014/main" id="{2256A9F8-8FCD-A612-3C8B-11CEDB555932}"/>
+            </a:ext>
+          </a:extLst>
+        </p:cNvPr>
+        <p:cNvGrpSpPr/>
+        <p:nvPr/>
+      </p:nvGrpSpPr>
+      <p:grpSpPr>
+        <a:xfrm>
+          <a:off x="0" y="0"/>
+          <a:ext cx="0" cy="0"/>
+          <a:chOff x="0" y="0"/>
+          <a:chExt cx="0" cy="0"/>
+        </a:xfrm>
+      </p:grpSpPr>
+      <p:sp>
+        <p:nvSpPr>
+          <p:cNvPr id="2" name="Title 1">
+            <a:extLst>
+              <a:ext uri="{FF2B5EF4-FFF2-40B4-BE49-F238E27FC236}">
+                <a16:creationId xmlns:a16="http://schemas.microsoft.com/office/drawing/2014/main" id="{01902C8D-12DC-6B73-CA6B-A2FCF8CCD218}"/>
+              </a:ext>
+            </a:extLst>
+          </p:cNvPr>
+          <p:cNvSpPr>
+            <a:spLocks noGrp="1"/>
+          </p:cNvSpPr>
+          <p:nvPr>
+            <p:ph type="title"/>
+          </p:nvPr>
+        </p:nvSpPr>
+        <p:spPr>
+          <a:xfrm>
+            <a:off x="838200" y="593725"/>
+            <a:ext cx="10515600" cy="1325563"/>
+          </a:xfrm>
+        </p:spPr>
+        <p:txBody>
+          <a:bodyPr>
+            <a:normAutofit/>
+          </a:bodyPr>
+          <a:lstStyle/>
+          <a:p>
+            <a:r>
+              <a:rPr lang="en-US" dirty="0"/>
+              <a:t>No longer see batch effects after regressing batch out</a:t>
+            </a:r>
+          </a:p>
+        </p:txBody>
+      </p:sp>
+      <p:pic>
+        <p:nvPicPr>
+          <p:cNvPr id="7" name="Picture 6">
+            <a:extLst>
+              <a:ext uri="{FF2B5EF4-FFF2-40B4-BE49-F238E27FC236}">
+                <a16:creationId xmlns:a16="http://schemas.microsoft.com/office/drawing/2014/main" id="{D6774A84-8B48-E4E6-4383-3A394284D732}"/>
+              </a:ext>
+            </a:extLst>
+          </p:cNvPr>
+          <p:cNvPicPr>
+            <a:picLocks noChangeAspect="1"/>
+          </p:cNvPicPr>
+          <p:nvPr/>
+        </p:nvPicPr>
+        <p:blipFill>
+          <a:blip r:embed="rId3"/>
+          <a:stretch>
+            <a:fillRect/>
+          </a:stretch>
+        </p:blipFill>
+        <p:spPr>
+          <a:xfrm>
+            <a:off x="4070928" y="1626669"/>
+            <a:ext cx="4480957" cy="5231331"/>
+          </a:xfrm>
+          <a:prstGeom prst="rect">
+            <a:avLst/>
+          </a:prstGeom>
+        </p:spPr>
+      </p:pic>
+      <p:sp>
+        <p:nvSpPr>
+          <p:cNvPr id="8" name="TextBox 7">
+            <a:extLst>
+              <a:ext uri="{FF2B5EF4-FFF2-40B4-BE49-F238E27FC236}">
+                <a16:creationId xmlns:a16="http://schemas.microsoft.com/office/drawing/2014/main" id="{56336676-434D-4DB1-E0FE-5CCB6400864E}"/>
+              </a:ext>
+            </a:extLst>
+          </p:cNvPr>
+          <p:cNvSpPr txBox="1"/>
+          <p:nvPr/>
+        </p:nvSpPr>
+        <p:spPr>
+          <a:xfrm>
+            <a:off x="4148145" y="6079609"/>
+            <a:ext cx="880241" cy="369332"/>
+          </a:xfrm>
+          <a:prstGeom prst="rect">
+            <a:avLst/>
+          </a:prstGeom>
+          <a:noFill/>
+        </p:spPr>
+        <p:txBody>
+          <a:bodyPr wrap="none" rtlCol="0">
+            <a:spAutoFit/>
+          </a:bodyPr>
+          <a:lstStyle/>
+          <a:p>
+            <a:r>
+              <a:rPr lang="en-US" dirty="0"/>
+              <a:t>Batch #</a:t>
+            </a:r>
+          </a:p>
+        </p:txBody>
+      </p:sp>
+    </p:spTree>
+    <p:extLst>
+      <p:ext uri="{BB962C8B-B14F-4D97-AF65-F5344CB8AC3E}">
+        <p14:creationId xmlns:p14="http://schemas.microsoft.com/office/powerpoint/2010/main" val="952937781"/>
+      </p:ext>
+    </p:extLst>
+  </p:cSld>
+  <p:clrMapOvr>
+    <a:masterClrMapping/>
+  </p:clrMapOvr>
+</p:sld>
+</file>
+
+<file path=ppt/slides/slide13.xml><?xml version="1.0" encoding="utf-8"?>
+<p:sld xmlns:a="http://schemas.openxmlformats.org/drawingml/2006/main" xmlns:r="http://schemas.openxmlformats.org/officeDocument/2006/relationships" xmlns:p="http://schemas.openxmlformats.org/presentationml/2006/main">
+  <p:cSld>
+    <p:spTree>
+      <p:nvGrpSpPr>
         <p:cNvPr id="1" name="">
           <a:extLst>
             <a:ext uri="{FF2B5EF4-FFF2-40B4-BE49-F238E27FC236}">
@@ -6724,541 +7029,7 @@
     </p:spTree>
     <p:extLst>
       <p:ext uri="{BB962C8B-B14F-4D97-AF65-F5344CB8AC3E}">
-        <p14:creationId xmlns:p14="http://schemas.microsoft.com/office/powerpoint/2010/main" val="211499257"/>
-      </p:ext>
-    </p:extLst>
-  </p:cSld>
-  <p:clrMapOvr>
-    <a:masterClrMapping/>
-  </p:clrMapOvr>
-</p:sld>
-</file>
-
-<file path=ppt/slides/slide11.xml><?xml version="1.0" encoding="utf-8"?>
-<p:sld xmlns:a="http://schemas.openxmlformats.org/drawingml/2006/main" xmlns:r="http://schemas.openxmlformats.org/officeDocument/2006/relationships" xmlns:p="http://schemas.openxmlformats.org/presentationml/2006/main">
-  <p:cSld>
-    <p:spTree>
-      <p:nvGrpSpPr>
-        <p:cNvPr id="1" name="">
-          <a:extLst>
-            <a:ext uri="{FF2B5EF4-FFF2-40B4-BE49-F238E27FC236}">
-              <a16:creationId xmlns:a16="http://schemas.microsoft.com/office/drawing/2014/main" id="{C55D7743-C5CC-7163-42F9-8A139DE9A99C}"/>
-            </a:ext>
-          </a:extLst>
-        </p:cNvPr>
-        <p:cNvGrpSpPr/>
-        <p:nvPr/>
-      </p:nvGrpSpPr>
-      <p:grpSpPr>
-        <a:xfrm>
-          <a:off x="0" y="0"/>
-          <a:ext cx="0" cy="0"/>
-          <a:chOff x="0" y="0"/>
-          <a:chExt cx="0" cy="0"/>
-        </a:xfrm>
-      </p:grpSpPr>
-      <p:sp>
-        <p:nvSpPr>
-          <p:cNvPr id="2" name="Title 1">
-            <a:extLst>
-              <a:ext uri="{FF2B5EF4-FFF2-40B4-BE49-F238E27FC236}">
-                <a16:creationId xmlns:a16="http://schemas.microsoft.com/office/drawing/2014/main" id="{9F9D9FA2-5D53-2BEB-66A2-ABC93F201395}"/>
-              </a:ext>
-            </a:extLst>
-          </p:cNvPr>
-          <p:cNvSpPr>
-            <a:spLocks noGrp="1"/>
-          </p:cNvSpPr>
-          <p:nvPr>
-            <p:ph type="title"/>
-          </p:nvPr>
-        </p:nvSpPr>
-        <p:spPr>
-          <a:xfrm>
-            <a:off x="838200" y="593725"/>
-            <a:ext cx="10515600" cy="1325563"/>
-          </a:xfrm>
-        </p:spPr>
-        <p:txBody>
-          <a:bodyPr>
-            <a:normAutofit/>
-          </a:bodyPr>
-          <a:lstStyle/>
-          <a:p>
-            <a:r>
-              <a:rPr lang="en-US" dirty="0"/>
-              <a:t>Conclusions</a:t>
-            </a:r>
-          </a:p>
-        </p:txBody>
-      </p:sp>
-      <p:sp>
-        <p:nvSpPr>
-          <p:cNvPr id="3" name="Content Placeholder 2">
-            <a:extLst>
-              <a:ext uri="{FF2B5EF4-FFF2-40B4-BE49-F238E27FC236}">
-                <a16:creationId xmlns:a16="http://schemas.microsoft.com/office/drawing/2014/main" id="{C4F1A618-530F-D746-FAF5-0E38C47B5C08}"/>
-              </a:ext>
-            </a:extLst>
-          </p:cNvPr>
-          <p:cNvSpPr>
-            <a:spLocks noGrp="1"/>
-          </p:cNvSpPr>
-          <p:nvPr>
-            <p:ph idx="1"/>
-          </p:nvPr>
-        </p:nvSpPr>
-        <p:spPr>
-          <a:xfrm>
-            <a:off x="838200" y="1919289"/>
-            <a:ext cx="10515600" cy="4623402"/>
-          </a:xfrm>
-        </p:spPr>
-        <p:txBody>
-          <a:bodyPr>
-            <a:normAutofit/>
-          </a:bodyPr>
-          <a:lstStyle/>
-          <a:p>
-            <a:r>
-              <a:rPr lang="en-US" dirty="0"/>
-              <a:t>don’t see effect of previous treatments (radiation, chemoradiation…) on baseline cancer immunotypes (data not shown)</a:t>
-            </a:r>
-          </a:p>
-          <a:p>
-            <a:r>
-              <a:rPr lang="en-US" dirty="0"/>
-              <a:t>ICA does not appear better at distinguishing unique immunotypes by group (baseline) than PCA</a:t>
-            </a:r>
-          </a:p>
-          <a:p>
-            <a:r>
-              <a:rPr lang="en-US" dirty="0"/>
-              <a:t>PD1</a:t>
-            </a:r>
-            <a:r>
-              <a:rPr lang="en-US" baseline="30000" dirty="0"/>
-              <a:t>+</a:t>
-            </a:r>
-            <a:r>
-              <a:rPr lang="en-US" dirty="0"/>
-              <a:t> of CM </a:t>
-            </a:r>
-            <a:r>
-              <a:rPr lang="en-US" dirty="0" err="1"/>
-              <a:t>T</a:t>
-            </a:r>
-            <a:r>
-              <a:rPr lang="en-US" baseline="-25000" dirty="0" err="1"/>
-              <a:t>conv</a:t>
-            </a:r>
-            <a:r>
-              <a:rPr lang="en-US" dirty="0"/>
-              <a:t> </a:t>
-            </a:r>
-            <a:r>
-              <a:rPr lang="en-US" dirty="0" err="1"/>
-              <a:t>T</a:t>
-            </a:r>
-            <a:r>
-              <a:rPr lang="en-US" baseline="-25000" dirty="0" err="1"/>
-              <a:t>cells</a:t>
-            </a:r>
-            <a:r>
-              <a:rPr lang="en-US" dirty="0"/>
-              <a:t> slightly higher in non-</a:t>
-            </a:r>
-            <a:r>
-              <a:rPr lang="en-US" dirty="0" err="1"/>
-              <a:t>irAE</a:t>
-            </a:r>
-            <a:r>
-              <a:rPr lang="en-US" dirty="0"/>
-              <a:t> group vs. </a:t>
-            </a:r>
-            <a:r>
-              <a:rPr lang="en-US" dirty="0" err="1"/>
-              <a:t>irAE</a:t>
-            </a:r>
-            <a:r>
-              <a:rPr lang="en-US" dirty="0"/>
-              <a:t>/SAE group at baseline (after regressing out batch)</a:t>
-            </a:r>
-          </a:p>
-        </p:txBody>
-      </p:sp>
-    </p:spTree>
-    <p:extLst>
-      <p:ext uri="{BB962C8B-B14F-4D97-AF65-F5344CB8AC3E}">
-        <p14:creationId xmlns:p14="http://schemas.microsoft.com/office/powerpoint/2010/main" val="2812621026"/>
-      </p:ext>
-    </p:extLst>
-  </p:cSld>
-  <p:clrMapOvr>
-    <a:masterClrMapping/>
-  </p:clrMapOvr>
-</p:sld>
-</file>
-
-<file path=ppt/slides/slide12.xml><?xml version="1.0" encoding="utf-8"?>
-<p:sld xmlns:a="http://schemas.openxmlformats.org/drawingml/2006/main" xmlns:r="http://schemas.openxmlformats.org/officeDocument/2006/relationships" xmlns:p="http://schemas.openxmlformats.org/presentationml/2006/main">
-  <p:cSld>
-    <p:spTree>
-      <p:nvGrpSpPr>
-        <p:cNvPr id="1" name=""/>
-        <p:cNvGrpSpPr/>
-        <p:nvPr/>
-      </p:nvGrpSpPr>
-      <p:grpSpPr>
-        <a:xfrm>
-          <a:off x="0" y="0"/>
-          <a:ext cx="0" cy="0"/>
-          <a:chOff x="0" y="0"/>
-          <a:chExt cx="0" cy="0"/>
-        </a:xfrm>
-      </p:grpSpPr>
-      <p:sp>
-        <p:nvSpPr>
-          <p:cNvPr id="2" name="Title 1">
-            <a:extLst>
-              <a:ext uri="{FF2B5EF4-FFF2-40B4-BE49-F238E27FC236}">
-                <a16:creationId xmlns:a16="http://schemas.microsoft.com/office/drawing/2014/main" id="{70A4C97D-8F21-3D3B-6A90-EA7145324964}"/>
-              </a:ext>
-            </a:extLst>
-          </p:cNvPr>
-          <p:cNvSpPr>
-            <a:spLocks noGrp="1"/>
-          </p:cNvSpPr>
-          <p:nvPr>
-            <p:ph type="title"/>
-          </p:nvPr>
-        </p:nvSpPr>
-        <p:spPr>
-          <a:xfrm>
-            <a:off x="838200" y="593725"/>
-            <a:ext cx="10515600" cy="1325563"/>
-          </a:xfrm>
-        </p:spPr>
-        <p:txBody>
-          <a:bodyPr>
-            <a:normAutofit/>
-          </a:bodyPr>
-          <a:lstStyle/>
-          <a:p>
-            <a:r>
-              <a:rPr lang="en-US" dirty="0"/>
-              <a:t>Next steps</a:t>
-            </a:r>
-          </a:p>
-        </p:txBody>
-      </p:sp>
-      <p:sp>
-        <p:nvSpPr>
-          <p:cNvPr id="3" name="Content Placeholder 2">
-            <a:extLst>
-              <a:ext uri="{FF2B5EF4-FFF2-40B4-BE49-F238E27FC236}">
-                <a16:creationId xmlns:a16="http://schemas.microsoft.com/office/drawing/2014/main" id="{B9501834-7B32-1ACA-4358-B630FB8EEC36}"/>
-              </a:ext>
-            </a:extLst>
-          </p:cNvPr>
-          <p:cNvSpPr>
-            <a:spLocks noGrp="1"/>
-          </p:cNvSpPr>
-          <p:nvPr>
-            <p:ph idx="1"/>
-          </p:nvPr>
-        </p:nvSpPr>
-        <p:spPr>
-          <a:xfrm>
-            <a:off x="838199" y="1919289"/>
-            <a:ext cx="10384857" cy="4623402"/>
-          </a:xfrm>
-        </p:spPr>
-        <p:txBody>
-          <a:bodyPr>
-            <a:normAutofit/>
-          </a:bodyPr>
-          <a:lstStyle/>
-          <a:p>
-            <a:endParaRPr lang="en-US" dirty="0"/>
-          </a:p>
-        </p:txBody>
-      </p:sp>
-    </p:spTree>
-    <p:extLst>
-      <p:ext uri="{BB962C8B-B14F-4D97-AF65-F5344CB8AC3E}">
-        <p14:creationId xmlns:p14="http://schemas.microsoft.com/office/powerpoint/2010/main" val="4091688872"/>
-      </p:ext>
-    </p:extLst>
-  </p:cSld>
-  <p:clrMapOvr>
-    <a:masterClrMapping/>
-  </p:clrMapOvr>
-</p:sld>
-</file>
-
-<file path=ppt/slides/slide13.xml><?xml version="1.0" encoding="utf-8"?>
-<p:sld xmlns:a="http://schemas.openxmlformats.org/drawingml/2006/main" xmlns:r="http://schemas.openxmlformats.org/officeDocument/2006/relationships" xmlns:p="http://schemas.openxmlformats.org/presentationml/2006/main">
-  <p:cSld>
-    <p:spTree>
-      <p:nvGrpSpPr>
-        <p:cNvPr id="1" name=""/>
-        <p:cNvGrpSpPr/>
-        <p:nvPr/>
-      </p:nvGrpSpPr>
-      <p:grpSpPr>
-        <a:xfrm>
-          <a:off x="0" y="0"/>
-          <a:ext cx="0" cy="0"/>
-          <a:chOff x="0" y="0"/>
-          <a:chExt cx="0" cy="0"/>
-        </a:xfrm>
-      </p:grpSpPr>
-      <p:pic>
-        <p:nvPicPr>
-          <p:cNvPr id="6" name="Picture 5">
-            <a:extLst>
-              <a:ext uri="{FF2B5EF4-FFF2-40B4-BE49-F238E27FC236}">
-                <a16:creationId xmlns:a16="http://schemas.microsoft.com/office/drawing/2014/main" id="{E21F8D95-5379-5DDA-F135-1A690381F6C0}"/>
-              </a:ext>
-            </a:extLst>
-          </p:cNvPr>
-          <p:cNvPicPr>
-            <a:picLocks noChangeAspect="1"/>
-          </p:cNvPicPr>
-          <p:nvPr/>
-        </p:nvPicPr>
-        <p:blipFill>
-          <a:blip r:embed="rId3"/>
-          <a:stretch>
-            <a:fillRect/>
-          </a:stretch>
-        </p:blipFill>
-        <p:spPr>
-          <a:xfrm>
-            <a:off x="0" y="4527042"/>
-            <a:ext cx="8664498" cy="2322530"/>
-          </a:xfrm>
-          <a:prstGeom prst="rect">
-            <a:avLst/>
-          </a:prstGeom>
-        </p:spPr>
-      </p:pic>
-      <p:sp>
-        <p:nvSpPr>
-          <p:cNvPr id="2" name="Title 1">
-            <a:extLst>
-              <a:ext uri="{FF2B5EF4-FFF2-40B4-BE49-F238E27FC236}">
-                <a16:creationId xmlns:a16="http://schemas.microsoft.com/office/drawing/2014/main" id="{70A4C97D-8F21-3D3B-6A90-EA7145324964}"/>
-              </a:ext>
-            </a:extLst>
-          </p:cNvPr>
-          <p:cNvSpPr>
-            <a:spLocks noGrp="1"/>
-          </p:cNvSpPr>
-          <p:nvPr>
-            <p:ph type="title"/>
-          </p:nvPr>
-        </p:nvSpPr>
-        <p:spPr>
-          <a:xfrm>
-            <a:off x="838200" y="593725"/>
-            <a:ext cx="10515600" cy="1325563"/>
-          </a:xfrm>
-        </p:spPr>
-        <p:txBody>
-          <a:bodyPr>
-            <a:normAutofit/>
-          </a:bodyPr>
-          <a:lstStyle/>
-          <a:p>
-            <a:r>
-              <a:rPr lang="en-US" dirty="0"/>
-              <a:t>Acknowledgements</a:t>
-            </a:r>
-          </a:p>
-        </p:txBody>
-      </p:sp>
-      <p:sp>
-        <p:nvSpPr>
-          <p:cNvPr id="3" name="Content Placeholder 2">
-            <a:extLst>
-              <a:ext uri="{FF2B5EF4-FFF2-40B4-BE49-F238E27FC236}">
-                <a16:creationId xmlns:a16="http://schemas.microsoft.com/office/drawing/2014/main" id="{B9501834-7B32-1ACA-4358-B630FB8EEC36}"/>
-              </a:ext>
-            </a:extLst>
-          </p:cNvPr>
-          <p:cNvSpPr>
-            <a:spLocks noGrp="1"/>
-          </p:cNvSpPr>
-          <p:nvPr>
-            <p:ph idx="1"/>
-          </p:nvPr>
-        </p:nvSpPr>
-        <p:spPr>
-          <a:xfrm>
-            <a:off x="838200" y="1919289"/>
-            <a:ext cx="10515600" cy="4623402"/>
-          </a:xfrm>
-        </p:spPr>
-        <p:txBody>
-          <a:bodyPr numCol="2">
-            <a:normAutofit/>
-          </a:bodyPr>
-          <a:lstStyle/>
-          <a:p>
-            <a:r>
-              <a:rPr lang="en-US" dirty="0"/>
-              <a:t>Holly </a:t>
-            </a:r>
-            <a:r>
-              <a:rPr lang="en-US" dirty="0" err="1"/>
-              <a:t>Akilesh</a:t>
-            </a:r>
-            <a:endParaRPr lang="en-US" dirty="0"/>
-          </a:p>
-        </p:txBody>
-      </p:sp>
-    </p:spTree>
-    <p:extLst>
-      <p:ext uri="{BB962C8B-B14F-4D97-AF65-F5344CB8AC3E}">
-        <p14:creationId xmlns:p14="http://schemas.microsoft.com/office/powerpoint/2010/main" val="2018884985"/>
-      </p:ext>
-    </p:extLst>
-  </p:cSld>
-  <p:clrMapOvr>
-    <a:masterClrMapping/>
-  </p:clrMapOvr>
-</p:sld>
-</file>
-
-<file path=ppt/slides/slide14.xml><?xml version="1.0" encoding="utf-8"?>
-<p:sld xmlns:a="http://schemas.openxmlformats.org/drawingml/2006/main" xmlns:r="http://schemas.openxmlformats.org/officeDocument/2006/relationships" xmlns:p="http://schemas.openxmlformats.org/presentationml/2006/main">
-  <p:cSld>
-    <p:spTree>
-      <p:nvGrpSpPr>
-        <p:cNvPr id="1" name="">
-          <a:extLst>
-            <a:ext uri="{FF2B5EF4-FFF2-40B4-BE49-F238E27FC236}">
-              <a16:creationId xmlns:a16="http://schemas.microsoft.com/office/drawing/2014/main" id="{2256A9F8-8FCD-A612-3C8B-11CEDB555932}"/>
-            </a:ext>
-          </a:extLst>
-        </p:cNvPr>
-        <p:cNvGrpSpPr/>
-        <p:nvPr/>
-      </p:nvGrpSpPr>
-      <p:grpSpPr>
-        <a:xfrm>
-          <a:off x="0" y="0"/>
-          <a:ext cx="0" cy="0"/>
-          <a:chOff x="0" y="0"/>
-          <a:chExt cx="0" cy="0"/>
-        </a:xfrm>
-      </p:grpSpPr>
-      <p:sp>
-        <p:nvSpPr>
-          <p:cNvPr id="2" name="Title 1">
-            <a:extLst>
-              <a:ext uri="{FF2B5EF4-FFF2-40B4-BE49-F238E27FC236}">
-                <a16:creationId xmlns:a16="http://schemas.microsoft.com/office/drawing/2014/main" id="{01902C8D-12DC-6B73-CA6B-A2FCF8CCD218}"/>
-              </a:ext>
-            </a:extLst>
-          </p:cNvPr>
-          <p:cNvSpPr>
-            <a:spLocks noGrp="1"/>
-          </p:cNvSpPr>
-          <p:nvPr>
-            <p:ph type="title"/>
-          </p:nvPr>
-        </p:nvSpPr>
-        <p:spPr>
-          <a:xfrm>
-            <a:off x="838200" y="593725"/>
-            <a:ext cx="10515600" cy="1325563"/>
-          </a:xfrm>
-        </p:spPr>
-        <p:txBody>
-          <a:bodyPr>
-            <a:normAutofit/>
-          </a:bodyPr>
-          <a:lstStyle/>
-          <a:p>
-            <a:r>
-              <a:rPr lang="en-US" dirty="0"/>
-              <a:t>Regressing out batch works</a:t>
-            </a:r>
-          </a:p>
-        </p:txBody>
-      </p:sp>
-      <p:pic>
-        <p:nvPicPr>
-          <p:cNvPr id="7" name="Picture 6">
-            <a:extLst>
-              <a:ext uri="{FF2B5EF4-FFF2-40B4-BE49-F238E27FC236}">
-                <a16:creationId xmlns:a16="http://schemas.microsoft.com/office/drawing/2014/main" id="{D6774A84-8B48-E4E6-4383-3A394284D732}"/>
-              </a:ext>
-            </a:extLst>
-          </p:cNvPr>
-          <p:cNvPicPr>
-            <a:picLocks noChangeAspect="1"/>
-          </p:cNvPicPr>
-          <p:nvPr/>
-        </p:nvPicPr>
-        <p:blipFill>
-          <a:blip r:embed="rId3"/>
-          <a:stretch>
-            <a:fillRect/>
-          </a:stretch>
-        </p:blipFill>
-        <p:spPr>
-          <a:xfrm>
-            <a:off x="3914280" y="1443789"/>
-            <a:ext cx="4637605" cy="5414211"/>
-          </a:xfrm>
-          <a:prstGeom prst="rect">
-            <a:avLst/>
-          </a:prstGeom>
-        </p:spPr>
-      </p:pic>
-      <p:sp>
-        <p:nvSpPr>
-          <p:cNvPr id="8" name="TextBox 7">
-            <a:extLst>
-              <a:ext uri="{FF2B5EF4-FFF2-40B4-BE49-F238E27FC236}">
-                <a16:creationId xmlns:a16="http://schemas.microsoft.com/office/drawing/2014/main" id="{56336676-434D-4DB1-E0FE-5CCB6400864E}"/>
-              </a:ext>
-            </a:extLst>
-          </p:cNvPr>
-          <p:cNvSpPr txBox="1"/>
-          <p:nvPr/>
-        </p:nvSpPr>
-        <p:spPr>
-          <a:xfrm>
-            <a:off x="4148145" y="6079609"/>
-            <a:ext cx="880241" cy="369332"/>
-          </a:xfrm>
-          <a:prstGeom prst="rect">
-            <a:avLst/>
-          </a:prstGeom>
-          <a:noFill/>
-        </p:spPr>
-        <p:txBody>
-          <a:bodyPr wrap="none" rtlCol="0">
-            <a:spAutoFit/>
-          </a:bodyPr>
-          <a:lstStyle/>
-          <a:p>
-            <a:r>
-              <a:rPr lang="en-US" dirty="0"/>
-              <a:t>Batch #</a:t>
-            </a:r>
-          </a:p>
-        </p:txBody>
-      </p:sp>
-    </p:spTree>
-    <p:extLst>
-      <p:ext uri="{BB962C8B-B14F-4D97-AF65-F5344CB8AC3E}">
-        <p14:creationId xmlns:p14="http://schemas.microsoft.com/office/powerpoint/2010/main" val="952937781"/>
+        <p14:creationId xmlns:p14="http://schemas.microsoft.com/office/powerpoint/2010/main" val="3578147398"/>
       </p:ext>
     </p:extLst>
   </p:cSld>
@@ -7457,6 +7228,45 @@
           </a:prstGeom>
         </p:spPr>
       </p:pic>
+      <p:sp>
+        <p:nvSpPr>
+          <p:cNvPr id="3" name="TextBox 2">
+            <a:extLst>
+              <a:ext uri="{FF2B5EF4-FFF2-40B4-BE49-F238E27FC236}">
+                <a16:creationId xmlns:a16="http://schemas.microsoft.com/office/drawing/2014/main" id="{C3DC301F-B2EC-A419-BCE3-5F6E8BB1611B}"/>
+              </a:ext>
+            </a:extLst>
+          </p:cNvPr>
+          <p:cNvSpPr txBox="1"/>
+          <p:nvPr/>
+        </p:nvSpPr>
+        <p:spPr>
+          <a:xfrm>
+            <a:off x="7575082" y="2406316"/>
+            <a:ext cx="3802964" cy="369332"/>
+          </a:xfrm>
+          <a:prstGeom prst="rect">
+            <a:avLst/>
+          </a:prstGeom>
+          <a:noFill/>
+        </p:spPr>
+        <p:txBody>
+          <a:bodyPr wrap="none" rtlCol="0">
+            <a:spAutoFit/>
+          </a:bodyPr>
+          <a:lstStyle/>
+          <a:p>
+            <a:r>
+              <a:rPr lang="en-US" dirty="0">
+                <a:solidFill>
+                  <a:srgbClr val="FF0000"/>
+                </a:solidFill>
+              </a:rPr>
+              <a:t>Re-do w/ same colors as previous slide</a:t>
+            </a:r>
+          </a:p>
+        </p:txBody>
+      </p:sp>
     </p:spTree>
     <p:extLst>
       <p:ext uri="{BB962C8B-B14F-4D97-AF65-F5344CB8AC3E}">
@@ -7680,6 +7490,142 @@
         <p:cNvPr id="1" name="">
           <a:extLst>
             <a:ext uri="{FF2B5EF4-FFF2-40B4-BE49-F238E27FC236}">
+              <a16:creationId xmlns:a16="http://schemas.microsoft.com/office/drawing/2014/main" id="{9217C626-A11B-906E-4725-B50C0E85AB29}"/>
+            </a:ext>
+          </a:extLst>
+        </p:cNvPr>
+        <p:cNvGrpSpPr/>
+        <p:nvPr/>
+      </p:nvGrpSpPr>
+      <p:grpSpPr>
+        <a:xfrm>
+          <a:off x="0" y="0"/>
+          <a:ext cx="0" cy="0"/>
+          <a:chOff x="0" y="0"/>
+          <a:chExt cx="0" cy="0"/>
+        </a:xfrm>
+      </p:grpSpPr>
+      <p:pic>
+        <p:nvPicPr>
+          <p:cNvPr id="6" name="Picture 5">
+            <a:extLst>
+              <a:ext uri="{FF2B5EF4-FFF2-40B4-BE49-F238E27FC236}">
+                <a16:creationId xmlns:a16="http://schemas.microsoft.com/office/drawing/2014/main" id="{0294AC86-94E7-066B-904B-BC5AE1B57AC5}"/>
+              </a:ext>
+            </a:extLst>
+          </p:cNvPr>
+          <p:cNvPicPr>
+            <a:picLocks noChangeAspect="1"/>
+          </p:cNvPicPr>
+          <p:nvPr/>
+        </p:nvPicPr>
+        <p:blipFill>
+          <a:blip r:embed="rId3"/>
+          <a:stretch>
+            <a:fillRect/>
+          </a:stretch>
+        </p:blipFill>
+        <p:spPr>
+          <a:xfrm>
+            <a:off x="6350256" y="0"/>
+            <a:ext cx="5841744" cy="6858000"/>
+          </a:xfrm>
+          <a:prstGeom prst="rect">
+            <a:avLst/>
+          </a:prstGeom>
+        </p:spPr>
+      </p:pic>
+      <p:sp>
+        <p:nvSpPr>
+          <p:cNvPr id="2" name="Title 1">
+            <a:extLst>
+              <a:ext uri="{FF2B5EF4-FFF2-40B4-BE49-F238E27FC236}">
+                <a16:creationId xmlns:a16="http://schemas.microsoft.com/office/drawing/2014/main" id="{099B6722-9F8B-23CC-CF03-C974E55105C8}"/>
+              </a:ext>
+            </a:extLst>
+          </p:cNvPr>
+          <p:cNvSpPr>
+            <a:spLocks noGrp="1"/>
+          </p:cNvSpPr>
+          <p:nvPr>
+            <p:ph type="title"/>
+          </p:nvPr>
+        </p:nvSpPr>
+        <p:spPr>
+          <a:xfrm>
+            <a:off x="838201" y="593725"/>
+            <a:ext cx="5257800" cy="1325563"/>
+          </a:xfrm>
+        </p:spPr>
+        <p:txBody>
+          <a:bodyPr>
+            <a:normAutofit fontScale="90000"/>
+          </a:bodyPr>
+          <a:lstStyle/>
+          <a:p>
+            <a:r>
+              <a:rPr lang="en-US" dirty="0"/>
+              <a:t>Age contributes to variation (baseline samples)</a:t>
+            </a:r>
+          </a:p>
+        </p:txBody>
+      </p:sp>
+      <p:sp>
+        <p:nvSpPr>
+          <p:cNvPr id="4" name="TextBox 3">
+            <a:extLst>
+              <a:ext uri="{FF2B5EF4-FFF2-40B4-BE49-F238E27FC236}">
+                <a16:creationId xmlns:a16="http://schemas.microsoft.com/office/drawing/2014/main" id="{2B1DE7FD-F298-905A-CBC9-1E253F912A6E}"/>
+              </a:ext>
+            </a:extLst>
+          </p:cNvPr>
+          <p:cNvSpPr txBox="1"/>
+          <p:nvPr/>
+        </p:nvSpPr>
+        <p:spPr>
+          <a:xfrm>
+            <a:off x="7632834" y="5881035"/>
+            <a:ext cx="540212" cy="369332"/>
+          </a:xfrm>
+          <a:prstGeom prst="rect">
+            <a:avLst/>
+          </a:prstGeom>
+          <a:noFill/>
+        </p:spPr>
+        <p:txBody>
+          <a:bodyPr wrap="none" rtlCol="0">
+            <a:spAutoFit/>
+          </a:bodyPr>
+          <a:lstStyle/>
+          <a:p>
+            <a:r>
+              <a:rPr lang="en-US" dirty="0"/>
+              <a:t>Age</a:t>
+            </a:r>
+          </a:p>
+        </p:txBody>
+      </p:sp>
+    </p:spTree>
+    <p:extLst>
+      <p:ext uri="{BB962C8B-B14F-4D97-AF65-F5344CB8AC3E}">
+        <p14:creationId xmlns:p14="http://schemas.microsoft.com/office/powerpoint/2010/main" val="4198242633"/>
+      </p:ext>
+    </p:extLst>
+  </p:cSld>
+  <p:clrMapOvr>
+    <a:masterClrMapping/>
+  </p:clrMapOvr>
+</p:sld>
+</file>
+
+<file path=ppt/slides/slide7.xml><?xml version="1.0" encoding="utf-8"?>
+<p:sld xmlns:a="http://schemas.openxmlformats.org/drawingml/2006/main" xmlns:r="http://schemas.openxmlformats.org/officeDocument/2006/relationships" xmlns:p="http://schemas.openxmlformats.org/presentationml/2006/main">
+  <p:cSld>
+    <p:spTree>
+      <p:nvGrpSpPr>
+        <p:cNvPr id="1" name="">
+          <a:extLst>
+            <a:ext uri="{FF2B5EF4-FFF2-40B4-BE49-F238E27FC236}">
               <a16:creationId xmlns:a16="http://schemas.microsoft.com/office/drawing/2014/main" id="{E17CACF3-C129-9D4E-EB91-5EEECE2606BA}"/>
             </a:ext>
           </a:extLst>
@@ -7798,143 +7744,7 @@
     </p:spTree>
     <p:extLst>
       <p:ext uri="{BB962C8B-B14F-4D97-AF65-F5344CB8AC3E}">
-        <p14:creationId xmlns:p14="http://schemas.microsoft.com/office/powerpoint/2010/main" val="652130272"/>
-      </p:ext>
-    </p:extLst>
-  </p:cSld>
-  <p:clrMapOvr>
-    <a:masterClrMapping/>
-  </p:clrMapOvr>
-</p:sld>
-</file>
-
-<file path=ppt/slides/slide7.xml><?xml version="1.0" encoding="utf-8"?>
-<p:sld xmlns:a="http://schemas.openxmlformats.org/drawingml/2006/main" xmlns:r="http://schemas.openxmlformats.org/officeDocument/2006/relationships" xmlns:p="http://schemas.openxmlformats.org/presentationml/2006/main">
-  <p:cSld>
-    <p:spTree>
-      <p:nvGrpSpPr>
-        <p:cNvPr id="1" name="">
-          <a:extLst>
-            <a:ext uri="{FF2B5EF4-FFF2-40B4-BE49-F238E27FC236}">
-              <a16:creationId xmlns:a16="http://schemas.microsoft.com/office/drawing/2014/main" id="{9217C626-A11B-906E-4725-B50C0E85AB29}"/>
-            </a:ext>
-          </a:extLst>
-        </p:cNvPr>
-        <p:cNvGrpSpPr/>
-        <p:nvPr/>
-      </p:nvGrpSpPr>
-      <p:grpSpPr>
-        <a:xfrm>
-          <a:off x="0" y="0"/>
-          <a:ext cx="0" cy="0"/>
-          <a:chOff x="0" y="0"/>
-          <a:chExt cx="0" cy="0"/>
-        </a:xfrm>
-      </p:grpSpPr>
-      <p:pic>
-        <p:nvPicPr>
-          <p:cNvPr id="6" name="Picture 5">
-            <a:extLst>
-              <a:ext uri="{FF2B5EF4-FFF2-40B4-BE49-F238E27FC236}">
-                <a16:creationId xmlns:a16="http://schemas.microsoft.com/office/drawing/2014/main" id="{0294AC86-94E7-066B-904B-BC5AE1B57AC5}"/>
-              </a:ext>
-            </a:extLst>
-          </p:cNvPr>
-          <p:cNvPicPr>
-            <a:picLocks noChangeAspect="1"/>
-          </p:cNvPicPr>
-          <p:nvPr/>
-        </p:nvPicPr>
-        <p:blipFill>
-          <a:blip r:embed="rId3"/>
-          <a:stretch>
-            <a:fillRect/>
-          </a:stretch>
-        </p:blipFill>
-        <p:spPr>
-          <a:xfrm>
-            <a:off x="6350256" y="0"/>
-            <a:ext cx="5841744" cy="6858000"/>
-          </a:xfrm>
-          <a:prstGeom prst="rect">
-            <a:avLst/>
-          </a:prstGeom>
-        </p:spPr>
-      </p:pic>
-      <p:sp>
-        <p:nvSpPr>
-          <p:cNvPr id="2" name="Title 1">
-            <a:extLst>
-              <a:ext uri="{FF2B5EF4-FFF2-40B4-BE49-F238E27FC236}">
-                <a16:creationId xmlns:a16="http://schemas.microsoft.com/office/drawing/2014/main" id="{099B6722-9F8B-23CC-CF03-C974E55105C8}"/>
-              </a:ext>
-            </a:extLst>
-          </p:cNvPr>
-          <p:cNvSpPr>
-            <a:spLocks noGrp="1"/>
-          </p:cNvSpPr>
-          <p:nvPr>
-            <p:ph type="title"/>
-          </p:nvPr>
-        </p:nvSpPr>
-        <p:spPr>
-          <a:xfrm>
-            <a:off x="838201" y="593725"/>
-            <a:ext cx="5257800" cy="1325563"/>
-          </a:xfrm>
-        </p:spPr>
-        <p:txBody>
-          <a:bodyPr>
-            <a:normAutofit fontScale="90000"/>
-          </a:bodyPr>
-          <a:lstStyle/>
-          <a:p>
-            <a:r>
-              <a:rPr lang="en-US" dirty="0"/>
-              <a:t>Age contributes to variation (baseline samples)</a:t>
-            </a:r>
-          </a:p>
-        </p:txBody>
-      </p:sp>
-      <p:sp>
-        <p:nvSpPr>
-          <p:cNvPr id="4" name="TextBox 3">
-            <a:extLst>
-              <a:ext uri="{FF2B5EF4-FFF2-40B4-BE49-F238E27FC236}">
-                <a16:creationId xmlns:a16="http://schemas.microsoft.com/office/drawing/2014/main" id="{2B1DE7FD-F298-905A-CBC9-1E253F912A6E}"/>
-              </a:ext>
-            </a:extLst>
-          </p:cNvPr>
-          <p:cNvSpPr txBox="1"/>
-          <p:nvPr/>
-        </p:nvSpPr>
-        <p:spPr>
-          <a:xfrm>
-            <a:off x="7632834" y="5881035"/>
-            <a:ext cx="540212" cy="369332"/>
-          </a:xfrm>
-          <a:prstGeom prst="rect">
-            <a:avLst/>
-          </a:prstGeom>
-          <a:noFill/>
-        </p:spPr>
-        <p:txBody>
-          <a:bodyPr wrap="none" rtlCol="0">
-            <a:spAutoFit/>
-          </a:bodyPr>
-          <a:lstStyle/>
-          <a:p>
-            <a:r>
-              <a:rPr lang="en-US" dirty="0"/>
-              <a:t>Age</a:t>
-            </a:r>
-          </a:p>
-        </p:txBody>
-      </p:sp>
-    </p:spTree>
-    <p:extLst>
-      <p:ext uri="{BB962C8B-B14F-4D97-AF65-F5344CB8AC3E}">
-        <p14:creationId xmlns:p14="http://schemas.microsoft.com/office/powerpoint/2010/main" val="4198242633"/>
+        <p14:creationId xmlns:p14="http://schemas.microsoft.com/office/powerpoint/2010/main" val="2363217314"/>
       </p:ext>
     </p:extLst>
   </p:cSld>
@@ -7997,7 +7807,7 @@
           <a:p>
             <a:r>
               <a:rPr lang="en-US" dirty="0"/>
-              <a:t>Regressing out age &amp; batch from baseline samples doesn’t reveal clearly distinct immunotypes</a:t>
+              <a:t>Regressing out batch from baseline samples doesn’t reveal clearly distinct immunotypes</a:t>
             </a:r>
           </a:p>
         </p:txBody>
@@ -8118,7 +7928,7 @@
         <p:cNvPr id="1" name="">
           <a:extLst>
             <a:ext uri="{FF2B5EF4-FFF2-40B4-BE49-F238E27FC236}">
-              <a16:creationId xmlns:a16="http://schemas.microsoft.com/office/drawing/2014/main" id="{A5E81DFF-553A-FA3A-9A7E-0534236C2DCA}"/>
+              <a16:creationId xmlns:a16="http://schemas.microsoft.com/office/drawing/2014/main" id="{C55D7743-C5CC-7163-42F9-8A139DE9A99C}"/>
             </a:ext>
           </a:extLst>
         </p:cNvPr>
@@ -8138,7 +7948,7 @@
           <p:cNvPr id="2" name="Title 1">
             <a:extLst>
               <a:ext uri="{FF2B5EF4-FFF2-40B4-BE49-F238E27FC236}">
-                <a16:creationId xmlns:a16="http://schemas.microsoft.com/office/drawing/2014/main" id="{702937F6-E5F6-FA8A-65BE-95654D7B0140}"/>
+                <a16:creationId xmlns:a16="http://schemas.microsoft.com/office/drawing/2014/main" id="{9F9D9FA2-5D53-2BEB-66A2-ABC93F201395}"/>
               </a:ext>
             </a:extLst>
           </p:cNvPr>
@@ -8157,45 +7967,122 @@
         </p:spPr>
         <p:txBody>
           <a:bodyPr>
-            <a:normAutofit fontScale="90000"/>
+            <a:normAutofit/>
           </a:bodyPr>
           <a:lstStyle/>
           <a:p>
             <a:r>
               <a:rPr lang="en-US" dirty="0"/>
-              <a:t>However, PD1</a:t>
-            </a:r>
-            <a:r>
-              <a:rPr lang="en-US" baseline="30000" dirty="0"/>
-              <a:t>+</a:t>
-            </a:r>
+              <a:t>Conclusions</a:t>
+            </a:r>
+          </a:p>
+        </p:txBody>
+      </p:sp>
+      <p:sp>
+        <p:nvSpPr>
+          <p:cNvPr id="3" name="Content Placeholder 2">
+            <a:extLst>
+              <a:ext uri="{FF2B5EF4-FFF2-40B4-BE49-F238E27FC236}">
+                <a16:creationId xmlns:a16="http://schemas.microsoft.com/office/drawing/2014/main" id="{C4F1A618-530F-D746-FAF5-0E38C47B5C08}"/>
+              </a:ext>
+            </a:extLst>
+          </p:cNvPr>
+          <p:cNvSpPr>
+            <a:spLocks noGrp="1"/>
+          </p:cNvSpPr>
+          <p:nvPr>
+            <p:ph idx="1"/>
+          </p:nvPr>
+        </p:nvSpPr>
+        <p:spPr>
+          <a:xfrm>
+            <a:off x="838200" y="1919289"/>
+            <a:ext cx="10515600" cy="4623402"/>
+          </a:xfrm>
+        </p:spPr>
+        <p:txBody>
+          <a:bodyPr>
+            <a:normAutofit lnSpcReduction="10000"/>
+          </a:bodyPr>
+          <a:lstStyle/>
+          <a:p>
+            <a:pPr marL="514350" indent="-514350">
+              <a:buFont typeface="+mj-lt"/>
+              <a:buAutoNum type="arabicPeriod"/>
+            </a:pPr>
             <a:r>
               <a:rPr lang="en-US" dirty="0"/>
-              <a:t> of CM </a:t>
-            </a:r>
-            <a:r>
-              <a:rPr lang="en-US" dirty="0" err="1"/>
-              <a:t>T</a:t>
-            </a:r>
-            <a:r>
-              <a:rPr lang="en-US" baseline="-25000" dirty="0" err="1"/>
-              <a:t>conv</a:t>
-            </a:r>
+              <a:t>Baseline immunotypes are not distinct by general group, even after regressing batch out</a:t>
+            </a:r>
+          </a:p>
+          <a:p>
+            <a:pPr marL="971550" lvl="1" indent="-514350">
+              <a:buFont typeface="+mj-lt"/>
+              <a:buAutoNum type="alphaLcParenR"/>
+            </a:pPr>
             <a:r>
               <a:rPr lang="en-US" dirty="0"/>
-              <a:t> </a:t>
-            </a:r>
-            <a:r>
-              <a:rPr lang="en-US" dirty="0" err="1"/>
-              <a:t>T</a:t>
-            </a:r>
-            <a:r>
-              <a:rPr lang="en-US" baseline="-25000" dirty="0" err="1"/>
-              <a:t>cells</a:t>
-            </a:r>
+              <a:t>ICA does not appear better at distinguishing unique immunotypes by group (baseline) than PCA</a:t>
+            </a:r>
+          </a:p>
+          <a:p>
+            <a:pPr marL="971550" lvl="1" indent="-514350">
+              <a:buFont typeface="+mj-lt"/>
+              <a:buAutoNum type="alphaLcParenR"/>
+            </a:pPr>
             <a:r>
               <a:rPr lang="en-US" dirty="0"/>
-              <a:t> does appear slightly higher in non-</a:t>
+              <a:t>AID subgroup immunotypes are not very distinct either</a:t>
+            </a:r>
+          </a:p>
+          <a:p>
+            <a:pPr marL="971550" lvl="1" indent="-514350">
+              <a:buFont typeface="+mj-lt"/>
+              <a:buAutoNum type="alphaLcParenR"/>
+            </a:pPr>
+            <a:r>
+              <a:rPr lang="en-US" dirty="0"/>
+              <a:t>baseline head, neck, and lung cancer subgroup immunotypes are distinct from other cancer subtypes</a:t>
+            </a:r>
+          </a:p>
+          <a:p>
+            <a:pPr marL="971550" lvl="1" indent="-514350">
+              <a:buFont typeface="+mj-lt"/>
+              <a:buAutoNum type="alphaLcParenR"/>
+            </a:pPr>
+            <a:r>
+              <a:rPr lang="en-US" dirty="0"/>
+              <a:t>age contributes to variation (baseline samples)</a:t>
+            </a:r>
+          </a:p>
+          <a:p>
+            <a:pPr marL="514350" indent="-514350">
+              <a:buFont typeface="+mj-lt"/>
+              <a:buAutoNum type="arabicPeriod"/>
+            </a:pPr>
+            <a:r>
+              <a:rPr lang="en-US" dirty="0"/>
+              <a:t>data not shown</a:t>
+            </a:r>
+          </a:p>
+          <a:p>
+            <a:pPr marL="914400" lvl="1" indent="-457200">
+              <a:buFont typeface="+mj-lt"/>
+              <a:buAutoNum type="alphaLcParenR"/>
+            </a:pPr>
+            <a:r>
+              <a:rPr lang="en-US" dirty="0"/>
+              <a:t>don’t see effect of previous treatments (radiation, chemoradiation…) on baseline cancer immunotypes</a:t>
+            </a:r>
+          </a:p>
+          <a:p>
+            <a:pPr marL="914400" lvl="1" indent="-457200">
+              <a:buFont typeface="+mj-lt"/>
+              <a:buAutoNum type="alphaLcParenR"/>
+            </a:pPr>
+            <a:r>
+              <a:rPr lang="en-US" dirty="0"/>
+              <a:t>including all features at baseline (even those with high technical variation) does not reveal distinct immunotypes by </a:t>
             </a:r>
             <a:r>
               <a:rPr lang="en-US" dirty="0" err="1"/>
@@ -8203,207 +8090,15 @@
             </a:r>
             <a:r>
               <a:rPr lang="en-US" dirty="0"/>
-              <a:t> group vs. </a:t>
-            </a:r>
-            <a:r>
-              <a:rPr lang="en-US" dirty="0" err="1"/>
-              <a:t>irAE</a:t>
-            </a:r>
-            <a:r>
-              <a:rPr lang="en-US" dirty="0"/>
-              <a:t>/SAE group post-regressing out batch</a:t>
-            </a:r>
-          </a:p>
-        </p:txBody>
-      </p:sp>
-      <p:pic>
-        <p:nvPicPr>
-          <p:cNvPr id="8" name="Picture 7">
-            <a:extLst>
-              <a:ext uri="{FF2B5EF4-FFF2-40B4-BE49-F238E27FC236}">
-                <a16:creationId xmlns:a16="http://schemas.microsoft.com/office/drawing/2014/main" id="{4B547DCF-6A21-340E-83D0-B8EF19B253BE}"/>
-              </a:ext>
-            </a:extLst>
-          </p:cNvPr>
-          <p:cNvPicPr>
-            <a:picLocks noChangeAspect="1"/>
-          </p:cNvPicPr>
-          <p:nvPr/>
-        </p:nvPicPr>
-        <p:blipFill>
-          <a:blip r:embed="rId3"/>
-          <a:stretch>
-            <a:fillRect/>
-          </a:stretch>
-        </p:blipFill>
-        <p:spPr>
-          <a:xfrm>
-            <a:off x="1882542" y="1765284"/>
-            <a:ext cx="7772400" cy="4815262"/>
-          </a:xfrm>
-          <a:prstGeom prst="rect">
-            <a:avLst/>
-          </a:prstGeom>
-        </p:spPr>
-      </p:pic>
-      <p:sp>
-        <p:nvSpPr>
-          <p:cNvPr id="13" name="TextBox 12">
-            <a:extLst>
-              <a:ext uri="{FF2B5EF4-FFF2-40B4-BE49-F238E27FC236}">
-                <a16:creationId xmlns:a16="http://schemas.microsoft.com/office/drawing/2014/main" id="{4F15ACFE-ED78-13FB-3C5C-82E8401EC44E}"/>
-              </a:ext>
-            </a:extLst>
-          </p:cNvPr>
-          <p:cNvSpPr txBox="1"/>
-          <p:nvPr/>
-        </p:nvSpPr>
-        <p:spPr>
-          <a:xfrm>
-            <a:off x="2823574" y="6395880"/>
-            <a:ext cx="3744936" cy="369332"/>
-          </a:xfrm>
-          <a:prstGeom prst="rect">
-            <a:avLst/>
-          </a:prstGeom>
-          <a:noFill/>
-        </p:spPr>
-        <p:txBody>
-          <a:bodyPr wrap="none" rtlCol="0">
-            <a:spAutoFit/>
-          </a:bodyPr>
-          <a:lstStyle/>
-          <a:p>
-            <a:r>
-              <a:rPr lang="en-US" dirty="0"/>
-              <a:t>Wilcoxon rank sum test.</a:t>
-            </a:r>
-            <a:r>
-              <a:rPr lang="en-US" dirty="0">
-                <a:latin typeface="Calibri" panose="020F0502020204030204" pitchFamily="34" charset="0"/>
-                <a:cs typeface="Times New Roman" panose="02020603050405020304" pitchFamily="18" charset="0"/>
-              </a:rPr>
-              <a:t> </a:t>
-            </a:r>
-            <a:r>
-              <a:rPr lang="en-US" sz="1800" dirty="0">
-                <a:effectLst/>
-                <a:latin typeface="Calibri" panose="020F0502020204030204" pitchFamily="34" charset="0"/>
-                <a:ea typeface="Calibri" panose="020F0502020204030204" pitchFamily="34" charset="0"/>
-                <a:cs typeface="Times New Roman" panose="02020603050405020304" pitchFamily="18" charset="0"/>
-              </a:rPr>
-              <a:t>~*; </a:t>
-            </a:r>
-            <a:r>
-              <a:rPr lang="en-US" sz="1800" dirty="0" err="1">
-                <a:effectLst/>
-                <a:latin typeface="Calibri" panose="020F0502020204030204" pitchFamily="34" charset="0"/>
-                <a:ea typeface="Calibri" panose="020F0502020204030204" pitchFamily="34" charset="0"/>
-                <a:cs typeface="Times New Roman" panose="02020603050405020304" pitchFamily="18" charset="0"/>
-              </a:rPr>
-              <a:t>padj</a:t>
-            </a:r>
-            <a:r>
-              <a:rPr lang="en-US" sz="1800" dirty="0">
-                <a:effectLst/>
-                <a:latin typeface="Calibri" panose="020F0502020204030204" pitchFamily="34" charset="0"/>
-                <a:ea typeface="Calibri" panose="020F0502020204030204" pitchFamily="34" charset="0"/>
-                <a:cs typeface="Times New Roman" panose="02020603050405020304" pitchFamily="18" charset="0"/>
-              </a:rPr>
-              <a:t> &lt; 0.1</a:t>
-            </a:r>
-            <a:endParaRPr lang="en-US" b="0" i="0" u="none" strike="noStrike" dirty="0">
-              <a:solidFill>
-                <a:srgbClr val="212121"/>
-              </a:solidFill>
-              <a:effectLst/>
-              <a:latin typeface="Cambria" panose="02040503050406030204" pitchFamily="18" charset="0"/>
-            </a:endParaRPr>
-          </a:p>
-        </p:txBody>
-      </p:sp>
-      <p:sp>
-        <p:nvSpPr>
-          <p:cNvPr id="15" name="TextBox 14">
-            <a:extLst>
-              <a:ext uri="{FF2B5EF4-FFF2-40B4-BE49-F238E27FC236}">
-                <a16:creationId xmlns:a16="http://schemas.microsoft.com/office/drawing/2014/main" id="{B29D6EE7-956E-3DAC-53DD-19F13193B0D3}"/>
-              </a:ext>
-            </a:extLst>
-          </p:cNvPr>
-          <p:cNvSpPr txBox="1"/>
-          <p:nvPr/>
-        </p:nvSpPr>
-        <p:spPr>
-          <a:xfrm>
-            <a:off x="6389576" y="2081387"/>
-            <a:ext cx="771619" cy="553998"/>
-          </a:xfrm>
-          <a:prstGeom prst="rect">
-            <a:avLst/>
-          </a:prstGeom>
-          <a:noFill/>
-        </p:spPr>
-        <p:txBody>
-          <a:bodyPr wrap="square" rtlCol="0">
-            <a:spAutoFit/>
-          </a:bodyPr>
-          <a:lstStyle/>
-          <a:p>
-            <a:r>
-              <a:rPr lang="en-US" sz="3000" dirty="0"/>
-              <a:t>~*</a:t>
-            </a:r>
-          </a:p>
-        </p:txBody>
-      </p:sp>
-      <p:cxnSp>
-        <p:nvCxnSpPr>
-          <p:cNvPr id="17" name="Straight Connector 16">
-            <a:extLst>
-              <a:ext uri="{FF2B5EF4-FFF2-40B4-BE49-F238E27FC236}">
-                <a16:creationId xmlns:a16="http://schemas.microsoft.com/office/drawing/2014/main" id="{B1429B1F-14C3-13CF-EE99-28D0332DE8E4}"/>
-              </a:ext>
-            </a:extLst>
-          </p:cNvPr>
-          <p:cNvCxnSpPr>
-            <a:cxnSpLocks/>
-          </p:cNvCxnSpPr>
-          <p:nvPr/>
-        </p:nvCxnSpPr>
-        <p:spPr>
-          <a:xfrm>
-            <a:off x="6096000" y="2081387"/>
-            <a:ext cx="1171074" cy="0"/>
-          </a:xfrm>
-          <a:prstGeom prst="line">
-            <a:avLst/>
-          </a:prstGeom>
-          <a:ln w="19050">
-            <a:solidFill>
-              <a:schemeClr val="tx1"/>
-            </a:solidFill>
-          </a:ln>
-        </p:spPr>
-        <p:style>
-          <a:lnRef idx="1">
-            <a:schemeClr val="accent1"/>
-          </a:lnRef>
-          <a:fillRef idx="0">
-            <a:schemeClr val="accent1"/>
-          </a:fillRef>
-          <a:effectRef idx="0">
-            <a:schemeClr val="accent1"/>
-          </a:effectRef>
-          <a:fontRef idx="minor">
-            <a:schemeClr val="tx1"/>
-          </a:fontRef>
-        </p:style>
-      </p:cxnSp>
+              <a:t> group</a:t>
+            </a:r>
+          </a:p>
+        </p:txBody>
+      </p:sp>
     </p:spTree>
     <p:extLst>
       <p:ext uri="{BB962C8B-B14F-4D97-AF65-F5344CB8AC3E}">
-        <p14:creationId xmlns:p14="http://schemas.microsoft.com/office/powerpoint/2010/main" val="1830127623"/>
+        <p14:creationId xmlns:p14="http://schemas.microsoft.com/office/powerpoint/2010/main" val="2812621026"/>
       </p:ext>
     </p:extLst>
   </p:cSld>

</xml_diff>

<commit_message>
Clarify lack of baseline immunotypes even when ssubtracting out ICI and ICI group effects
</commit_message>
<xml_diff>
--- a/presentations/NCI_talks/2024_10_23.pptx
+++ b/presentations/NCI_talks/2024_10_23.pptx
@@ -220,7 +220,7 @@
           <a:p>
             <a:fld id="{E933A773-0DCE-3544-BB67-D5FA58DF903C}" type="datetimeFigureOut">
               <a:rPr lang="en-US" smtClean="0"/>
-              <a:t>10/10/24</a:t>
+              <a:t>10/16/24</a:t>
             </a:fld>
             <a:endParaRPr lang="en-US"/>
           </a:p>
@@ -3335,7 +3335,7 @@
           <a:p>
             <a:fld id="{80FC6068-BAFB-FC44-B9D8-F4B3BB105DE6}" type="datetimeFigureOut">
               <a:rPr lang="en-US" smtClean="0"/>
-              <a:t>10/10/24</a:t>
+              <a:t>10/16/24</a:t>
             </a:fld>
             <a:endParaRPr lang="en-US"/>
           </a:p>
@@ -3533,7 +3533,7 @@
           <a:p>
             <a:fld id="{80FC6068-BAFB-FC44-B9D8-F4B3BB105DE6}" type="datetimeFigureOut">
               <a:rPr lang="en-US" smtClean="0"/>
-              <a:t>10/10/24</a:t>
+              <a:t>10/16/24</a:t>
             </a:fld>
             <a:endParaRPr lang="en-US"/>
           </a:p>
@@ -3741,7 +3741,7 @@
           <a:p>
             <a:fld id="{80FC6068-BAFB-FC44-B9D8-F4B3BB105DE6}" type="datetimeFigureOut">
               <a:rPr lang="en-US" smtClean="0"/>
-              <a:t>10/10/24</a:t>
+              <a:t>10/16/24</a:t>
             </a:fld>
             <a:endParaRPr lang="en-US"/>
           </a:p>
@@ -3945,7 +3945,7 @@
           <a:p>
             <a:fld id="{80FC6068-BAFB-FC44-B9D8-F4B3BB105DE6}" type="datetimeFigureOut">
               <a:rPr lang="en-US" smtClean="0"/>
-              <a:t>10/10/24</a:t>
+              <a:t>10/16/24</a:t>
             </a:fld>
             <a:endParaRPr lang="en-US"/>
           </a:p>
@@ -4236,7 +4236,7 @@
           <a:p>
             <a:fld id="{80FC6068-BAFB-FC44-B9D8-F4B3BB105DE6}" type="datetimeFigureOut">
               <a:rPr lang="en-US" smtClean="0"/>
-              <a:t>10/10/24</a:t>
+              <a:t>10/16/24</a:t>
             </a:fld>
             <a:endParaRPr lang="en-US"/>
           </a:p>
@@ -4501,7 +4501,7 @@
           <a:p>
             <a:fld id="{80FC6068-BAFB-FC44-B9D8-F4B3BB105DE6}" type="datetimeFigureOut">
               <a:rPr lang="en-US" smtClean="0"/>
-              <a:t>10/10/24</a:t>
+              <a:t>10/16/24</a:t>
             </a:fld>
             <a:endParaRPr lang="en-US"/>
           </a:p>
@@ -4913,7 +4913,7 @@
           <a:p>
             <a:fld id="{80FC6068-BAFB-FC44-B9D8-F4B3BB105DE6}" type="datetimeFigureOut">
               <a:rPr lang="en-US" smtClean="0"/>
-              <a:t>10/10/24</a:t>
+              <a:t>10/16/24</a:t>
             </a:fld>
             <a:endParaRPr lang="en-US"/>
           </a:p>
@@ -5054,7 +5054,7 @@
           <a:p>
             <a:fld id="{80FC6068-BAFB-FC44-B9D8-F4B3BB105DE6}" type="datetimeFigureOut">
               <a:rPr lang="en-US" smtClean="0"/>
-              <a:t>10/10/24</a:t>
+              <a:t>10/16/24</a:t>
             </a:fld>
             <a:endParaRPr lang="en-US"/>
           </a:p>
@@ -5167,7 +5167,7 @@
           <a:p>
             <a:fld id="{80FC6068-BAFB-FC44-B9D8-F4B3BB105DE6}" type="datetimeFigureOut">
               <a:rPr lang="en-US" smtClean="0"/>
-              <a:t>10/10/24</a:t>
+              <a:t>10/16/24</a:t>
             </a:fld>
             <a:endParaRPr lang="en-US"/>
           </a:p>
@@ -5478,7 +5478,7 @@
           <a:p>
             <a:fld id="{80FC6068-BAFB-FC44-B9D8-F4B3BB105DE6}" type="datetimeFigureOut">
               <a:rPr lang="en-US" smtClean="0"/>
-              <a:t>10/10/24</a:t>
+              <a:t>10/16/24</a:t>
             </a:fld>
             <a:endParaRPr lang="en-US"/>
           </a:p>
@@ -5766,7 +5766,7 @@
           <a:p>
             <a:fld id="{80FC6068-BAFB-FC44-B9D8-F4B3BB105DE6}" type="datetimeFigureOut">
               <a:rPr lang="en-US" smtClean="0"/>
-              <a:t>10/10/24</a:t>
+              <a:t>10/16/24</a:t>
             </a:fld>
             <a:endParaRPr lang="en-US"/>
           </a:p>
@@ -6007,7 +6007,7 @@
           <a:p>
             <a:fld id="{80FC6068-BAFB-FC44-B9D8-F4B3BB105DE6}" type="datetimeFigureOut">
               <a:rPr lang="en-US" smtClean="0"/>
-              <a:t>10/10/24</a:t>
+              <a:t>10/16/24</a:t>
             </a:fld>
             <a:endParaRPr lang="en-US"/>
           </a:p>
@@ -6631,7 +6631,15 @@
             </a:r>
             <a:r>
               <a:rPr lang="en-US" dirty="0"/>
-              <a:t> patient immunotypes at baseline?</a:t>
+              <a:t> patient immunotypes at baseline? Re-do all analyses w/ </a:t>
+            </a:r>
+            <a:r>
+              <a:rPr lang="en-US" dirty="0" err="1"/>
+              <a:t>irAE</a:t>
+            </a:r>
+            <a:r>
+              <a:rPr lang="en-US" dirty="0"/>
+              <a:t> grade rather than arbitrary severity split</a:t>
             </a:r>
           </a:p>
           <a:p>
@@ -8002,7 +8010,7 @@
         </p:spPr>
         <p:txBody>
           <a:bodyPr>
-            <a:normAutofit lnSpcReduction="10000"/>
+            <a:normAutofit fontScale="92500" lnSpcReduction="20000"/>
           </a:bodyPr>
           <a:lstStyle/>
           <a:p>
@@ -8063,6 +8071,32 @@
             <a:r>
               <a:rPr lang="en-US" dirty="0"/>
               <a:t>data not shown</a:t>
+            </a:r>
+          </a:p>
+          <a:p>
+            <a:pPr marL="914400" lvl="1" indent="-457200">
+              <a:buFont typeface="+mj-lt"/>
+              <a:buAutoNum type="alphaLcParenR"/>
+            </a:pPr>
+            <a:r>
+              <a:rPr lang="en-US" dirty="0"/>
+              <a:t>subtracting ICI/</a:t>
+            </a:r>
+            <a:r>
+              <a:rPr lang="en-US" dirty="0" err="1"/>
+              <a:t>ICI+group</a:t>
+            </a:r>
+            <a:r>
+              <a:rPr lang="en-US" dirty="0"/>
+              <a:t> effects from baseline does not uncover features different between </a:t>
+            </a:r>
+            <a:r>
+              <a:rPr lang="en-US" dirty="0" err="1"/>
+              <a:t>irAE</a:t>
+            </a:r>
+            <a:r>
+              <a:rPr lang="en-US" dirty="0"/>
+              <a:t> groups</a:t>
             </a:r>
           </a:p>
           <a:p>

</xml_diff>